<commit_message>
Delect Git_Learning directory and modify GitHub_note.pptx file
</commit_message>
<xml_diff>
--- a/GitHub_note.pptx
+++ b/GitHub_note.pptx
@@ -15,7 +15,8 @@
     <p:sldId id="263" r:id="rId9"/>
     <p:sldId id="264" r:id="rId10"/>
     <p:sldId id="265" r:id="rId11"/>
-    <p:sldId id="266" r:id="rId12"/>
+    <p:sldId id="267" r:id="rId12"/>
+    <p:sldId id="266" r:id="rId13"/>
   </p:sldIdLst>
   <p:sldSz cx="12192000" cy="6858000"/>
   <p:notesSz cx="6858000" cy="9144000"/>
@@ -4850,7 +4851,10 @@
             <a:r>
               <a:rPr lang="en-US" altLang="zh-TW" sz="1200" dirty="0">
                 <a:solidFill>
-                  <a:srgbClr val="FF0000"/>
+                  <a:schemeClr val="accent5">
+                    <a:lumMod val="20000"/>
+                    <a:lumOff val="80000"/>
+                  </a:schemeClr>
                 </a:solidFill>
                 <a:latin typeface="Courier New" panose="02070309020205020404" pitchFamily="49" charset="0"/>
                 <a:cs typeface="Courier New" panose="02070309020205020404" pitchFamily="49" charset="0"/>
@@ -4860,7 +4864,10 @@
             <a:r>
               <a:rPr lang="zh-TW" altLang="en-US" sz="1200" dirty="0">
                 <a:solidFill>
-                  <a:srgbClr val="FF0000"/>
+                  <a:schemeClr val="accent5">
+                    <a:lumMod val="20000"/>
+                    <a:lumOff val="80000"/>
+                  </a:schemeClr>
                 </a:solidFill>
                 <a:latin typeface="Courier New" panose="02070309020205020404" pitchFamily="49" charset="0"/>
                 <a:cs typeface="Courier New" panose="02070309020205020404" pitchFamily="49" charset="0"/>
@@ -4870,7 +4877,10 @@
             <a:r>
               <a:rPr lang="en-US" altLang="zh-TW" sz="1200" dirty="0">
                 <a:solidFill>
-                  <a:srgbClr val="FF0000"/>
+                  <a:schemeClr val="accent5">
+                    <a:lumMod val="20000"/>
+                    <a:lumOff val="80000"/>
+                  </a:schemeClr>
                 </a:solidFill>
                 <a:latin typeface="Courier New" panose="02070309020205020404" pitchFamily="49" charset="0"/>
                 <a:cs typeface="Courier New" panose="02070309020205020404" pitchFamily="49" charset="0"/>
@@ -4880,7 +4890,10 @@
             <a:r>
               <a:rPr lang="zh-TW" altLang="en-US" sz="1200" dirty="0">
                 <a:solidFill>
-                  <a:srgbClr val="FF0000"/>
+                  <a:schemeClr val="accent5">
+                    <a:lumMod val="20000"/>
+                    <a:lumOff val="80000"/>
+                  </a:schemeClr>
                 </a:solidFill>
                 <a:latin typeface="Courier New" panose="02070309020205020404" pitchFamily="49" charset="0"/>
                 <a:cs typeface="Courier New" panose="02070309020205020404" pitchFamily="49" charset="0"/>
@@ -4890,7 +4903,10 @@
             <a:r>
               <a:rPr lang="en-US" altLang="zh-TW" sz="1200" dirty="0">
                 <a:solidFill>
-                  <a:srgbClr val="FF0000"/>
+                  <a:schemeClr val="accent5">
+                    <a:lumMod val="20000"/>
+                    <a:lumOff val="80000"/>
+                  </a:schemeClr>
                 </a:solidFill>
                 <a:latin typeface="Courier New" panose="02070309020205020404" pitchFamily="49" charset="0"/>
                 <a:cs typeface="Courier New" panose="02070309020205020404" pitchFamily="49" charset="0"/>
@@ -4900,7 +4916,10 @@
             <a:r>
               <a:rPr lang="zh-TW" altLang="en-US" sz="1200" dirty="0">
                 <a:solidFill>
-                  <a:srgbClr val="FF0000"/>
+                  <a:schemeClr val="accent5">
+                    <a:lumMod val="20000"/>
+                    <a:lumOff val="80000"/>
+                  </a:schemeClr>
                 </a:solidFill>
                 <a:latin typeface="Courier New" panose="02070309020205020404" pitchFamily="49" charset="0"/>
                 <a:cs typeface="Courier New" panose="02070309020205020404" pitchFamily="49" charset="0"/>
@@ -4910,7 +4929,10 @@
             <a:r>
               <a:rPr lang="en-US" altLang="zh-TW" sz="1200" dirty="0">
                 <a:solidFill>
-                  <a:srgbClr val="FF0000"/>
+                  <a:schemeClr val="accent5">
+                    <a:lumMod val="20000"/>
+                    <a:lumOff val="80000"/>
+                  </a:schemeClr>
                 </a:solidFill>
                 <a:latin typeface="Courier New" panose="02070309020205020404" pitchFamily="49" charset="0"/>
                 <a:cs typeface="Courier New" panose="02070309020205020404" pitchFamily="49" charset="0"/>
@@ -4919,7 +4941,10 @@
             </a:r>
             <a:endParaRPr lang="zh-TW" altLang="en-US" sz="1200" dirty="0">
               <a:solidFill>
-                <a:srgbClr val="FF0000"/>
+                <a:schemeClr val="accent5">
+                  <a:lumMod val="20000"/>
+                  <a:lumOff val="80000"/>
+                </a:schemeClr>
               </a:solidFill>
               <a:latin typeface="Courier New" panose="02070309020205020404" pitchFamily="49" charset="0"/>
               <a:cs typeface="Courier New" panose="02070309020205020404" pitchFamily="49" charset="0"/>
@@ -4943,8 +4968,8 @@
         </p:nvSpPr>
         <p:spPr>
           <a:xfrm>
-            <a:off x="1340359" y="5381925"/>
-            <a:ext cx="3410935" cy="339419"/>
+            <a:off x="1340358" y="5259679"/>
+            <a:ext cx="3796417" cy="461665"/>
           </a:xfrm>
           <a:prstGeom prst="rect">
             <a:avLst/>
@@ -4952,7 +4977,7 @@
         </p:spPr>
         <p:txBody>
           <a:bodyPr vert="horz" lIns="91440" tIns="45720" rIns="91440" bIns="45720" rtlCol="0" anchor="ctr" anchorCtr="0">
-            <a:normAutofit fontScale="92500" lnSpcReduction="10000"/>
+            <a:normAutofit/>
           </a:bodyPr>
           <a:lstStyle>
             <a:lvl1pPr marL="228600" indent="-228600" algn="l" defTabSz="914400" rtl="0" eaLnBrk="1" latinLnBrk="0" hangingPunct="1">
@@ -5201,6 +5226,1185 @@
 </file>
 
 <file path=ppt/slides/slide11.xml><?xml version="1.0" encoding="utf-8"?>
+<p:sld xmlns:a="http://schemas.openxmlformats.org/drawingml/2006/main" xmlns:r="http://schemas.openxmlformats.org/officeDocument/2006/relationships" xmlns:p="http://schemas.openxmlformats.org/presentationml/2006/main">
+  <p:cSld>
+    <p:bg>
+      <p:bgPr>
+        <a:solidFill>
+          <a:schemeClr val="tx1">
+            <a:lumMod val="75000"/>
+            <a:lumOff val="25000"/>
+          </a:schemeClr>
+        </a:solidFill>
+        <a:effectLst/>
+      </p:bgPr>
+    </p:bg>
+    <p:spTree>
+      <p:nvGrpSpPr>
+        <p:cNvPr id="1" name="">
+          <a:extLst>
+            <a:ext uri="{FF2B5EF4-FFF2-40B4-BE49-F238E27FC236}">
+              <a16:creationId xmlns:a16="http://schemas.microsoft.com/office/drawing/2014/main" id="{1FB869BC-F225-87F2-3E43-C751BD8B264E}"/>
+            </a:ext>
+          </a:extLst>
+        </p:cNvPr>
+        <p:cNvGrpSpPr/>
+        <p:nvPr/>
+      </p:nvGrpSpPr>
+      <p:grpSpPr>
+        <a:xfrm>
+          <a:off x="0" y="0"/>
+          <a:ext cx="0" cy="0"/>
+          <a:chOff x="0" y="0"/>
+          <a:chExt cx="0" cy="0"/>
+        </a:xfrm>
+      </p:grpSpPr>
+      <p:sp>
+        <p:nvSpPr>
+          <p:cNvPr id="2" name="標題 1">
+            <a:extLst>
+              <a:ext uri="{FF2B5EF4-FFF2-40B4-BE49-F238E27FC236}">
+                <a16:creationId xmlns:a16="http://schemas.microsoft.com/office/drawing/2014/main" id="{D0620685-3CEE-B4CB-5C01-71434B0991D1}"/>
+              </a:ext>
+            </a:extLst>
+          </p:cNvPr>
+          <p:cNvSpPr>
+            <a:spLocks noGrp="1"/>
+          </p:cNvSpPr>
+          <p:nvPr>
+            <p:ph type="title"/>
+          </p:nvPr>
+        </p:nvSpPr>
+        <p:spPr>
+          <a:xfrm>
+            <a:off x="640079" y="1102718"/>
+            <a:ext cx="10890929" cy="662474"/>
+          </a:xfrm>
+        </p:spPr>
+        <p:txBody>
+          <a:bodyPr anchor="ctr" anchorCtr="0">
+            <a:normAutofit/>
+          </a:bodyPr>
+          <a:lstStyle/>
+          <a:p>
+            <a:r>
+              <a:rPr lang="en-US" altLang="zh-TW" sz="3200" dirty="0">
+                <a:solidFill>
+                  <a:srgbClr val="FFC000"/>
+                </a:solidFill>
+              </a:rPr>
+              <a:t>Git Bash – Command Line</a:t>
+            </a:r>
+            <a:endParaRPr lang="zh-TW" altLang="en-US" sz="3200" dirty="0">
+              <a:solidFill>
+                <a:srgbClr val="FFC000"/>
+              </a:solidFill>
+            </a:endParaRPr>
+          </a:p>
+        </p:txBody>
+      </p:sp>
+      <p:sp>
+        <p:nvSpPr>
+          <p:cNvPr id="3" name="內容版面配置區 2">
+            <a:extLst>
+              <a:ext uri="{FF2B5EF4-FFF2-40B4-BE49-F238E27FC236}">
+                <a16:creationId xmlns:a16="http://schemas.microsoft.com/office/drawing/2014/main" id="{3237BA50-EF39-2055-1154-EE4A286B7D71}"/>
+              </a:ext>
+            </a:extLst>
+          </p:cNvPr>
+          <p:cNvSpPr>
+            <a:spLocks noGrp="1"/>
+          </p:cNvSpPr>
+          <p:nvPr>
+            <p:ph idx="1"/>
+          </p:nvPr>
+        </p:nvSpPr>
+        <p:spPr>
+          <a:xfrm>
+            <a:off x="797097" y="1765192"/>
+            <a:ext cx="4339679" cy="547027"/>
+          </a:xfrm>
+        </p:spPr>
+        <p:txBody>
+          <a:bodyPr anchor="ctr" anchorCtr="0">
+            <a:noAutofit/>
+          </a:bodyPr>
+          <a:lstStyle/>
+          <a:p>
+            <a:pPr>
+              <a:buFont typeface="Wingdings" panose="05000000000000000000" pitchFamily="2" charset="2"/>
+              <a:buChar char="l"/>
+            </a:pPr>
+            <a:r>
+              <a:rPr lang="zh-TW" altLang="en-US" dirty="0">
+                <a:solidFill>
+                  <a:srgbClr val="00B0F0"/>
+                </a:solidFill>
+              </a:rPr>
+              <a:t> 建立遠端</a:t>
+            </a:r>
+            <a:r>
+              <a:rPr lang="en-US" altLang="zh-TW" dirty="0">
+                <a:solidFill>
+                  <a:srgbClr val="00B0F0"/>
+                </a:solidFill>
+              </a:rPr>
+              <a:t>Git</a:t>
+            </a:r>
+            <a:r>
+              <a:rPr lang="zh-TW" altLang="en-US" dirty="0">
+                <a:solidFill>
+                  <a:srgbClr val="00B0F0"/>
+                </a:solidFill>
+              </a:rPr>
+              <a:t> </a:t>
+            </a:r>
+            <a:r>
+              <a:rPr lang="en-US" altLang="zh-TW" dirty="0">
+                <a:solidFill>
+                  <a:srgbClr val="00B0F0"/>
+                </a:solidFill>
+              </a:rPr>
+              <a:t>Repository</a:t>
+            </a:r>
+            <a:r>
+              <a:rPr lang="zh-TW" altLang="en-US" dirty="0">
+                <a:solidFill>
+                  <a:srgbClr val="00B0F0"/>
+                </a:solidFill>
+              </a:rPr>
+              <a:t>目錄</a:t>
+            </a:r>
+          </a:p>
+        </p:txBody>
+      </p:sp>
+      <p:sp>
+        <p:nvSpPr>
+          <p:cNvPr id="4" name="文字方塊 3">
+            <a:extLst>
+              <a:ext uri="{FF2B5EF4-FFF2-40B4-BE49-F238E27FC236}">
+                <a16:creationId xmlns:a16="http://schemas.microsoft.com/office/drawing/2014/main" id="{61BC4B93-41CA-C332-1FFD-F3D330791DEF}"/>
+              </a:ext>
+            </a:extLst>
+          </p:cNvPr>
+          <p:cNvSpPr txBox="1"/>
+          <p:nvPr/>
+        </p:nvSpPr>
+        <p:spPr>
+          <a:xfrm>
+            <a:off x="1717954" y="2944499"/>
+            <a:ext cx="9281740" cy="711092"/>
+          </a:xfrm>
+          <a:prstGeom prst="rect">
+            <a:avLst/>
+          </a:prstGeom>
+          <a:noFill/>
+        </p:spPr>
+        <p:txBody>
+          <a:bodyPr wrap="square" rtlCol="0">
+            <a:spAutoFit/>
+          </a:bodyPr>
+          <a:lstStyle/>
+          <a:p>
+            <a:pPr>
+              <a:lnSpc>
+                <a:spcPct val="150000"/>
+              </a:lnSpc>
+            </a:pPr>
+            <a:r>
+              <a:rPr lang="zh-TW" altLang="en-US" sz="1400" dirty="0">
+                <a:solidFill>
+                  <a:schemeClr val="bg1"/>
+                </a:solidFill>
+                <a:latin typeface="Courier New" panose="02070309020205020404" pitchFamily="49" charset="0"/>
+                <a:cs typeface="Courier New" panose="02070309020205020404" pitchFamily="49" charset="0"/>
+              </a:rPr>
+              <a:t>將目錄路徑切換到本地端的</a:t>
+            </a:r>
+            <a:r>
+              <a:rPr lang="en-US" altLang="zh-TW" sz="1400" dirty="0">
+                <a:solidFill>
+                  <a:schemeClr val="bg1"/>
+                </a:solidFill>
+                <a:latin typeface="Courier New" panose="02070309020205020404" pitchFamily="49" charset="0"/>
+                <a:cs typeface="Courier New" panose="02070309020205020404" pitchFamily="49" charset="0"/>
+              </a:rPr>
+              <a:t>Git</a:t>
+            </a:r>
+            <a:r>
+              <a:rPr lang="zh-TW" altLang="en-US" sz="1400" dirty="0">
+                <a:solidFill>
+                  <a:schemeClr val="bg1"/>
+                </a:solidFill>
+                <a:latin typeface="Courier New" panose="02070309020205020404" pitchFamily="49" charset="0"/>
+                <a:cs typeface="Courier New" panose="02070309020205020404" pitchFamily="49" charset="0"/>
+              </a:rPr>
+              <a:t> </a:t>
+            </a:r>
+            <a:r>
+              <a:rPr lang="en-US" altLang="zh-TW" sz="1400" dirty="0">
+                <a:solidFill>
+                  <a:schemeClr val="bg1"/>
+                </a:solidFill>
+                <a:latin typeface="Courier New" panose="02070309020205020404" pitchFamily="49" charset="0"/>
+                <a:cs typeface="Courier New" panose="02070309020205020404" pitchFamily="49" charset="0"/>
+              </a:rPr>
+              <a:t>Repository</a:t>
+            </a:r>
+            <a:r>
+              <a:rPr lang="zh-TW" altLang="en-US" sz="1400" dirty="0">
+                <a:solidFill>
+                  <a:schemeClr val="bg1"/>
+                </a:solidFill>
+                <a:latin typeface="Courier New" panose="02070309020205020404" pitchFamily="49" charset="0"/>
+                <a:cs typeface="Courier New" panose="02070309020205020404" pitchFamily="49" charset="0"/>
+              </a:rPr>
+              <a:t>，依照下列指令設定在這個目錄下的資料要推送到遠端的節點</a:t>
+            </a:r>
+            <a:r>
+              <a:rPr lang="en-US" altLang="zh-TW" sz="1400" dirty="0">
+                <a:solidFill>
+                  <a:schemeClr val="bg1"/>
+                </a:solidFill>
+                <a:latin typeface="Courier New" panose="02070309020205020404" pitchFamily="49" charset="0"/>
+                <a:cs typeface="Courier New" panose="02070309020205020404" pitchFamily="49" charset="0"/>
+              </a:rPr>
+              <a:t>(URL)</a:t>
+            </a:r>
+            <a:r>
+              <a:rPr lang="zh-TW" altLang="en-US" sz="1400" dirty="0">
+                <a:solidFill>
+                  <a:schemeClr val="bg1"/>
+                </a:solidFill>
+                <a:latin typeface="Courier New" panose="02070309020205020404" pitchFamily="49" charset="0"/>
+                <a:cs typeface="Courier New" panose="02070309020205020404" pitchFamily="49" charset="0"/>
+              </a:rPr>
+              <a:t>，以上述所建立的遠端倉庫為例</a:t>
+            </a:r>
+            <a:endParaRPr lang="zh-TW" altLang="en-US" sz="1400" dirty="0">
+              <a:solidFill>
+                <a:srgbClr val="00FF00"/>
+              </a:solidFill>
+              <a:latin typeface="Courier New" panose="02070309020205020404" pitchFamily="49" charset="0"/>
+              <a:cs typeface="Courier New" panose="02070309020205020404" pitchFamily="49" charset="0"/>
+            </a:endParaRPr>
+          </a:p>
+        </p:txBody>
+      </p:sp>
+      <p:sp>
+        <p:nvSpPr>
+          <p:cNvPr id="5" name="內容版面配置區 2">
+            <a:extLst>
+              <a:ext uri="{FF2B5EF4-FFF2-40B4-BE49-F238E27FC236}">
+                <a16:creationId xmlns:a16="http://schemas.microsoft.com/office/drawing/2014/main" id="{48591BF2-A41E-8B54-FABA-AF4712BFC073}"/>
+              </a:ext>
+            </a:extLst>
+          </p:cNvPr>
+          <p:cNvSpPr txBox="1">
+            <a:spLocks/>
+          </p:cNvSpPr>
+          <p:nvPr/>
+        </p:nvSpPr>
+        <p:spPr>
+          <a:xfrm>
+            <a:off x="1340358" y="2427667"/>
+            <a:ext cx="3966747" cy="442048"/>
+          </a:xfrm>
+          <a:prstGeom prst="rect">
+            <a:avLst/>
+          </a:prstGeom>
+        </p:spPr>
+        <p:txBody>
+          <a:bodyPr vert="horz" lIns="91440" tIns="45720" rIns="91440" bIns="45720" rtlCol="0" anchor="ctr" anchorCtr="0">
+            <a:normAutofit/>
+          </a:bodyPr>
+          <a:lstStyle>
+            <a:lvl1pPr marL="228600" indent="-228600" algn="l" defTabSz="914400" rtl="0" eaLnBrk="1" latinLnBrk="0" hangingPunct="1">
+              <a:lnSpc>
+                <a:spcPct val="120000"/>
+              </a:lnSpc>
+              <a:spcBef>
+                <a:spcPts val="1000"/>
+              </a:spcBef>
+              <a:buSzPct val="87000"/>
+              <a:buFont typeface="Arial" panose="020B0604020202020204" pitchFamily="34" charset="0"/>
+              <a:buChar char="•"/>
+              <a:defRPr sz="2000" kern="1200">
+                <a:solidFill>
+                  <a:schemeClr val="tx1"/>
+                </a:solidFill>
+                <a:latin typeface="+mn-lt"/>
+                <a:ea typeface="+mn-ea"/>
+                <a:cs typeface="+mn-cs"/>
+              </a:defRPr>
+            </a:lvl1pPr>
+            <a:lvl2pPr marL="493776" indent="-228600" algn="l" defTabSz="914400" rtl="0" eaLnBrk="1" latinLnBrk="0" hangingPunct="1">
+              <a:lnSpc>
+                <a:spcPct val="120000"/>
+              </a:lnSpc>
+              <a:spcBef>
+                <a:spcPts val="500"/>
+              </a:spcBef>
+              <a:buSzPct val="87000"/>
+              <a:buFont typeface="Arial" panose="020B0604020202020204" pitchFamily="34" charset="0"/>
+              <a:buChar char="•"/>
+              <a:defRPr sz="1800" kern="1200">
+                <a:solidFill>
+                  <a:schemeClr val="tx1"/>
+                </a:solidFill>
+                <a:latin typeface="+mn-lt"/>
+                <a:ea typeface="+mn-ea"/>
+                <a:cs typeface="+mn-cs"/>
+              </a:defRPr>
+            </a:lvl2pPr>
+            <a:lvl3pPr marL="731520" indent="-228600" algn="l" defTabSz="914400" rtl="0" eaLnBrk="1" latinLnBrk="0" hangingPunct="1">
+              <a:lnSpc>
+                <a:spcPct val="120000"/>
+              </a:lnSpc>
+              <a:spcBef>
+                <a:spcPts val="500"/>
+              </a:spcBef>
+              <a:buSzPct val="87000"/>
+              <a:buFont typeface="Arial" panose="020B0604020202020204" pitchFamily="34" charset="0"/>
+              <a:buChar char="•"/>
+              <a:defRPr sz="1600" kern="1200">
+                <a:solidFill>
+                  <a:schemeClr val="tx1"/>
+                </a:solidFill>
+                <a:latin typeface="+mn-lt"/>
+                <a:ea typeface="+mn-ea"/>
+                <a:cs typeface="+mn-cs"/>
+              </a:defRPr>
+            </a:lvl3pPr>
+            <a:lvl4pPr marL="1051560" indent="-285750" algn="l" defTabSz="914400" rtl="0" eaLnBrk="1" latinLnBrk="0" hangingPunct="1">
+              <a:lnSpc>
+                <a:spcPct val="120000"/>
+              </a:lnSpc>
+              <a:spcBef>
+                <a:spcPts val="500"/>
+              </a:spcBef>
+              <a:buSzPct val="87000"/>
+              <a:buFont typeface="Arial" panose="020B0604020202020204" pitchFamily="34" charset="0"/>
+              <a:buChar char="•"/>
+              <a:defRPr sz="1400" kern="1200">
+                <a:solidFill>
+                  <a:schemeClr val="tx1"/>
+                </a:solidFill>
+                <a:latin typeface="+mn-lt"/>
+                <a:ea typeface="+mn-ea"/>
+                <a:cs typeface="+mn-cs"/>
+              </a:defRPr>
+            </a:lvl4pPr>
+            <a:lvl5pPr marL="1298448" indent="-228600" algn="l" defTabSz="914400" rtl="0" eaLnBrk="1" latinLnBrk="0" hangingPunct="1">
+              <a:lnSpc>
+                <a:spcPct val="120000"/>
+              </a:lnSpc>
+              <a:spcBef>
+                <a:spcPts val="500"/>
+              </a:spcBef>
+              <a:buSzPct val="87000"/>
+              <a:buFont typeface="Arial" panose="020B0604020202020204" pitchFamily="34" charset="0"/>
+              <a:buChar char="•"/>
+              <a:defRPr sz="1400" kern="1200">
+                <a:solidFill>
+                  <a:schemeClr val="tx1"/>
+                </a:solidFill>
+                <a:latin typeface="+mn-lt"/>
+                <a:ea typeface="+mn-ea"/>
+                <a:cs typeface="+mn-cs"/>
+              </a:defRPr>
+            </a:lvl5pPr>
+            <a:lvl6pPr marL="2514600" indent="-228600" algn="l" defTabSz="914400" rtl="0" eaLnBrk="1" latinLnBrk="0" hangingPunct="1">
+              <a:lnSpc>
+                <a:spcPct val="90000"/>
+              </a:lnSpc>
+              <a:spcBef>
+                <a:spcPts val="500"/>
+              </a:spcBef>
+              <a:buFont typeface="Arial" panose="020B0604020202020204" pitchFamily="34" charset="0"/>
+              <a:buChar char="•"/>
+              <a:defRPr sz="1800" kern="1200">
+                <a:solidFill>
+                  <a:schemeClr val="tx1"/>
+                </a:solidFill>
+                <a:latin typeface="+mn-lt"/>
+                <a:ea typeface="+mn-ea"/>
+                <a:cs typeface="+mn-cs"/>
+              </a:defRPr>
+            </a:lvl6pPr>
+            <a:lvl7pPr marL="2971800" indent="-228600" algn="l" defTabSz="914400" rtl="0" eaLnBrk="1" latinLnBrk="0" hangingPunct="1">
+              <a:lnSpc>
+                <a:spcPct val="90000"/>
+              </a:lnSpc>
+              <a:spcBef>
+                <a:spcPts val="500"/>
+              </a:spcBef>
+              <a:buFont typeface="Arial" panose="020B0604020202020204" pitchFamily="34" charset="0"/>
+              <a:buChar char="•"/>
+              <a:defRPr sz="1800" kern="1200">
+                <a:solidFill>
+                  <a:schemeClr val="tx1"/>
+                </a:solidFill>
+                <a:latin typeface="+mn-lt"/>
+                <a:ea typeface="+mn-ea"/>
+                <a:cs typeface="+mn-cs"/>
+              </a:defRPr>
+            </a:lvl7pPr>
+            <a:lvl8pPr marL="3429000" indent="-228600" algn="l" defTabSz="914400" rtl="0" eaLnBrk="1" latinLnBrk="0" hangingPunct="1">
+              <a:lnSpc>
+                <a:spcPct val="90000"/>
+              </a:lnSpc>
+              <a:spcBef>
+                <a:spcPts val="500"/>
+              </a:spcBef>
+              <a:buFont typeface="Arial" panose="020B0604020202020204" pitchFamily="34" charset="0"/>
+              <a:buChar char="•"/>
+              <a:defRPr sz="1800" kern="1200">
+                <a:solidFill>
+                  <a:schemeClr val="tx1"/>
+                </a:solidFill>
+                <a:latin typeface="+mn-lt"/>
+                <a:ea typeface="+mn-ea"/>
+                <a:cs typeface="+mn-cs"/>
+              </a:defRPr>
+            </a:lvl8pPr>
+            <a:lvl9pPr marL="3886200" indent="-228600" algn="l" defTabSz="914400" rtl="0" eaLnBrk="1" latinLnBrk="0" hangingPunct="1">
+              <a:lnSpc>
+                <a:spcPct val="90000"/>
+              </a:lnSpc>
+              <a:spcBef>
+                <a:spcPts val="500"/>
+              </a:spcBef>
+              <a:buFont typeface="Arial" panose="020B0604020202020204" pitchFamily="34" charset="0"/>
+              <a:buChar char="•"/>
+              <a:defRPr sz="1800" kern="1200">
+                <a:solidFill>
+                  <a:schemeClr val="tx1"/>
+                </a:solidFill>
+                <a:latin typeface="+mn-lt"/>
+                <a:ea typeface="+mn-ea"/>
+                <a:cs typeface="+mn-cs"/>
+              </a:defRPr>
+            </a:lvl9pPr>
+          </a:lstStyle>
+          <a:p>
+            <a:pPr>
+              <a:buFont typeface="Wingdings" panose="05000000000000000000" pitchFamily="2" charset="2"/>
+              <a:buChar char="Ø"/>
+            </a:pPr>
+            <a:r>
+              <a:rPr lang="zh-TW" altLang="en-US" sz="1600" dirty="0">
+                <a:solidFill>
+                  <a:schemeClr val="bg1"/>
+                </a:solidFill>
+              </a:rPr>
+              <a:t>設定</a:t>
+            </a:r>
+            <a:r>
+              <a:rPr lang="en-US" altLang="zh-TW" sz="1600" dirty="0">
+                <a:solidFill>
+                  <a:schemeClr val="bg1"/>
+                </a:solidFill>
+              </a:rPr>
+              <a:t>Remote Git Repository</a:t>
+            </a:r>
+            <a:r>
+              <a:rPr lang="zh-TW" altLang="en-US" sz="1600" dirty="0">
+                <a:solidFill>
+                  <a:schemeClr val="bg1"/>
+                </a:solidFill>
+              </a:rPr>
+              <a:t>遠端節點</a:t>
+            </a:r>
+          </a:p>
+        </p:txBody>
+      </p:sp>
+      <p:sp>
+        <p:nvSpPr>
+          <p:cNvPr id="11" name="文字方塊 10">
+            <a:extLst>
+              <a:ext uri="{FF2B5EF4-FFF2-40B4-BE49-F238E27FC236}">
+                <a16:creationId xmlns:a16="http://schemas.microsoft.com/office/drawing/2014/main" id="{FF3E1B16-D632-8406-5F52-FD2E06F7C63F}"/>
+              </a:ext>
+            </a:extLst>
+          </p:cNvPr>
+          <p:cNvSpPr txBox="1"/>
+          <p:nvPr/>
+        </p:nvSpPr>
+        <p:spPr>
+          <a:xfrm>
+            <a:off x="2034847" y="3910521"/>
+            <a:ext cx="6669882" cy="276999"/>
+          </a:xfrm>
+          <a:prstGeom prst="rect">
+            <a:avLst/>
+          </a:prstGeom>
+          <a:noFill/>
+        </p:spPr>
+        <p:txBody>
+          <a:bodyPr wrap="square" rtlCol="0">
+            <a:spAutoFit/>
+          </a:bodyPr>
+          <a:lstStyle/>
+          <a:p>
+            <a:r>
+              <a:rPr lang="en-US" altLang="zh-TW" sz="1200" dirty="0">
+                <a:solidFill>
+                  <a:schemeClr val="bg1"/>
+                </a:solidFill>
+                <a:latin typeface="Courier New" panose="02070309020205020404" pitchFamily="49" charset="0"/>
+                <a:cs typeface="Courier New" panose="02070309020205020404" pitchFamily="49" charset="0"/>
+              </a:rPr>
+              <a:t>$</a:t>
+            </a:r>
+            <a:r>
+              <a:rPr lang="en-US" altLang="zh-TW" sz="1200" dirty="0">
+                <a:solidFill>
+                  <a:srgbClr val="00FF00"/>
+                </a:solidFill>
+                <a:latin typeface="Courier New" panose="02070309020205020404" pitchFamily="49" charset="0"/>
+                <a:cs typeface="Courier New" panose="02070309020205020404" pitchFamily="49" charset="0"/>
+              </a:rPr>
+              <a:t> git remote add origin d:/Daniel_SIDE_PROJECT/TestDoc/RemoteGit.git </a:t>
+            </a:r>
+            <a:endParaRPr lang="en-US" altLang="zh-TW" sz="1200" dirty="0">
+              <a:solidFill>
+                <a:schemeClr val="bg1">
+                  <a:lumMod val="65000"/>
+                </a:schemeClr>
+              </a:solidFill>
+              <a:latin typeface="Courier New" panose="02070309020205020404" pitchFamily="49" charset="0"/>
+              <a:cs typeface="Courier New" panose="02070309020205020404" pitchFamily="49" charset="0"/>
+            </a:endParaRPr>
+          </a:p>
+        </p:txBody>
+      </p:sp>
+      <p:sp>
+        <p:nvSpPr>
+          <p:cNvPr id="6" name="內容版面配置區 2">
+            <a:extLst>
+              <a:ext uri="{FF2B5EF4-FFF2-40B4-BE49-F238E27FC236}">
+                <a16:creationId xmlns:a16="http://schemas.microsoft.com/office/drawing/2014/main" id="{2E92DE7C-2642-7584-AC47-BA33A34DD7E0}"/>
+              </a:ext>
+            </a:extLst>
+          </p:cNvPr>
+          <p:cNvSpPr txBox="1">
+            <a:spLocks/>
+          </p:cNvSpPr>
+          <p:nvPr/>
+        </p:nvSpPr>
+        <p:spPr>
+          <a:xfrm>
+            <a:off x="1340359" y="4278510"/>
+            <a:ext cx="3410935" cy="339419"/>
+          </a:xfrm>
+          <a:prstGeom prst="rect">
+            <a:avLst/>
+          </a:prstGeom>
+        </p:spPr>
+        <p:txBody>
+          <a:bodyPr vert="horz" lIns="91440" tIns="45720" rIns="91440" bIns="45720" rtlCol="0" anchor="ctr" anchorCtr="0">
+            <a:normAutofit lnSpcReduction="10000"/>
+          </a:bodyPr>
+          <a:lstStyle>
+            <a:lvl1pPr marL="228600" indent="-228600" algn="l" defTabSz="914400" rtl="0" eaLnBrk="1" latinLnBrk="0" hangingPunct="1">
+              <a:lnSpc>
+                <a:spcPct val="120000"/>
+              </a:lnSpc>
+              <a:spcBef>
+                <a:spcPts val="1000"/>
+              </a:spcBef>
+              <a:buSzPct val="87000"/>
+              <a:buFont typeface="Arial" panose="020B0604020202020204" pitchFamily="34" charset="0"/>
+              <a:buChar char="•"/>
+              <a:defRPr sz="2000" kern="1200">
+                <a:solidFill>
+                  <a:schemeClr val="tx1"/>
+                </a:solidFill>
+                <a:latin typeface="+mn-lt"/>
+                <a:ea typeface="+mn-ea"/>
+                <a:cs typeface="+mn-cs"/>
+              </a:defRPr>
+            </a:lvl1pPr>
+            <a:lvl2pPr marL="493776" indent="-228600" algn="l" defTabSz="914400" rtl="0" eaLnBrk="1" latinLnBrk="0" hangingPunct="1">
+              <a:lnSpc>
+                <a:spcPct val="120000"/>
+              </a:lnSpc>
+              <a:spcBef>
+                <a:spcPts val="500"/>
+              </a:spcBef>
+              <a:buSzPct val="87000"/>
+              <a:buFont typeface="Arial" panose="020B0604020202020204" pitchFamily="34" charset="0"/>
+              <a:buChar char="•"/>
+              <a:defRPr sz="1800" kern="1200">
+                <a:solidFill>
+                  <a:schemeClr val="tx1"/>
+                </a:solidFill>
+                <a:latin typeface="+mn-lt"/>
+                <a:ea typeface="+mn-ea"/>
+                <a:cs typeface="+mn-cs"/>
+              </a:defRPr>
+            </a:lvl2pPr>
+            <a:lvl3pPr marL="731520" indent="-228600" algn="l" defTabSz="914400" rtl="0" eaLnBrk="1" latinLnBrk="0" hangingPunct="1">
+              <a:lnSpc>
+                <a:spcPct val="120000"/>
+              </a:lnSpc>
+              <a:spcBef>
+                <a:spcPts val="500"/>
+              </a:spcBef>
+              <a:buSzPct val="87000"/>
+              <a:buFont typeface="Arial" panose="020B0604020202020204" pitchFamily="34" charset="0"/>
+              <a:buChar char="•"/>
+              <a:defRPr sz="1600" kern="1200">
+                <a:solidFill>
+                  <a:schemeClr val="tx1"/>
+                </a:solidFill>
+                <a:latin typeface="+mn-lt"/>
+                <a:ea typeface="+mn-ea"/>
+                <a:cs typeface="+mn-cs"/>
+              </a:defRPr>
+            </a:lvl3pPr>
+            <a:lvl4pPr marL="1051560" indent="-285750" algn="l" defTabSz="914400" rtl="0" eaLnBrk="1" latinLnBrk="0" hangingPunct="1">
+              <a:lnSpc>
+                <a:spcPct val="120000"/>
+              </a:lnSpc>
+              <a:spcBef>
+                <a:spcPts val="500"/>
+              </a:spcBef>
+              <a:buSzPct val="87000"/>
+              <a:buFont typeface="Arial" panose="020B0604020202020204" pitchFamily="34" charset="0"/>
+              <a:buChar char="•"/>
+              <a:defRPr sz="1400" kern="1200">
+                <a:solidFill>
+                  <a:schemeClr val="tx1"/>
+                </a:solidFill>
+                <a:latin typeface="+mn-lt"/>
+                <a:ea typeface="+mn-ea"/>
+                <a:cs typeface="+mn-cs"/>
+              </a:defRPr>
+            </a:lvl4pPr>
+            <a:lvl5pPr marL="1298448" indent="-228600" algn="l" defTabSz="914400" rtl="0" eaLnBrk="1" latinLnBrk="0" hangingPunct="1">
+              <a:lnSpc>
+                <a:spcPct val="120000"/>
+              </a:lnSpc>
+              <a:spcBef>
+                <a:spcPts val="500"/>
+              </a:spcBef>
+              <a:buSzPct val="87000"/>
+              <a:buFont typeface="Arial" panose="020B0604020202020204" pitchFamily="34" charset="0"/>
+              <a:buChar char="•"/>
+              <a:defRPr sz="1400" kern="1200">
+                <a:solidFill>
+                  <a:schemeClr val="tx1"/>
+                </a:solidFill>
+                <a:latin typeface="+mn-lt"/>
+                <a:ea typeface="+mn-ea"/>
+                <a:cs typeface="+mn-cs"/>
+              </a:defRPr>
+            </a:lvl5pPr>
+            <a:lvl6pPr marL="2514600" indent="-228600" algn="l" defTabSz="914400" rtl="0" eaLnBrk="1" latinLnBrk="0" hangingPunct="1">
+              <a:lnSpc>
+                <a:spcPct val="90000"/>
+              </a:lnSpc>
+              <a:spcBef>
+                <a:spcPts val="500"/>
+              </a:spcBef>
+              <a:buFont typeface="Arial" panose="020B0604020202020204" pitchFamily="34" charset="0"/>
+              <a:buChar char="•"/>
+              <a:defRPr sz="1800" kern="1200">
+                <a:solidFill>
+                  <a:schemeClr val="tx1"/>
+                </a:solidFill>
+                <a:latin typeface="+mn-lt"/>
+                <a:ea typeface="+mn-ea"/>
+                <a:cs typeface="+mn-cs"/>
+              </a:defRPr>
+            </a:lvl6pPr>
+            <a:lvl7pPr marL="2971800" indent="-228600" algn="l" defTabSz="914400" rtl="0" eaLnBrk="1" latinLnBrk="0" hangingPunct="1">
+              <a:lnSpc>
+                <a:spcPct val="90000"/>
+              </a:lnSpc>
+              <a:spcBef>
+                <a:spcPts val="500"/>
+              </a:spcBef>
+              <a:buFont typeface="Arial" panose="020B0604020202020204" pitchFamily="34" charset="0"/>
+              <a:buChar char="•"/>
+              <a:defRPr sz="1800" kern="1200">
+                <a:solidFill>
+                  <a:schemeClr val="tx1"/>
+                </a:solidFill>
+                <a:latin typeface="+mn-lt"/>
+                <a:ea typeface="+mn-ea"/>
+                <a:cs typeface="+mn-cs"/>
+              </a:defRPr>
+            </a:lvl7pPr>
+            <a:lvl8pPr marL="3429000" indent="-228600" algn="l" defTabSz="914400" rtl="0" eaLnBrk="1" latinLnBrk="0" hangingPunct="1">
+              <a:lnSpc>
+                <a:spcPct val="90000"/>
+              </a:lnSpc>
+              <a:spcBef>
+                <a:spcPts val="500"/>
+              </a:spcBef>
+              <a:buFont typeface="Arial" panose="020B0604020202020204" pitchFamily="34" charset="0"/>
+              <a:buChar char="•"/>
+              <a:defRPr sz="1800" kern="1200">
+                <a:solidFill>
+                  <a:schemeClr val="tx1"/>
+                </a:solidFill>
+                <a:latin typeface="+mn-lt"/>
+                <a:ea typeface="+mn-ea"/>
+                <a:cs typeface="+mn-cs"/>
+              </a:defRPr>
+            </a:lvl8pPr>
+            <a:lvl9pPr marL="3886200" indent="-228600" algn="l" defTabSz="914400" rtl="0" eaLnBrk="1" latinLnBrk="0" hangingPunct="1">
+              <a:lnSpc>
+                <a:spcPct val="90000"/>
+              </a:lnSpc>
+              <a:spcBef>
+                <a:spcPts val="500"/>
+              </a:spcBef>
+              <a:buFont typeface="Arial" panose="020B0604020202020204" pitchFamily="34" charset="0"/>
+              <a:buChar char="•"/>
+              <a:defRPr sz="1800" kern="1200">
+                <a:solidFill>
+                  <a:schemeClr val="tx1"/>
+                </a:solidFill>
+                <a:latin typeface="+mn-lt"/>
+                <a:ea typeface="+mn-ea"/>
+                <a:cs typeface="+mn-cs"/>
+              </a:defRPr>
+            </a:lvl9pPr>
+          </a:lstStyle>
+          <a:p>
+            <a:pPr>
+              <a:buFont typeface="Wingdings" panose="05000000000000000000" pitchFamily="2" charset="2"/>
+              <a:buChar char="Ø"/>
+            </a:pPr>
+            <a:r>
+              <a:rPr lang="zh-TW" altLang="en-US" sz="1600" dirty="0">
+                <a:solidFill>
+                  <a:schemeClr val="bg1"/>
+                </a:solidFill>
+              </a:rPr>
+              <a:t>確認遠端節點</a:t>
+            </a:r>
+            <a:r>
+              <a:rPr lang="en-US" altLang="zh-TW" sz="1600" dirty="0">
+                <a:solidFill>
+                  <a:schemeClr val="bg1"/>
+                </a:solidFill>
+              </a:rPr>
+              <a:t>(URL)</a:t>
+            </a:r>
+            <a:r>
+              <a:rPr lang="zh-TW" altLang="en-US" sz="1600" dirty="0">
+                <a:solidFill>
+                  <a:schemeClr val="bg1"/>
+                </a:solidFill>
+              </a:rPr>
+              <a:t>設定狀態</a:t>
+            </a:r>
+          </a:p>
+        </p:txBody>
+      </p:sp>
+      <p:sp>
+        <p:nvSpPr>
+          <p:cNvPr id="7" name="文字方塊 6">
+            <a:extLst>
+              <a:ext uri="{FF2B5EF4-FFF2-40B4-BE49-F238E27FC236}">
+                <a16:creationId xmlns:a16="http://schemas.microsoft.com/office/drawing/2014/main" id="{7775DD89-B1BE-5C84-CA4C-68F9908F9E0B}"/>
+              </a:ext>
+            </a:extLst>
+          </p:cNvPr>
+          <p:cNvSpPr txBox="1"/>
+          <p:nvPr/>
+        </p:nvSpPr>
+        <p:spPr>
+          <a:xfrm>
+            <a:off x="2034847" y="3655591"/>
+            <a:ext cx="5567224" cy="276999"/>
+          </a:xfrm>
+          <a:prstGeom prst="rect">
+            <a:avLst/>
+          </a:prstGeom>
+          <a:noFill/>
+        </p:spPr>
+        <p:txBody>
+          <a:bodyPr wrap="square" rtlCol="0">
+            <a:spAutoFit/>
+          </a:bodyPr>
+          <a:lstStyle/>
+          <a:p>
+            <a:r>
+              <a:rPr lang="zh-TW" altLang="en-US" sz="1200" dirty="0">
+                <a:solidFill>
+                  <a:schemeClr val="bg1">
+                    <a:lumMod val="65000"/>
+                  </a:schemeClr>
+                </a:solidFill>
+                <a:latin typeface="Courier New" panose="02070309020205020404" pitchFamily="49" charset="0"/>
+                <a:cs typeface="Courier New" panose="02070309020205020404" pitchFamily="49" charset="0"/>
+              </a:rPr>
+              <a:t>遠端倉庫路徑</a:t>
+            </a:r>
+            <a:r>
+              <a:rPr lang="en-US" altLang="zh-TW" sz="1200" dirty="0">
+                <a:solidFill>
+                  <a:schemeClr val="bg1">
+                    <a:lumMod val="65000"/>
+                  </a:schemeClr>
+                </a:solidFill>
+                <a:latin typeface="Courier New" panose="02070309020205020404" pitchFamily="49" charset="0"/>
+                <a:cs typeface="Courier New" panose="02070309020205020404" pitchFamily="49" charset="0"/>
+              </a:rPr>
+              <a:t>:</a:t>
+            </a:r>
+            <a:r>
+              <a:rPr lang="zh-TW" altLang="en-US" sz="1200" dirty="0">
+                <a:solidFill>
+                  <a:schemeClr val="bg1">
+                    <a:lumMod val="65000"/>
+                  </a:schemeClr>
+                </a:solidFill>
+                <a:latin typeface="Courier New" panose="02070309020205020404" pitchFamily="49" charset="0"/>
+                <a:cs typeface="Courier New" panose="02070309020205020404" pitchFamily="49" charset="0"/>
+              </a:rPr>
+              <a:t> </a:t>
+            </a:r>
+            <a:r>
+              <a:rPr lang="en-US" altLang="zh-TW" sz="1200" dirty="0">
+                <a:solidFill>
+                  <a:schemeClr val="bg1">
+                    <a:lumMod val="65000"/>
+                  </a:schemeClr>
+                </a:solidFill>
+                <a:latin typeface="Courier New" panose="02070309020205020404" pitchFamily="49" charset="0"/>
+                <a:cs typeface="Courier New" panose="02070309020205020404" pitchFamily="49" charset="0"/>
+              </a:rPr>
+              <a:t>d:/Daniel_SIDE_PROJECT/TestDoc/RemoteGit.git</a:t>
+            </a:r>
+          </a:p>
+        </p:txBody>
+      </p:sp>
+      <p:sp>
+        <p:nvSpPr>
+          <p:cNvPr id="8" name="文字方塊 7">
+            <a:extLst>
+              <a:ext uri="{FF2B5EF4-FFF2-40B4-BE49-F238E27FC236}">
+                <a16:creationId xmlns:a16="http://schemas.microsoft.com/office/drawing/2014/main" id="{EB3A339E-327F-8420-174D-26DFB1710A0A}"/>
+              </a:ext>
+            </a:extLst>
+          </p:cNvPr>
+          <p:cNvSpPr txBox="1"/>
+          <p:nvPr/>
+        </p:nvSpPr>
+        <p:spPr>
+          <a:xfrm>
+            <a:off x="1717954" y="4601818"/>
+            <a:ext cx="4873346" cy="387927"/>
+          </a:xfrm>
+          <a:prstGeom prst="rect">
+            <a:avLst/>
+          </a:prstGeom>
+          <a:noFill/>
+        </p:spPr>
+        <p:txBody>
+          <a:bodyPr wrap="square" rtlCol="0">
+            <a:spAutoFit/>
+          </a:bodyPr>
+          <a:lstStyle/>
+          <a:p>
+            <a:pPr>
+              <a:lnSpc>
+                <a:spcPct val="150000"/>
+              </a:lnSpc>
+            </a:pPr>
+            <a:r>
+              <a:rPr lang="zh-TW" altLang="en-US" sz="1400" dirty="0">
+                <a:solidFill>
+                  <a:schemeClr val="bg1"/>
+                </a:solidFill>
+                <a:latin typeface="Courier New" panose="02070309020205020404" pitchFamily="49" charset="0"/>
+                <a:cs typeface="Courier New" panose="02070309020205020404" pitchFamily="49" charset="0"/>
+              </a:rPr>
+              <a:t>完成上述的</a:t>
+            </a:r>
+            <a:r>
+              <a:rPr lang="en-US" altLang="zh-TW" sz="1400" dirty="0">
+                <a:solidFill>
+                  <a:schemeClr val="bg1"/>
+                </a:solidFill>
+                <a:latin typeface="Courier New" panose="02070309020205020404" pitchFamily="49" charset="0"/>
+                <a:cs typeface="Courier New" panose="02070309020205020404" pitchFamily="49" charset="0"/>
+              </a:rPr>
+              <a:t>URL</a:t>
+            </a:r>
+            <a:r>
+              <a:rPr lang="zh-TW" altLang="en-US" sz="1400" dirty="0">
+                <a:solidFill>
+                  <a:schemeClr val="bg1"/>
+                </a:solidFill>
+                <a:latin typeface="Courier New" panose="02070309020205020404" pitchFamily="49" charset="0"/>
+                <a:cs typeface="Courier New" panose="02070309020205020404" pitchFamily="49" charset="0"/>
+              </a:rPr>
+              <a:t>推送節點設定後，下達以下指令確認</a:t>
+            </a:r>
+            <a:endParaRPr lang="zh-TW" altLang="en-US" sz="1400" dirty="0">
+              <a:solidFill>
+                <a:srgbClr val="00FF00"/>
+              </a:solidFill>
+              <a:latin typeface="Courier New" panose="02070309020205020404" pitchFamily="49" charset="0"/>
+              <a:cs typeface="Courier New" panose="02070309020205020404" pitchFamily="49" charset="0"/>
+            </a:endParaRPr>
+          </a:p>
+        </p:txBody>
+      </p:sp>
+      <p:sp>
+        <p:nvSpPr>
+          <p:cNvPr id="9" name="文字方塊 8">
+            <a:extLst>
+              <a:ext uri="{FF2B5EF4-FFF2-40B4-BE49-F238E27FC236}">
+                <a16:creationId xmlns:a16="http://schemas.microsoft.com/office/drawing/2014/main" id="{8C4A3CA1-8E68-3F2E-0DDA-B538278B2D93}"/>
+              </a:ext>
+            </a:extLst>
+          </p:cNvPr>
+          <p:cNvSpPr txBox="1"/>
+          <p:nvPr/>
+        </p:nvSpPr>
+        <p:spPr>
+          <a:xfrm>
+            <a:off x="2034847" y="5103817"/>
+            <a:ext cx="6669882" cy="1015663"/>
+          </a:xfrm>
+          <a:prstGeom prst="rect">
+            <a:avLst/>
+          </a:prstGeom>
+          <a:noFill/>
+        </p:spPr>
+        <p:txBody>
+          <a:bodyPr wrap="square" rtlCol="0">
+            <a:spAutoFit/>
+          </a:bodyPr>
+          <a:lstStyle/>
+          <a:p>
+            <a:r>
+              <a:rPr lang="en-US" altLang="zh-TW" sz="1200" dirty="0">
+                <a:solidFill>
+                  <a:srgbClr val="00FF00"/>
+                </a:solidFill>
+                <a:latin typeface="Courier New" panose="02070309020205020404" pitchFamily="49" charset="0"/>
+                <a:cs typeface="Courier New" panose="02070309020205020404" pitchFamily="49" charset="0"/>
+              </a:rPr>
+              <a:t>tengc@MSI </a:t>
+            </a:r>
+            <a:r>
+              <a:rPr lang="en-US" altLang="zh-TW" sz="1200" dirty="0">
+                <a:solidFill>
+                  <a:srgbClr val="FF00FF"/>
+                </a:solidFill>
+                <a:latin typeface="Courier New" panose="02070309020205020404" pitchFamily="49" charset="0"/>
+                <a:cs typeface="Courier New" panose="02070309020205020404" pitchFamily="49" charset="0"/>
+              </a:rPr>
+              <a:t>MINGW64</a:t>
+            </a:r>
+            <a:r>
+              <a:rPr lang="en-US" altLang="zh-TW" sz="1200" dirty="0">
+                <a:solidFill>
+                  <a:srgbClr val="00FF00"/>
+                </a:solidFill>
+                <a:latin typeface="Courier New" panose="02070309020205020404" pitchFamily="49" charset="0"/>
+                <a:cs typeface="Courier New" panose="02070309020205020404" pitchFamily="49" charset="0"/>
+              </a:rPr>
+              <a:t> </a:t>
+            </a:r>
+            <a:r>
+              <a:rPr lang="en-US" altLang="zh-TW" sz="1200" dirty="0">
+                <a:solidFill>
+                  <a:srgbClr val="FFC000"/>
+                </a:solidFill>
+                <a:latin typeface="Courier New" panose="02070309020205020404" pitchFamily="49" charset="0"/>
+                <a:cs typeface="Courier New" panose="02070309020205020404" pitchFamily="49" charset="0"/>
+              </a:rPr>
+              <a:t>/d/Daniel_SIDE_PROJECT/TestDoc/LocalGit </a:t>
+            </a:r>
+            <a:r>
+              <a:rPr lang="en-US" altLang="zh-TW" sz="1200" dirty="0">
+                <a:solidFill>
+                  <a:srgbClr val="33CCCC"/>
+                </a:solidFill>
+                <a:latin typeface="Courier New" panose="02070309020205020404" pitchFamily="49" charset="0"/>
+                <a:cs typeface="Courier New" panose="02070309020205020404" pitchFamily="49" charset="0"/>
+              </a:rPr>
+              <a:t>(master)</a:t>
+            </a:r>
+          </a:p>
+          <a:p>
+            <a:r>
+              <a:rPr lang="en-US" altLang="zh-TW" sz="1200" dirty="0">
+                <a:solidFill>
+                  <a:schemeClr val="bg1"/>
+                </a:solidFill>
+                <a:latin typeface="Courier New" panose="02070309020205020404" pitchFamily="49" charset="0"/>
+                <a:cs typeface="Courier New" panose="02070309020205020404" pitchFamily="49" charset="0"/>
+              </a:rPr>
+              <a:t>$</a:t>
+            </a:r>
+            <a:r>
+              <a:rPr lang="en-US" altLang="zh-TW" sz="1200" dirty="0">
+                <a:solidFill>
+                  <a:srgbClr val="00FF00"/>
+                </a:solidFill>
+                <a:latin typeface="Courier New" panose="02070309020205020404" pitchFamily="49" charset="0"/>
+                <a:cs typeface="Courier New" panose="02070309020205020404" pitchFamily="49" charset="0"/>
+              </a:rPr>
+              <a:t> git remote –v</a:t>
+            </a:r>
+          </a:p>
+          <a:p>
+            <a:r>
+              <a:rPr lang="en-US" altLang="zh-TW" sz="1200" dirty="0">
+                <a:solidFill>
+                  <a:schemeClr val="bg1"/>
+                </a:solidFill>
+                <a:latin typeface="Courier New" panose="02070309020205020404" pitchFamily="49" charset="0"/>
+                <a:cs typeface="Courier New" panose="02070309020205020404" pitchFamily="49" charset="0"/>
+              </a:rPr>
+              <a:t>origin d:/Daniel_SIDE_PROJECT/TestDoc/RemoteGit.git (fetch)</a:t>
+            </a:r>
+          </a:p>
+          <a:p>
+            <a:r>
+              <a:rPr lang="en-US" altLang="zh-TW" sz="1200" dirty="0">
+                <a:solidFill>
+                  <a:schemeClr val="bg1"/>
+                </a:solidFill>
+                <a:latin typeface="Courier New" panose="02070309020205020404" pitchFamily="49" charset="0"/>
+                <a:cs typeface="Courier New" panose="02070309020205020404" pitchFamily="49" charset="0"/>
+              </a:rPr>
+              <a:t>origin d:/Daniel_SIDE_PROJECT/TestDoc/RemoteGit.git (push)</a:t>
+            </a:r>
+          </a:p>
+          <a:p>
+            <a:r>
+              <a:rPr lang="en-US" altLang="zh-TW" sz="1200" dirty="0">
+                <a:solidFill>
+                  <a:schemeClr val="bg1"/>
+                </a:solidFill>
+                <a:latin typeface="Courier New" panose="02070309020205020404" pitchFamily="49" charset="0"/>
+                <a:cs typeface="Courier New" panose="02070309020205020404" pitchFamily="49" charset="0"/>
+              </a:rPr>
+              <a:t>$</a:t>
+            </a:r>
+          </a:p>
+        </p:txBody>
+      </p:sp>
+      <p:sp>
+        <p:nvSpPr>
+          <p:cNvPr id="10" name="文字方塊 9">
+            <a:extLst>
+              <a:ext uri="{FF2B5EF4-FFF2-40B4-BE49-F238E27FC236}">
+                <a16:creationId xmlns:a16="http://schemas.microsoft.com/office/drawing/2014/main" id="{E06D2F73-6DEE-CD1B-1E77-99ECAC62B295}"/>
+              </a:ext>
+            </a:extLst>
+          </p:cNvPr>
+          <p:cNvSpPr txBox="1"/>
+          <p:nvPr/>
+        </p:nvSpPr>
+        <p:spPr>
+          <a:xfrm>
+            <a:off x="1717953" y="6119480"/>
+            <a:ext cx="7711797" cy="387927"/>
+          </a:xfrm>
+          <a:prstGeom prst="rect">
+            <a:avLst/>
+          </a:prstGeom>
+          <a:noFill/>
+        </p:spPr>
+        <p:txBody>
+          <a:bodyPr wrap="square" rtlCol="0">
+            <a:spAutoFit/>
+          </a:bodyPr>
+          <a:lstStyle/>
+          <a:p>
+            <a:pPr>
+              <a:lnSpc>
+                <a:spcPct val="150000"/>
+              </a:lnSpc>
+            </a:pPr>
+            <a:r>
+              <a:rPr lang="zh-TW" altLang="en-US" sz="1400" dirty="0">
+                <a:solidFill>
+                  <a:schemeClr val="bg1"/>
+                </a:solidFill>
+                <a:latin typeface="Courier New" panose="02070309020205020404" pitchFamily="49" charset="0"/>
+                <a:cs typeface="Courier New" panose="02070309020205020404" pitchFamily="49" charset="0"/>
+              </a:rPr>
+              <a:t>如成功完成推送遠端節點的設設，</a:t>
+            </a:r>
+            <a:r>
+              <a:rPr lang="en-US" altLang="zh-TW" sz="1400" dirty="0">
+                <a:solidFill>
+                  <a:schemeClr val="bg1"/>
+                </a:solidFill>
+                <a:latin typeface="Courier New" panose="02070309020205020404" pitchFamily="49" charset="0"/>
+                <a:cs typeface="Courier New" panose="02070309020205020404" pitchFamily="49" charset="0"/>
+              </a:rPr>
+              <a:t>“remote –v”</a:t>
+            </a:r>
+            <a:r>
+              <a:rPr lang="zh-TW" altLang="en-US" sz="1400" dirty="0">
+                <a:solidFill>
+                  <a:schemeClr val="bg1"/>
+                </a:solidFill>
+                <a:latin typeface="Courier New" panose="02070309020205020404" pitchFamily="49" charset="0"/>
+                <a:cs typeface="Courier New" panose="02070309020205020404" pitchFamily="49" charset="0"/>
+              </a:rPr>
+              <a:t>指令後會出現要推送的遠端</a:t>
+            </a:r>
+            <a:r>
+              <a:rPr lang="en-US" altLang="zh-TW" sz="1400" dirty="0">
+                <a:solidFill>
+                  <a:schemeClr val="bg1"/>
+                </a:solidFill>
+                <a:latin typeface="Courier New" panose="02070309020205020404" pitchFamily="49" charset="0"/>
+                <a:cs typeface="Courier New" panose="02070309020205020404" pitchFamily="49" charset="0"/>
+              </a:rPr>
+              <a:t>Git</a:t>
+            </a:r>
+            <a:r>
+              <a:rPr lang="zh-TW" altLang="en-US" sz="1400" dirty="0">
+                <a:solidFill>
+                  <a:schemeClr val="bg1"/>
+                </a:solidFill>
+                <a:latin typeface="Courier New" panose="02070309020205020404" pitchFamily="49" charset="0"/>
+                <a:cs typeface="Courier New" panose="02070309020205020404" pitchFamily="49" charset="0"/>
+              </a:rPr>
+              <a:t>倉庫路徑。</a:t>
+            </a:r>
+            <a:endParaRPr lang="zh-TW" altLang="en-US" sz="1400" dirty="0">
+              <a:solidFill>
+                <a:srgbClr val="00FF00"/>
+              </a:solidFill>
+              <a:latin typeface="Courier New" panose="02070309020205020404" pitchFamily="49" charset="0"/>
+              <a:cs typeface="Courier New" panose="02070309020205020404" pitchFamily="49" charset="0"/>
+            </a:endParaRPr>
+          </a:p>
+        </p:txBody>
+      </p:sp>
+    </p:spTree>
+    <p:extLst>
+      <p:ext uri="{BB962C8B-B14F-4D97-AF65-F5344CB8AC3E}">
+        <p14:creationId xmlns:p14="http://schemas.microsoft.com/office/powerpoint/2010/main" val="4213550928"/>
+      </p:ext>
+    </p:extLst>
+  </p:cSld>
+  <p:clrMapOvr>
+    <a:masterClrMapping/>
+  </p:clrMapOvr>
+</p:sld>
+</file>
+
+<file path=ppt/slides/slide12.xml><?xml version="1.0" encoding="utf-8"?>
 <p:sld xmlns:a="http://schemas.openxmlformats.org/drawingml/2006/main" xmlns:r="http://schemas.openxmlformats.org/officeDocument/2006/relationships" xmlns:p="http://schemas.openxmlformats.org/presentationml/2006/main">
   <p:cSld>
     <p:spTree>
@@ -12318,7 +13522,7 @@
               <a:buChar char="Ø"/>
             </a:pPr>
             <a:r>
-              <a:rPr lang="zh-TW" altLang="en-US" sz="1600">
+              <a:rPr lang="zh-TW" altLang="en-US" sz="1600" dirty="0">
                 <a:solidFill>
                   <a:schemeClr val="bg1"/>
                 </a:solidFill>

</xml_diff>

<commit_message>
Modify and add learn data to GitHub_note.pptx file
</commit_message>
<xml_diff>
--- a/GitHub_note.pptx
+++ b/GitHub_note.pptx
@@ -16,7 +16,9 @@
     <p:sldId id="264" r:id="rId10"/>
     <p:sldId id="265" r:id="rId11"/>
     <p:sldId id="267" r:id="rId12"/>
-    <p:sldId id="266" r:id="rId13"/>
+    <p:sldId id="268" r:id="rId13"/>
+    <p:sldId id="269" r:id="rId14"/>
+    <p:sldId id="266" r:id="rId15"/>
   </p:sldIdLst>
   <p:sldSz cx="12192000" cy="6858000"/>
   <p:notesSz cx="6858000" cy="9144000"/>
@@ -279,7 +281,7 @@
           <a:p>
             <a:fld id="{6444479B-705B-4489-957E-7E8A228BDFA0}" type="datetime1">
               <a:rPr lang="en-US" smtClean="0"/>
-              <a:t>11/15/2025</a:t>
+              <a:t>11/16/2025</a:t>
             </a:fld>
             <a:endParaRPr lang="en-US"/>
           </a:p>
@@ -479,7 +481,7 @@
           <a:p>
             <a:fld id="{C07B66AD-7C08-490A-ADA4-B47E10FB2407}" type="datetime1">
               <a:rPr lang="en-US" smtClean="0"/>
-              <a:t>11/15/2025</a:t>
+              <a:t>11/16/2025</a:t>
             </a:fld>
             <a:endParaRPr lang="en-US"/>
           </a:p>
@@ -738,7 +740,7 @@
           <a:p>
             <a:fld id="{05B95027-4255-49E7-9841-CD21BCC99996}" type="datetime1">
               <a:rPr lang="en-US" smtClean="0"/>
-              <a:t>11/15/2025</a:t>
+              <a:t>11/16/2025</a:t>
             </a:fld>
             <a:endParaRPr lang="en-US"/>
           </a:p>
@@ -979,7 +981,7 @@
           <a:p>
             <a:fld id="{9F89F774-3FA6-43B8-9241-99959C8FD463}" type="datetime1">
               <a:rPr lang="en-US" smtClean="0"/>
-              <a:t>11/15/2025</a:t>
+              <a:t>11/16/2025</a:t>
             </a:fld>
             <a:endParaRPr lang="en-US"/>
           </a:p>
@@ -1306,7 +1308,7 @@
           <a:p>
             <a:fld id="{F9504452-5DCC-4FE2-A5C9-8A5EF6714D65}" type="datetime1">
               <a:rPr lang="en-US" smtClean="0"/>
-              <a:t>11/15/2025</a:t>
+              <a:t>11/16/2025</a:t>
             </a:fld>
             <a:endParaRPr lang="en-US"/>
           </a:p>
@@ -1616,7 +1618,7 @@
           <a:p>
             <a:fld id="{E579ABC2-0180-4F3A-A895-A85BC724D472}" type="datetime1">
               <a:rPr lang="en-US" smtClean="0"/>
-              <a:t>11/15/2025</a:t>
+              <a:t>11/16/2025</a:t>
             </a:fld>
             <a:endParaRPr lang="en-US"/>
           </a:p>
@@ -2034,7 +2036,7 @@
           <a:p>
             <a:fld id="{6AEEA9BA-4E8F-439E-BEA4-91FBA01E3F5F}" type="datetime1">
               <a:rPr lang="en-US" smtClean="0"/>
-              <a:t>11/15/2025</a:t>
+              <a:t>11/16/2025</a:t>
             </a:fld>
             <a:endParaRPr lang="en-US"/>
           </a:p>
@@ -2176,7 +2178,7 @@
           <a:p>
             <a:fld id="{BE15BF18-0007-481C-AA29-413124BC3EE7}" type="datetime1">
               <a:rPr lang="en-US" smtClean="0"/>
-              <a:t>11/15/2025</a:t>
+              <a:t>11/16/2025</a:t>
             </a:fld>
             <a:endParaRPr lang="en-US"/>
           </a:p>
@@ -2338,7 +2340,7 @@
           <a:p>
             <a:fld id="{09BE9870-3748-43AD-B547-02A075CB4A1D}" type="datetime1">
               <a:rPr lang="en-US" smtClean="0"/>
-              <a:t>11/15/2025</a:t>
+              <a:t>11/16/2025</a:t>
             </a:fld>
             <a:endParaRPr lang="en-US"/>
           </a:p>
@@ -2655,7 +2657,7 @@
           <a:p>
             <a:fld id="{558E7897-33C5-4F1A-9307-D068E37F3DC7}" type="datetime1">
               <a:rPr lang="en-US" smtClean="0"/>
-              <a:t>11/15/2025</a:t>
+              <a:t>11/16/2025</a:t>
             </a:fld>
             <a:endParaRPr lang="en-US"/>
           </a:p>
@@ -2950,7 +2952,7 @@
           <a:p>
             <a:fld id="{82E171BA-CC09-47C8-A6DF-F5C5CB59CEEC}" type="datetime1">
               <a:rPr lang="en-US" smtClean="0"/>
-              <a:t>11/15/2025</a:t>
+              <a:t>11/16/2025</a:t>
             </a:fld>
             <a:endParaRPr lang="en-US"/>
           </a:p>
@@ -3191,7 +3193,7 @@
           <a:p>
             <a:fld id="{7DA38F49-B3E2-4BF0-BEC7-C30D34ABBB8D}" type="datetime1">
               <a:rPr lang="en-US" smtClean="0"/>
-              <a:t>11/15/2025</a:t>
+              <a:t>11/16/2025</a:t>
             </a:fld>
             <a:endParaRPr lang="en-US"/>
           </a:p>
@@ -5392,7 +5394,7 @@
         </p:nvSpPr>
         <p:spPr>
           <a:xfrm>
-            <a:off x="1717954" y="2944499"/>
+            <a:off x="1717954" y="2863344"/>
             <a:ext cx="9281740" cy="711092"/>
           </a:xfrm>
           <a:prstGeom prst="rect">
@@ -5795,7 +5797,7 @@
         </p:nvSpPr>
         <p:spPr>
           <a:xfrm>
-            <a:off x="1340359" y="4278510"/>
+            <a:off x="1340359" y="4524740"/>
             <a:ext cx="3410935" cy="339419"/>
           </a:xfrm>
           <a:prstGeom prst="rect">
@@ -6100,7 +6102,7 @@
         </p:nvSpPr>
         <p:spPr>
           <a:xfrm>
-            <a:off x="1717954" y="4601818"/>
+            <a:off x="1717954" y="4864159"/>
             <a:ext cx="4873346" cy="387927"/>
           </a:xfrm>
           <a:prstGeom prst="rect">
@@ -6173,7 +6175,7 @@
         </p:nvSpPr>
         <p:spPr>
           <a:xfrm>
-            <a:off x="2034847" y="5103817"/>
+            <a:off x="2034847" y="5313053"/>
             <a:ext cx="6669882" cy="1015663"/>
           </a:xfrm>
           <a:prstGeom prst="rect">
@@ -6312,7 +6314,7 @@
         </p:nvSpPr>
         <p:spPr>
           <a:xfrm>
-            <a:off x="1717953" y="6119480"/>
+            <a:off x="1717953" y="6277997"/>
             <a:ext cx="7711797" cy="387927"/>
           </a:xfrm>
           <a:prstGeom prst="rect">
@@ -6339,7 +6341,7 @@
                 <a:latin typeface="Courier New" panose="02070309020205020404" pitchFamily="49" charset="0"/>
                 <a:cs typeface="Courier New" panose="02070309020205020404" pitchFamily="49" charset="0"/>
               </a:rPr>
-              <a:t>如成功完成推送遠端節點的設設，</a:t>
+              <a:t>如成功完成推送遠端節點的設定，</a:t>
             </a:r>
             <a:r>
               <a:rPr lang="en-US" altLang="zh-TW" sz="1400" dirty="0">
@@ -6384,6 +6386,164 @@
             <a:endParaRPr lang="zh-TW" altLang="en-US" sz="1400" dirty="0">
               <a:solidFill>
                 <a:srgbClr val="00FF00"/>
+              </a:solidFill>
+              <a:latin typeface="Courier New" panose="02070309020205020404" pitchFamily="49" charset="0"/>
+              <a:cs typeface="Courier New" panose="02070309020205020404" pitchFamily="49" charset="0"/>
+            </a:endParaRPr>
+          </a:p>
+        </p:txBody>
+      </p:sp>
+      <p:sp>
+        <p:nvSpPr>
+          <p:cNvPr id="12" name="文字方塊 11">
+            <a:extLst>
+              <a:ext uri="{FF2B5EF4-FFF2-40B4-BE49-F238E27FC236}">
+                <a16:creationId xmlns:a16="http://schemas.microsoft.com/office/drawing/2014/main" id="{2E3DDA04-7AD5-FD81-938B-FAAEFFF2E2ED}"/>
+              </a:ext>
+            </a:extLst>
+          </p:cNvPr>
+          <p:cNvSpPr txBox="1"/>
+          <p:nvPr/>
+        </p:nvSpPr>
+        <p:spPr>
+          <a:xfrm>
+            <a:off x="2865438" y="4166745"/>
+            <a:ext cx="5166938" cy="276999"/>
+          </a:xfrm>
+          <a:prstGeom prst="rect">
+            <a:avLst/>
+          </a:prstGeom>
+          <a:noFill/>
+        </p:spPr>
+        <p:txBody>
+          <a:bodyPr wrap="square" rtlCol="0">
+            <a:spAutoFit/>
+          </a:bodyPr>
+          <a:lstStyle/>
+          <a:p>
+            <a:r>
+              <a:rPr lang="zh-TW" altLang="en-US" sz="1200" dirty="0">
+                <a:solidFill>
+                  <a:schemeClr val="bg1"/>
+                </a:solidFill>
+                <a:latin typeface="Courier New" panose="02070309020205020404" pitchFamily="49" charset="0"/>
+                <a:cs typeface="Courier New" panose="02070309020205020404" pitchFamily="49" charset="0"/>
+              </a:rPr>
+              <a:t>語法 </a:t>
+            </a:r>
+            <a:r>
+              <a:rPr lang="en-US" altLang="zh-TW" sz="1200" dirty="0">
+                <a:solidFill>
+                  <a:schemeClr val="bg1"/>
+                </a:solidFill>
+                <a:latin typeface="Courier New" panose="02070309020205020404" pitchFamily="49" charset="0"/>
+                <a:cs typeface="Courier New" panose="02070309020205020404" pitchFamily="49" charset="0"/>
+              </a:rPr>
+              <a:t>:</a:t>
+            </a:r>
+            <a:r>
+              <a:rPr lang="zh-TW" altLang="en-US" sz="1200" dirty="0">
+                <a:solidFill>
+                  <a:schemeClr val="bg1"/>
+                </a:solidFill>
+                <a:latin typeface="Courier New" panose="02070309020205020404" pitchFamily="49" charset="0"/>
+                <a:cs typeface="Courier New" panose="02070309020205020404" pitchFamily="49" charset="0"/>
+              </a:rPr>
+              <a:t> </a:t>
+            </a:r>
+            <a:r>
+              <a:rPr lang="en-US" altLang="zh-TW" sz="1200" dirty="0">
+                <a:solidFill>
+                  <a:schemeClr val="bg1"/>
+                </a:solidFill>
+                <a:latin typeface="Courier New" panose="02070309020205020404" pitchFamily="49" charset="0"/>
+                <a:cs typeface="Courier New" panose="02070309020205020404" pitchFamily="49" charset="0"/>
+              </a:rPr>
+              <a:t>$</a:t>
+            </a:r>
+            <a:r>
+              <a:rPr lang="zh-TW" altLang="en-US" sz="1200" dirty="0">
+                <a:solidFill>
+                  <a:schemeClr val="bg1"/>
+                </a:solidFill>
+                <a:latin typeface="Courier New" panose="02070309020205020404" pitchFamily="49" charset="0"/>
+                <a:cs typeface="Courier New" panose="02070309020205020404" pitchFamily="49" charset="0"/>
+              </a:rPr>
+              <a:t> </a:t>
+            </a:r>
+            <a:r>
+              <a:rPr lang="en-US" altLang="zh-TW" sz="1200" dirty="0">
+                <a:solidFill>
+                  <a:schemeClr val="bg1"/>
+                </a:solidFill>
+                <a:latin typeface="Courier New" panose="02070309020205020404" pitchFamily="49" charset="0"/>
+                <a:cs typeface="Courier New" panose="02070309020205020404" pitchFamily="49" charset="0"/>
+              </a:rPr>
+              <a:t>git </a:t>
+            </a:r>
+            <a:r>
+              <a:rPr lang="zh-TW" altLang="en-US" sz="1200" dirty="0">
+                <a:solidFill>
+                  <a:schemeClr val="bg1"/>
+                </a:solidFill>
+                <a:latin typeface="Courier New" panose="02070309020205020404" pitchFamily="49" charset="0"/>
+                <a:cs typeface="Courier New" panose="02070309020205020404" pitchFamily="49" charset="0"/>
+              </a:rPr>
+              <a:t>命令</a:t>
+            </a:r>
+            <a:r>
+              <a:rPr lang="en-US" altLang="zh-TW" sz="1200" dirty="0">
+                <a:solidFill>
+                  <a:schemeClr val="bg1"/>
+                </a:solidFill>
+                <a:latin typeface="Courier New" panose="02070309020205020404" pitchFamily="49" charset="0"/>
+                <a:cs typeface="Courier New" panose="02070309020205020404" pitchFamily="49" charset="0"/>
+              </a:rPr>
+              <a:t>(remote) </a:t>
+            </a:r>
+            <a:r>
+              <a:rPr lang="zh-TW" altLang="en-US" sz="1200" dirty="0">
+                <a:solidFill>
+                  <a:schemeClr val="bg1"/>
+                </a:solidFill>
+                <a:latin typeface="Courier New" panose="02070309020205020404" pitchFamily="49" charset="0"/>
+                <a:cs typeface="Courier New" panose="02070309020205020404" pitchFamily="49" charset="0"/>
+              </a:rPr>
+              <a:t>參數</a:t>
+            </a:r>
+            <a:r>
+              <a:rPr lang="en-US" altLang="zh-TW" sz="1200" dirty="0">
+                <a:solidFill>
+                  <a:schemeClr val="bg1"/>
+                </a:solidFill>
+                <a:latin typeface="Courier New" panose="02070309020205020404" pitchFamily="49" charset="0"/>
+                <a:cs typeface="Courier New" panose="02070309020205020404" pitchFamily="49" charset="0"/>
+              </a:rPr>
+              <a:t>(add origin</a:t>
+            </a:r>
+            <a:r>
+              <a:rPr lang="zh-TW" altLang="en-US" sz="1200" dirty="0">
+                <a:solidFill>
+                  <a:schemeClr val="bg1"/>
+                </a:solidFill>
+                <a:latin typeface="Courier New" panose="02070309020205020404" pitchFamily="49" charset="0"/>
+                <a:cs typeface="Courier New" panose="02070309020205020404" pitchFamily="49" charset="0"/>
+              </a:rPr>
+              <a:t> 遠端節點的</a:t>
+            </a:r>
+            <a:r>
+              <a:rPr lang="en-US" altLang="zh-TW" sz="1200" dirty="0">
+                <a:solidFill>
+                  <a:schemeClr val="bg1"/>
+                </a:solidFill>
+                <a:latin typeface="Courier New" panose="02070309020205020404" pitchFamily="49" charset="0"/>
+                <a:cs typeface="Courier New" panose="02070309020205020404" pitchFamily="49" charset="0"/>
+              </a:rPr>
+              <a:t>URL)</a:t>
+            </a:r>
+            <a:endParaRPr lang="en-US" altLang="zh-TW" sz="1200" dirty="0">
+              <a:solidFill>
+                <a:srgbClr val="33CCCC"/>
               </a:solidFill>
               <a:latin typeface="Courier New" panose="02070309020205020404" pitchFamily="49" charset="0"/>
               <a:cs typeface="Courier New" panose="02070309020205020404" pitchFamily="49" charset="0"/>
@@ -6405,6 +6565,2394 @@
 </file>
 
 <file path=ppt/slides/slide12.xml><?xml version="1.0" encoding="utf-8"?>
+<p:sld xmlns:a="http://schemas.openxmlformats.org/drawingml/2006/main" xmlns:r="http://schemas.openxmlformats.org/officeDocument/2006/relationships" xmlns:p="http://schemas.openxmlformats.org/presentationml/2006/main">
+  <p:cSld>
+    <p:bg>
+      <p:bgPr>
+        <a:solidFill>
+          <a:schemeClr val="tx1">
+            <a:lumMod val="75000"/>
+            <a:lumOff val="25000"/>
+          </a:schemeClr>
+        </a:solidFill>
+        <a:effectLst/>
+      </p:bgPr>
+    </p:bg>
+    <p:spTree>
+      <p:nvGrpSpPr>
+        <p:cNvPr id="1" name="">
+          <a:extLst>
+            <a:ext uri="{FF2B5EF4-FFF2-40B4-BE49-F238E27FC236}">
+              <a16:creationId xmlns:a16="http://schemas.microsoft.com/office/drawing/2014/main" id="{7500B80B-C921-039F-AE17-4542E1A5D23F}"/>
+            </a:ext>
+          </a:extLst>
+        </p:cNvPr>
+        <p:cNvGrpSpPr/>
+        <p:nvPr/>
+      </p:nvGrpSpPr>
+      <p:grpSpPr>
+        <a:xfrm>
+          <a:off x="0" y="0"/>
+          <a:ext cx="0" cy="0"/>
+          <a:chOff x="0" y="0"/>
+          <a:chExt cx="0" cy="0"/>
+        </a:xfrm>
+      </p:grpSpPr>
+      <p:sp>
+        <p:nvSpPr>
+          <p:cNvPr id="2" name="標題 1">
+            <a:extLst>
+              <a:ext uri="{FF2B5EF4-FFF2-40B4-BE49-F238E27FC236}">
+                <a16:creationId xmlns:a16="http://schemas.microsoft.com/office/drawing/2014/main" id="{04642623-80B8-E94B-9BB4-8DF293978670}"/>
+              </a:ext>
+            </a:extLst>
+          </p:cNvPr>
+          <p:cNvSpPr>
+            <a:spLocks noGrp="1"/>
+          </p:cNvSpPr>
+          <p:nvPr>
+            <p:ph type="title"/>
+          </p:nvPr>
+        </p:nvSpPr>
+        <p:spPr>
+          <a:xfrm>
+            <a:off x="640079" y="1102718"/>
+            <a:ext cx="10890929" cy="662474"/>
+          </a:xfrm>
+        </p:spPr>
+        <p:txBody>
+          <a:bodyPr anchor="ctr" anchorCtr="0">
+            <a:normAutofit/>
+          </a:bodyPr>
+          <a:lstStyle/>
+          <a:p>
+            <a:r>
+              <a:rPr lang="en-US" altLang="zh-TW" sz="3200" dirty="0">
+                <a:solidFill>
+                  <a:srgbClr val="FFC000"/>
+                </a:solidFill>
+              </a:rPr>
+              <a:t>Git Bash – Command Line</a:t>
+            </a:r>
+            <a:endParaRPr lang="zh-TW" altLang="en-US" sz="3200" dirty="0">
+              <a:solidFill>
+                <a:srgbClr val="FFC000"/>
+              </a:solidFill>
+            </a:endParaRPr>
+          </a:p>
+        </p:txBody>
+      </p:sp>
+      <p:sp>
+        <p:nvSpPr>
+          <p:cNvPr id="3" name="內容版面配置區 2">
+            <a:extLst>
+              <a:ext uri="{FF2B5EF4-FFF2-40B4-BE49-F238E27FC236}">
+                <a16:creationId xmlns:a16="http://schemas.microsoft.com/office/drawing/2014/main" id="{ACFA31FD-F1CF-0FE2-703D-E08A1C8B1A2F}"/>
+              </a:ext>
+            </a:extLst>
+          </p:cNvPr>
+          <p:cNvSpPr>
+            <a:spLocks noGrp="1"/>
+          </p:cNvSpPr>
+          <p:nvPr>
+            <p:ph idx="1"/>
+          </p:nvPr>
+        </p:nvSpPr>
+        <p:spPr>
+          <a:xfrm>
+            <a:off x="797097" y="1765192"/>
+            <a:ext cx="4913421" cy="547027"/>
+          </a:xfrm>
+        </p:spPr>
+        <p:txBody>
+          <a:bodyPr anchor="ctr" anchorCtr="0">
+            <a:noAutofit/>
+          </a:bodyPr>
+          <a:lstStyle/>
+          <a:p>
+            <a:pPr>
+              <a:buFont typeface="Wingdings" panose="05000000000000000000" pitchFamily="2" charset="2"/>
+              <a:buChar char="l"/>
+            </a:pPr>
+            <a:r>
+              <a:rPr lang="zh-TW" altLang="en-US" dirty="0">
+                <a:solidFill>
+                  <a:srgbClr val="00B0F0"/>
+                </a:solidFill>
+              </a:rPr>
+              <a:t> </a:t>
+            </a:r>
+            <a:r>
+              <a:rPr lang="en-US" altLang="zh-TW" dirty="0">
+                <a:solidFill>
+                  <a:srgbClr val="00B0F0"/>
+                </a:solidFill>
+              </a:rPr>
+              <a:t>Clone(</a:t>
+            </a:r>
+            <a:r>
+              <a:rPr lang="zh-TW" altLang="en-US" dirty="0">
+                <a:solidFill>
+                  <a:srgbClr val="00B0F0"/>
+                </a:solidFill>
+              </a:rPr>
+              <a:t>克隆</a:t>
+            </a:r>
+            <a:r>
+              <a:rPr lang="en-US" altLang="zh-TW" dirty="0">
+                <a:solidFill>
+                  <a:srgbClr val="00B0F0"/>
+                </a:solidFill>
+              </a:rPr>
+              <a:t>)</a:t>
+            </a:r>
+            <a:r>
+              <a:rPr lang="zh-TW" altLang="en-US" dirty="0">
+                <a:solidFill>
+                  <a:srgbClr val="00B0F0"/>
+                </a:solidFill>
+              </a:rPr>
+              <a:t>遠端</a:t>
+            </a:r>
+            <a:r>
+              <a:rPr lang="en-US" altLang="zh-TW" dirty="0">
+                <a:solidFill>
+                  <a:srgbClr val="00B0F0"/>
+                </a:solidFill>
+              </a:rPr>
+              <a:t>Git</a:t>
+            </a:r>
+            <a:r>
+              <a:rPr lang="zh-TW" altLang="en-US" dirty="0">
+                <a:solidFill>
+                  <a:srgbClr val="00B0F0"/>
+                </a:solidFill>
+              </a:rPr>
+              <a:t> </a:t>
+            </a:r>
+            <a:r>
+              <a:rPr lang="en-US" altLang="zh-TW" dirty="0">
+                <a:solidFill>
+                  <a:srgbClr val="00B0F0"/>
+                </a:solidFill>
+              </a:rPr>
+              <a:t>Repository</a:t>
+            </a:r>
+            <a:r>
+              <a:rPr lang="zh-TW" altLang="en-US" dirty="0">
+                <a:solidFill>
+                  <a:srgbClr val="00B0F0"/>
+                </a:solidFill>
+              </a:rPr>
+              <a:t>目錄</a:t>
+            </a:r>
+          </a:p>
+        </p:txBody>
+      </p:sp>
+      <p:sp>
+        <p:nvSpPr>
+          <p:cNvPr id="4" name="文字方塊 3">
+            <a:extLst>
+              <a:ext uri="{FF2B5EF4-FFF2-40B4-BE49-F238E27FC236}">
+                <a16:creationId xmlns:a16="http://schemas.microsoft.com/office/drawing/2014/main" id="{FF971187-F91B-57A9-D832-4BD436A4AF23}"/>
+              </a:ext>
+            </a:extLst>
+          </p:cNvPr>
+          <p:cNvSpPr txBox="1"/>
+          <p:nvPr/>
+        </p:nvSpPr>
+        <p:spPr>
+          <a:xfrm>
+            <a:off x="1717954" y="2863344"/>
+            <a:ext cx="9281740" cy="711092"/>
+          </a:xfrm>
+          <a:prstGeom prst="rect">
+            <a:avLst/>
+          </a:prstGeom>
+          <a:noFill/>
+        </p:spPr>
+        <p:txBody>
+          <a:bodyPr wrap="square" rtlCol="0">
+            <a:spAutoFit/>
+          </a:bodyPr>
+          <a:lstStyle/>
+          <a:p>
+            <a:pPr>
+              <a:lnSpc>
+                <a:spcPct val="150000"/>
+              </a:lnSpc>
+            </a:pPr>
+            <a:r>
+              <a:rPr lang="zh-TW" altLang="en-US" sz="1400" dirty="0">
+                <a:solidFill>
+                  <a:schemeClr val="bg1"/>
+                </a:solidFill>
+                <a:latin typeface="Courier New" panose="02070309020205020404" pitchFamily="49" charset="0"/>
+                <a:cs typeface="Courier New" panose="02070309020205020404" pitchFamily="49" charset="0"/>
+              </a:rPr>
+              <a:t>將目錄路徑切換到本地端任何一個想要存放</a:t>
+            </a:r>
+            <a:r>
+              <a:rPr lang="en-US" altLang="zh-TW" sz="1400" dirty="0">
+                <a:solidFill>
+                  <a:schemeClr val="bg1"/>
+                </a:solidFill>
+                <a:latin typeface="Courier New" panose="02070309020205020404" pitchFamily="49" charset="0"/>
+                <a:cs typeface="Courier New" panose="02070309020205020404" pitchFamily="49" charset="0"/>
+              </a:rPr>
+              <a:t>clone</a:t>
+            </a:r>
+            <a:r>
+              <a:rPr lang="zh-TW" altLang="en-US" sz="1400" dirty="0">
+                <a:solidFill>
+                  <a:schemeClr val="bg1"/>
+                </a:solidFill>
+                <a:latin typeface="Courier New" panose="02070309020205020404" pitchFamily="49" charset="0"/>
+                <a:cs typeface="Courier New" panose="02070309020205020404" pitchFamily="49" charset="0"/>
+              </a:rPr>
+              <a:t>資料的目錄，使用</a:t>
+            </a:r>
+            <a:r>
+              <a:rPr lang="en-US" altLang="zh-TW" sz="1400" dirty="0">
+                <a:solidFill>
+                  <a:schemeClr val="bg1"/>
+                </a:solidFill>
+                <a:latin typeface="Courier New" panose="02070309020205020404" pitchFamily="49" charset="0"/>
+                <a:cs typeface="Courier New" panose="02070309020205020404" pitchFamily="49" charset="0"/>
+              </a:rPr>
+              <a:t>“clone”</a:t>
+            </a:r>
+            <a:r>
+              <a:rPr lang="zh-TW" altLang="en-US" sz="1400" dirty="0">
+                <a:solidFill>
+                  <a:schemeClr val="bg1"/>
+                </a:solidFill>
+                <a:latin typeface="Courier New" panose="02070309020205020404" pitchFamily="49" charset="0"/>
+                <a:cs typeface="Courier New" panose="02070309020205020404" pitchFamily="49" charset="0"/>
+              </a:rPr>
+              <a:t>指令將遠端</a:t>
+            </a:r>
+            <a:r>
+              <a:rPr lang="en-US" altLang="zh-TW" sz="1400" dirty="0">
+                <a:solidFill>
+                  <a:schemeClr val="bg1"/>
+                </a:solidFill>
+                <a:latin typeface="Courier New" panose="02070309020205020404" pitchFamily="49" charset="0"/>
+                <a:cs typeface="Courier New" panose="02070309020205020404" pitchFamily="49" charset="0"/>
+              </a:rPr>
+              <a:t>Git</a:t>
+            </a:r>
+            <a:r>
+              <a:rPr lang="zh-TW" altLang="en-US" sz="1400" dirty="0">
+                <a:solidFill>
+                  <a:schemeClr val="bg1"/>
+                </a:solidFill>
+                <a:latin typeface="Courier New" panose="02070309020205020404" pitchFamily="49" charset="0"/>
+                <a:cs typeface="Courier New" panose="02070309020205020404" pitchFamily="49" charset="0"/>
+              </a:rPr>
+              <a:t>倉庫整個克隆</a:t>
+            </a:r>
+            <a:r>
+              <a:rPr lang="en-US" altLang="zh-TW" sz="1400" dirty="0">
+                <a:solidFill>
+                  <a:schemeClr val="bg1"/>
+                </a:solidFill>
+                <a:latin typeface="Courier New" panose="02070309020205020404" pitchFamily="49" charset="0"/>
+                <a:cs typeface="Courier New" panose="02070309020205020404" pitchFamily="49" charset="0"/>
+              </a:rPr>
+              <a:t>(</a:t>
+            </a:r>
+            <a:r>
+              <a:rPr lang="zh-TW" altLang="en-US" sz="1400" dirty="0">
+                <a:solidFill>
+                  <a:schemeClr val="bg1"/>
+                </a:solidFill>
+                <a:latin typeface="Courier New" panose="02070309020205020404" pitchFamily="49" charset="0"/>
+                <a:cs typeface="Courier New" panose="02070309020205020404" pitchFamily="49" charset="0"/>
+              </a:rPr>
+              <a:t>複製</a:t>
+            </a:r>
+            <a:r>
+              <a:rPr lang="en-US" altLang="zh-TW" sz="1400" dirty="0">
+                <a:solidFill>
+                  <a:schemeClr val="bg1"/>
+                </a:solidFill>
+                <a:latin typeface="Courier New" panose="02070309020205020404" pitchFamily="49" charset="0"/>
+                <a:cs typeface="Courier New" panose="02070309020205020404" pitchFamily="49" charset="0"/>
+              </a:rPr>
+              <a:t>)</a:t>
+            </a:r>
+            <a:r>
+              <a:rPr lang="zh-TW" altLang="en-US" sz="1400" dirty="0">
+                <a:solidFill>
+                  <a:schemeClr val="bg1"/>
+                </a:solidFill>
+                <a:latin typeface="Courier New" panose="02070309020205020404" pitchFamily="49" charset="0"/>
+                <a:cs typeface="Courier New" panose="02070309020205020404" pitchFamily="49" charset="0"/>
+              </a:rPr>
+              <a:t>到這個資料夾目錄中</a:t>
+            </a:r>
+            <a:r>
+              <a:rPr lang="en-US" altLang="zh-TW" sz="1400" dirty="0">
+                <a:solidFill>
+                  <a:schemeClr val="bg1"/>
+                </a:solidFill>
+                <a:latin typeface="Courier New" panose="02070309020205020404" pitchFamily="49" charset="0"/>
+                <a:cs typeface="Courier New" panose="02070309020205020404" pitchFamily="49" charset="0"/>
+              </a:rPr>
+              <a:t>(clone</a:t>
+            </a:r>
+            <a:r>
+              <a:rPr lang="zh-TW" altLang="en-US" sz="1400" dirty="0">
+                <a:solidFill>
+                  <a:schemeClr val="bg1"/>
+                </a:solidFill>
+                <a:latin typeface="Courier New" panose="02070309020205020404" pitchFamily="49" charset="0"/>
+                <a:cs typeface="Courier New" panose="02070309020205020404" pitchFamily="49" charset="0"/>
+              </a:rPr>
+              <a:t>的資料包含所有的</a:t>
+            </a:r>
+            <a:r>
+              <a:rPr lang="en-US" altLang="zh-TW" sz="1400" dirty="0">
+                <a:solidFill>
+                  <a:schemeClr val="bg1"/>
+                </a:solidFill>
+                <a:latin typeface="Courier New" panose="02070309020205020404" pitchFamily="49" charset="0"/>
+                <a:cs typeface="Courier New" panose="02070309020205020404" pitchFamily="49" charset="0"/>
+              </a:rPr>
+              <a:t>git</a:t>
+            </a:r>
+            <a:r>
+              <a:rPr lang="zh-TW" altLang="en-US" sz="1400" dirty="0">
+                <a:solidFill>
+                  <a:schemeClr val="bg1"/>
+                </a:solidFill>
+                <a:latin typeface="Courier New" panose="02070309020205020404" pitchFamily="49" charset="0"/>
+                <a:cs typeface="Courier New" panose="02070309020205020404" pitchFamily="49" charset="0"/>
+              </a:rPr>
+              <a:t>數據，修改文件與修改記錄等</a:t>
+            </a:r>
+            <a:r>
+              <a:rPr lang="en-US" altLang="zh-TW" sz="1400" dirty="0">
+                <a:solidFill>
+                  <a:schemeClr val="bg1"/>
+                </a:solidFill>
+                <a:latin typeface="Courier New" panose="02070309020205020404" pitchFamily="49" charset="0"/>
+                <a:cs typeface="Courier New" panose="02070309020205020404" pitchFamily="49" charset="0"/>
+              </a:rPr>
+              <a:t>)</a:t>
+            </a:r>
+            <a:endParaRPr lang="zh-TW" altLang="en-US" sz="1400" dirty="0">
+              <a:solidFill>
+                <a:srgbClr val="00FF00"/>
+              </a:solidFill>
+              <a:latin typeface="Courier New" panose="02070309020205020404" pitchFamily="49" charset="0"/>
+              <a:cs typeface="Courier New" panose="02070309020205020404" pitchFamily="49" charset="0"/>
+            </a:endParaRPr>
+          </a:p>
+        </p:txBody>
+      </p:sp>
+      <p:sp>
+        <p:nvSpPr>
+          <p:cNvPr id="5" name="內容版面配置區 2">
+            <a:extLst>
+              <a:ext uri="{FF2B5EF4-FFF2-40B4-BE49-F238E27FC236}">
+                <a16:creationId xmlns:a16="http://schemas.microsoft.com/office/drawing/2014/main" id="{3E4E6351-AF2F-3258-B6B7-DD66AE5F33F3}"/>
+              </a:ext>
+            </a:extLst>
+          </p:cNvPr>
+          <p:cNvSpPr txBox="1">
+            <a:spLocks/>
+          </p:cNvSpPr>
+          <p:nvPr/>
+        </p:nvSpPr>
+        <p:spPr>
+          <a:xfrm>
+            <a:off x="1340358" y="2427667"/>
+            <a:ext cx="3912960" cy="442048"/>
+          </a:xfrm>
+          <a:prstGeom prst="rect">
+            <a:avLst/>
+          </a:prstGeom>
+        </p:spPr>
+        <p:txBody>
+          <a:bodyPr vert="horz" lIns="91440" tIns="45720" rIns="91440" bIns="45720" rtlCol="0" anchor="ctr" anchorCtr="0">
+            <a:normAutofit/>
+          </a:bodyPr>
+          <a:lstStyle>
+            <a:lvl1pPr marL="228600" indent="-228600" algn="l" defTabSz="914400" rtl="0" eaLnBrk="1" latinLnBrk="0" hangingPunct="1">
+              <a:lnSpc>
+                <a:spcPct val="120000"/>
+              </a:lnSpc>
+              <a:spcBef>
+                <a:spcPts val="1000"/>
+              </a:spcBef>
+              <a:buSzPct val="87000"/>
+              <a:buFont typeface="Arial" panose="020B0604020202020204" pitchFamily="34" charset="0"/>
+              <a:buChar char="•"/>
+              <a:defRPr sz="2000" kern="1200">
+                <a:solidFill>
+                  <a:schemeClr val="tx1"/>
+                </a:solidFill>
+                <a:latin typeface="+mn-lt"/>
+                <a:ea typeface="+mn-ea"/>
+                <a:cs typeface="+mn-cs"/>
+              </a:defRPr>
+            </a:lvl1pPr>
+            <a:lvl2pPr marL="493776" indent="-228600" algn="l" defTabSz="914400" rtl="0" eaLnBrk="1" latinLnBrk="0" hangingPunct="1">
+              <a:lnSpc>
+                <a:spcPct val="120000"/>
+              </a:lnSpc>
+              <a:spcBef>
+                <a:spcPts val="500"/>
+              </a:spcBef>
+              <a:buSzPct val="87000"/>
+              <a:buFont typeface="Arial" panose="020B0604020202020204" pitchFamily="34" charset="0"/>
+              <a:buChar char="•"/>
+              <a:defRPr sz="1800" kern="1200">
+                <a:solidFill>
+                  <a:schemeClr val="tx1"/>
+                </a:solidFill>
+                <a:latin typeface="+mn-lt"/>
+                <a:ea typeface="+mn-ea"/>
+                <a:cs typeface="+mn-cs"/>
+              </a:defRPr>
+            </a:lvl2pPr>
+            <a:lvl3pPr marL="731520" indent="-228600" algn="l" defTabSz="914400" rtl="0" eaLnBrk="1" latinLnBrk="0" hangingPunct="1">
+              <a:lnSpc>
+                <a:spcPct val="120000"/>
+              </a:lnSpc>
+              <a:spcBef>
+                <a:spcPts val="500"/>
+              </a:spcBef>
+              <a:buSzPct val="87000"/>
+              <a:buFont typeface="Arial" panose="020B0604020202020204" pitchFamily="34" charset="0"/>
+              <a:buChar char="•"/>
+              <a:defRPr sz="1600" kern="1200">
+                <a:solidFill>
+                  <a:schemeClr val="tx1"/>
+                </a:solidFill>
+                <a:latin typeface="+mn-lt"/>
+                <a:ea typeface="+mn-ea"/>
+                <a:cs typeface="+mn-cs"/>
+              </a:defRPr>
+            </a:lvl3pPr>
+            <a:lvl4pPr marL="1051560" indent="-285750" algn="l" defTabSz="914400" rtl="0" eaLnBrk="1" latinLnBrk="0" hangingPunct="1">
+              <a:lnSpc>
+                <a:spcPct val="120000"/>
+              </a:lnSpc>
+              <a:spcBef>
+                <a:spcPts val="500"/>
+              </a:spcBef>
+              <a:buSzPct val="87000"/>
+              <a:buFont typeface="Arial" panose="020B0604020202020204" pitchFamily="34" charset="0"/>
+              <a:buChar char="•"/>
+              <a:defRPr sz="1400" kern="1200">
+                <a:solidFill>
+                  <a:schemeClr val="tx1"/>
+                </a:solidFill>
+                <a:latin typeface="+mn-lt"/>
+                <a:ea typeface="+mn-ea"/>
+                <a:cs typeface="+mn-cs"/>
+              </a:defRPr>
+            </a:lvl4pPr>
+            <a:lvl5pPr marL="1298448" indent="-228600" algn="l" defTabSz="914400" rtl="0" eaLnBrk="1" latinLnBrk="0" hangingPunct="1">
+              <a:lnSpc>
+                <a:spcPct val="120000"/>
+              </a:lnSpc>
+              <a:spcBef>
+                <a:spcPts val="500"/>
+              </a:spcBef>
+              <a:buSzPct val="87000"/>
+              <a:buFont typeface="Arial" panose="020B0604020202020204" pitchFamily="34" charset="0"/>
+              <a:buChar char="•"/>
+              <a:defRPr sz="1400" kern="1200">
+                <a:solidFill>
+                  <a:schemeClr val="tx1"/>
+                </a:solidFill>
+                <a:latin typeface="+mn-lt"/>
+                <a:ea typeface="+mn-ea"/>
+                <a:cs typeface="+mn-cs"/>
+              </a:defRPr>
+            </a:lvl5pPr>
+            <a:lvl6pPr marL="2514600" indent="-228600" algn="l" defTabSz="914400" rtl="0" eaLnBrk="1" latinLnBrk="0" hangingPunct="1">
+              <a:lnSpc>
+                <a:spcPct val="90000"/>
+              </a:lnSpc>
+              <a:spcBef>
+                <a:spcPts val="500"/>
+              </a:spcBef>
+              <a:buFont typeface="Arial" panose="020B0604020202020204" pitchFamily="34" charset="0"/>
+              <a:buChar char="•"/>
+              <a:defRPr sz="1800" kern="1200">
+                <a:solidFill>
+                  <a:schemeClr val="tx1"/>
+                </a:solidFill>
+                <a:latin typeface="+mn-lt"/>
+                <a:ea typeface="+mn-ea"/>
+                <a:cs typeface="+mn-cs"/>
+              </a:defRPr>
+            </a:lvl6pPr>
+            <a:lvl7pPr marL="2971800" indent="-228600" algn="l" defTabSz="914400" rtl="0" eaLnBrk="1" latinLnBrk="0" hangingPunct="1">
+              <a:lnSpc>
+                <a:spcPct val="90000"/>
+              </a:lnSpc>
+              <a:spcBef>
+                <a:spcPts val="500"/>
+              </a:spcBef>
+              <a:buFont typeface="Arial" panose="020B0604020202020204" pitchFamily="34" charset="0"/>
+              <a:buChar char="•"/>
+              <a:defRPr sz="1800" kern="1200">
+                <a:solidFill>
+                  <a:schemeClr val="tx1"/>
+                </a:solidFill>
+                <a:latin typeface="+mn-lt"/>
+                <a:ea typeface="+mn-ea"/>
+                <a:cs typeface="+mn-cs"/>
+              </a:defRPr>
+            </a:lvl7pPr>
+            <a:lvl8pPr marL="3429000" indent="-228600" algn="l" defTabSz="914400" rtl="0" eaLnBrk="1" latinLnBrk="0" hangingPunct="1">
+              <a:lnSpc>
+                <a:spcPct val="90000"/>
+              </a:lnSpc>
+              <a:spcBef>
+                <a:spcPts val="500"/>
+              </a:spcBef>
+              <a:buFont typeface="Arial" panose="020B0604020202020204" pitchFamily="34" charset="0"/>
+              <a:buChar char="•"/>
+              <a:defRPr sz="1800" kern="1200">
+                <a:solidFill>
+                  <a:schemeClr val="tx1"/>
+                </a:solidFill>
+                <a:latin typeface="+mn-lt"/>
+                <a:ea typeface="+mn-ea"/>
+                <a:cs typeface="+mn-cs"/>
+              </a:defRPr>
+            </a:lvl8pPr>
+            <a:lvl9pPr marL="3886200" indent="-228600" algn="l" defTabSz="914400" rtl="0" eaLnBrk="1" latinLnBrk="0" hangingPunct="1">
+              <a:lnSpc>
+                <a:spcPct val="90000"/>
+              </a:lnSpc>
+              <a:spcBef>
+                <a:spcPts val="500"/>
+              </a:spcBef>
+              <a:buFont typeface="Arial" panose="020B0604020202020204" pitchFamily="34" charset="0"/>
+              <a:buChar char="•"/>
+              <a:defRPr sz="1800" kern="1200">
+                <a:solidFill>
+                  <a:schemeClr val="tx1"/>
+                </a:solidFill>
+                <a:latin typeface="+mn-lt"/>
+                <a:ea typeface="+mn-ea"/>
+                <a:cs typeface="+mn-cs"/>
+              </a:defRPr>
+            </a:lvl9pPr>
+          </a:lstStyle>
+          <a:p>
+            <a:pPr>
+              <a:buFont typeface="Wingdings" panose="05000000000000000000" pitchFamily="2" charset="2"/>
+              <a:buChar char="Ø"/>
+            </a:pPr>
+            <a:r>
+              <a:rPr lang="zh-TW" altLang="en-US" sz="1600" dirty="0">
+                <a:solidFill>
+                  <a:schemeClr val="bg1"/>
+                </a:solidFill>
+              </a:rPr>
+              <a:t>切換到本地端的任何一個資料夾目錄</a:t>
+            </a:r>
+          </a:p>
+        </p:txBody>
+      </p:sp>
+      <p:sp>
+        <p:nvSpPr>
+          <p:cNvPr id="7" name="文字方塊 6">
+            <a:extLst>
+              <a:ext uri="{FF2B5EF4-FFF2-40B4-BE49-F238E27FC236}">
+                <a16:creationId xmlns:a16="http://schemas.microsoft.com/office/drawing/2014/main" id="{002516ED-66B6-B264-2523-0129E2180980}"/>
+              </a:ext>
+            </a:extLst>
+          </p:cNvPr>
+          <p:cNvSpPr txBox="1"/>
+          <p:nvPr/>
+        </p:nvSpPr>
+        <p:spPr>
+          <a:xfrm>
+            <a:off x="2651883" y="5961479"/>
+            <a:ext cx="7413882" cy="461665"/>
+          </a:xfrm>
+          <a:prstGeom prst="rect">
+            <a:avLst/>
+          </a:prstGeom>
+          <a:noFill/>
+        </p:spPr>
+        <p:txBody>
+          <a:bodyPr wrap="square" rtlCol="0">
+            <a:spAutoFit/>
+          </a:bodyPr>
+          <a:lstStyle/>
+          <a:p>
+            <a:pPr algn="ctr"/>
+            <a:r>
+              <a:rPr lang="en-US" altLang="zh-TW" sz="1200" dirty="0">
+                <a:solidFill>
+                  <a:schemeClr val="bg1">
+                    <a:lumMod val="65000"/>
+                  </a:schemeClr>
+                </a:solidFill>
+                <a:latin typeface="Courier New" panose="02070309020205020404" pitchFamily="49" charset="0"/>
+                <a:cs typeface="Courier New" panose="02070309020205020404" pitchFamily="49" charset="0"/>
+              </a:rPr>
+              <a:t>Clone</a:t>
+            </a:r>
+            <a:r>
+              <a:rPr lang="zh-TW" altLang="en-US" sz="1200" dirty="0">
+                <a:solidFill>
+                  <a:schemeClr val="bg1">
+                    <a:lumMod val="65000"/>
+                  </a:schemeClr>
+                </a:solidFill>
+                <a:latin typeface="Courier New" panose="02070309020205020404" pitchFamily="49" charset="0"/>
+                <a:cs typeface="Courier New" panose="02070309020205020404" pitchFamily="49" charset="0"/>
+              </a:rPr>
+              <a:t>完成後會出現</a:t>
+            </a:r>
+            <a:r>
+              <a:rPr lang="en-US" altLang="zh-TW" sz="1200" dirty="0">
+                <a:solidFill>
+                  <a:schemeClr val="bg1">
+                    <a:lumMod val="65000"/>
+                  </a:schemeClr>
+                </a:solidFill>
+                <a:latin typeface="Courier New" panose="02070309020205020404" pitchFamily="49" charset="0"/>
+                <a:cs typeface="Courier New" panose="02070309020205020404" pitchFamily="49" charset="0"/>
+              </a:rPr>
+              <a:t>“cloning</a:t>
+            </a:r>
+            <a:r>
+              <a:rPr lang="zh-TW" altLang="en-US" sz="1200" dirty="0">
+                <a:solidFill>
+                  <a:schemeClr val="bg1">
+                    <a:lumMod val="65000"/>
+                  </a:schemeClr>
+                </a:solidFill>
+                <a:latin typeface="Courier New" panose="02070309020205020404" pitchFamily="49" charset="0"/>
+                <a:cs typeface="Courier New" panose="02070309020205020404" pitchFamily="49" charset="0"/>
+              </a:rPr>
+              <a:t> </a:t>
+            </a:r>
+            <a:r>
+              <a:rPr lang="en-US" altLang="zh-TW" sz="1200" dirty="0">
+                <a:solidFill>
+                  <a:schemeClr val="bg1">
+                    <a:lumMod val="65000"/>
+                  </a:schemeClr>
+                </a:solidFill>
+                <a:latin typeface="Courier New" panose="02070309020205020404" pitchFamily="49" charset="0"/>
+                <a:cs typeface="Courier New" panose="02070309020205020404" pitchFamily="49" charset="0"/>
+              </a:rPr>
+              <a:t>into</a:t>
+            </a:r>
+            <a:r>
+              <a:rPr lang="zh-TW" altLang="en-US" sz="1200" dirty="0">
+                <a:solidFill>
+                  <a:schemeClr val="bg1">
+                    <a:lumMod val="65000"/>
+                  </a:schemeClr>
+                </a:solidFill>
+                <a:latin typeface="Courier New" panose="02070309020205020404" pitchFamily="49" charset="0"/>
+                <a:cs typeface="Courier New" panose="02070309020205020404" pitchFamily="49" charset="0"/>
+              </a:rPr>
+              <a:t> </a:t>
+            </a:r>
+            <a:r>
+              <a:rPr lang="en-US" altLang="zh-TW" sz="1200" dirty="0">
+                <a:solidFill>
+                  <a:schemeClr val="bg1">
+                    <a:lumMod val="65000"/>
+                  </a:schemeClr>
+                </a:solidFill>
+                <a:latin typeface="Courier New" panose="02070309020205020404" pitchFamily="49" charset="0"/>
+                <a:cs typeface="Courier New" panose="02070309020205020404" pitchFamily="49" charset="0"/>
+              </a:rPr>
+              <a:t>‘RemoteGit’</a:t>
+            </a:r>
+            <a:r>
+              <a:rPr lang="zh-TW" altLang="en-US" sz="1200" dirty="0">
+                <a:solidFill>
+                  <a:schemeClr val="bg1">
+                    <a:lumMod val="65000"/>
+                  </a:schemeClr>
+                </a:solidFill>
+                <a:latin typeface="Courier New" panose="02070309020205020404" pitchFamily="49" charset="0"/>
+                <a:cs typeface="Courier New" panose="02070309020205020404" pitchFamily="49" charset="0"/>
+              </a:rPr>
+              <a:t>字樣，同時在資料夾中會出現</a:t>
+            </a:r>
+            <a:r>
+              <a:rPr lang="en-US" altLang="zh-TW" sz="1200" dirty="0">
+                <a:solidFill>
+                  <a:schemeClr val="bg1">
+                    <a:lumMod val="65000"/>
+                  </a:schemeClr>
+                </a:solidFill>
+                <a:latin typeface="Courier New" panose="02070309020205020404" pitchFamily="49" charset="0"/>
+                <a:cs typeface="Courier New" panose="02070309020205020404" pitchFamily="49" charset="0"/>
+              </a:rPr>
+              <a:t>clone</a:t>
+            </a:r>
+            <a:r>
+              <a:rPr lang="zh-TW" altLang="en-US" sz="1200" dirty="0">
+                <a:solidFill>
+                  <a:schemeClr val="bg1">
+                    <a:lumMod val="65000"/>
+                  </a:schemeClr>
+                </a:solidFill>
+                <a:latin typeface="Courier New" panose="02070309020205020404" pitchFamily="49" charset="0"/>
+                <a:cs typeface="Courier New" panose="02070309020205020404" pitchFamily="49" charset="0"/>
+              </a:rPr>
+              <a:t>下來的所有數據</a:t>
+            </a:r>
+            <a:endParaRPr lang="en-US" altLang="zh-TW" sz="1200" dirty="0">
+              <a:solidFill>
+                <a:schemeClr val="bg1">
+                  <a:lumMod val="65000"/>
+                </a:schemeClr>
+              </a:solidFill>
+              <a:latin typeface="Courier New" panose="02070309020205020404" pitchFamily="49" charset="0"/>
+              <a:cs typeface="Courier New" panose="02070309020205020404" pitchFamily="49" charset="0"/>
+            </a:endParaRPr>
+          </a:p>
+          <a:p>
+            <a:pPr algn="ctr"/>
+            <a:r>
+              <a:rPr lang="en-US" altLang="zh-TW" sz="1200" dirty="0">
+                <a:solidFill>
+                  <a:schemeClr val="bg1">
+                    <a:lumMod val="65000"/>
+                  </a:schemeClr>
+                </a:solidFill>
+                <a:latin typeface="Courier New" panose="02070309020205020404" pitchFamily="49" charset="0"/>
+                <a:cs typeface="Courier New" panose="02070309020205020404" pitchFamily="49" charset="0"/>
+              </a:rPr>
+              <a:t>(</a:t>
+            </a:r>
+            <a:r>
+              <a:rPr lang="zh-TW" altLang="en-US" sz="1200" dirty="0">
+                <a:solidFill>
+                  <a:schemeClr val="bg1">
+                    <a:lumMod val="65000"/>
+                  </a:schemeClr>
+                </a:solidFill>
+                <a:latin typeface="Courier New" panose="02070309020205020404" pitchFamily="49" charset="0"/>
+                <a:cs typeface="Courier New" panose="02070309020205020404" pitchFamily="49" charset="0"/>
+              </a:rPr>
+              <a:t>與遠端</a:t>
+            </a:r>
+            <a:r>
+              <a:rPr lang="en-US" altLang="zh-TW" sz="1200" dirty="0">
+                <a:solidFill>
+                  <a:schemeClr val="bg1">
+                    <a:lumMod val="65000"/>
+                  </a:schemeClr>
+                </a:solidFill>
+                <a:latin typeface="Courier New" panose="02070309020205020404" pitchFamily="49" charset="0"/>
+                <a:cs typeface="Courier New" panose="02070309020205020404" pitchFamily="49" charset="0"/>
+              </a:rPr>
+              <a:t>git</a:t>
+            </a:r>
+            <a:r>
+              <a:rPr lang="zh-TW" altLang="en-US" sz="1200" dirty="0">
+                <a:solidFill>
+                  <a:schemeClr val="bg1">
+                    <a:lumMod val="65000"/>
+                  </a:schemeClr>
+                </a:solidFill>
+                <a:latin typeface="Courier New" panose="02070309020205020404" pitchFamily="49" charset="0"/>
+                <a:cs typeface="Courier New" panose="02070309020205020404" pitchFamily="49" charset="0"/>
+              </a:rPr>
+              <a:t> </a:t>
+            </a:r>
+            <a:r>
+              <a:rPr lang="en-US" altLang="zh-TW" sz="1200" dirty="0">
+                <a:solidFill>
+                  <a:schemeClr val="bg1">
+                    <a:lumMod val="65000"/>
+                  </a:schemeClr>
+                </a:solidFill>
+                <a:latin typeface="Courier New" panose="02070309020205020404" pitchFamily="49" charset="0"/>
+                <a:cs typeface="Courier New" panose="02070309020205020404" pitchFamily="49" charset="0"/>
+              </a:rPr>
+              <a:t>repositor</a:t>
+            </a:r>
+            <a:r>
+              <a:rPr lang="zh-TW" altLang="en-US" sz="1200" dirty="0">
+                <a:solidFill>
+                  <a:schemeClr val="bg1">
+                    <a:lumMod val="65000"/>
+                  </a:schemeClr>
+                </a:solidFill>
+                <a:latin typeface="Courier New" panose="02070309020205020404" pitchFamily="49" charset="0"/>
+                <a:cs typeface="Courier New" panose="02070309020205020404" pitchFamily="49" charset="0"/>
+              </a:rPr>
+              <a:t>相同的資料內容</a:t>
+            </a:r>
+            <a:r>
+              <a:rPr lang="en-US" altLang="zh-TW" sz="1200" dirty="0">
+                <a:solidFill>
+                  <a:schemeClr val="bg1">
+                    <a:lumMod val="65000"/>
+                  </a:schemeClr>
+                </a:solidFill>
+                <a:latin typeface="Courier New" panose="02070309020205020404" pitchFamily="49" charset="0"/>
+                <a:cs typeface="Courier New" panose="02070309020205020404" pitchFamily="49" charset="0"/>
+              </a:rPr>
+              <a:t>)</a:t>
+            </a:r>
+          </a:p>
+        </p:txBody>
+      </p:sp>
+      <p:sp>
+        <p:nvSpPr>
+          <p:cNvPr id="9" name="文字方塊 8">
+            <a:extLst>
+              <a:ext uri="{FF2B5EF4-FFF2-40B4-BE49-F238E27FC236}">
+                <a16:creationId xmlns:a16="http://schemas.microsoft.com/office/drawing/2014/main" id="{4A8DDC12-9A75-AB04-9570-3EA587CC7131}"/>
+              </a:ext>
+            </a:extLst>
+          </p:cNvPr>
+          <p:cNvSpPr txBox="1"/>
+          <p:nvPr/>
+        </p:nvSpPr>
+        <p:spPr>
+          <a:xfrm>
+            <a:off x="1918377" y="3877170"/>
+            <a:ext cx="5854023" cy="461665"/>
+          </a:xfrm>
+          <a:prstGeom prst="rect">
+            <a:avLst/>
+          </a:prstGeom>
+          <a:noFill/>
+        </p:spPr>
+        <p:txBody>
+          <a:bodyPr wrap="square" rtlCol="0">
+            <a:spAutoFit/>
+          </a:bodyPr>
+          <a:lstStyle/>
+          <a:p>
+            <a:r>
+              <a:rPr lang="en-US" altLang="zh-TW" sz="1200" dirty="0">
+                <a:solidFill>
+                  <a:srgbClr val="00FF00"/>
+                </a:solidFill>
+                <a:latin typeface="Courier New" panose="02070309020205020404" pitchFamily="49" charset="0"/>
+                <a:cs typeface="Courier New" panose="02070309020205020404" pitchFamily="49" charset="0"/>
+              </a:rPr>
+              <a:t>tengc@MSI </a:t>
+            </a:r>
+            <a:r>
+              <a:rPr lang="en-US" altLang="zh-TW" sz="1200" dirty="0">
+                <a:solidFill>
+                  <a:srgbClr val="FF00FF"/>
+                </a:solidFill>
+                <a:latin typeface="Courier New" panose="02070309020205020404" pitchFamily="49" charset="0"/>
+                <a:cs typeface="Courier New" panose="02070309020205020404" pitchFamily="49" charset="0"/>
+              </a:rPr>
+              <a:t>MINGW64</a:t>
+            </a:r>
+            <a:r>
+              <a:rPr lang="en-US" altLang="zh-TW" sz="1200" dirty="0">
+                <a:solidFill>
+                  <a:srgbClr val="00FF00"/>
+                </a:solidFill>
+                <a:latin typeface="Courier New" panose="02070309020205020404" pitchFamily="49" charset="0"/>
+                <a:cs typeface="Courier New" panose="02070309020205020404" pitchFamily="49" charset="0"/>
+              </a:rPr>
+              <a:t> </a:t>
+            </a:r>
+            <a:r>
+              <a:rPr lang="en-US" altLang="zh-TW" sz="1200" dirty="0">
+                <a:solidFill>
+                  <a:srgbClr val="FFC000"/>
+                </a:solidFill>
+                <a:latin typeface="Courier New" panose="02070309020205020404" pitchFamily="49" charset="0"/>
+                <a:cs typeface="Courier New" panose="02070309020205020404" pitchFamily="49" charset="0"/>
+              </a:rPr>
+              <a:t>/d/Daniel_SIDE_PROJECT/clone_test</a:t>
+            </a:r>
+            <a:endParaRPr lang="en-US" altLang="zh-TW" sz="1200" dirty="0">
+              <a:solidFill>
+                <a:srgbClr val="33CCCC"/>
+              </a:solidFill>
+              <a:latin typeface="Courier New" panose="02070309020205020404" pitchFamily="49" charset="0"/>
+              <a:cs typeface="Courier New" panose="02070309020205020404" pitchFamily="49" charset="0"/>
+            </a:endParaRPr>
+          </a:p>
+          <a:p>
+            <a:r>
+              <a:rPr lang="en-US" altLang="zh-TW" sz="1200" dirty="0">
+                <a:solidFill>
+                  <a:schemeClr val="bg1"/>
+                </a:solidFill>
+                <a:latin typeface="Courier New" panose="02070309020205020404" pitchFamily="49" charset="0"/>
+                <a:cs typeface="Courier New" panose="02070309020205020404" pitchFamily="49" charset="0"/>
+              </a:rPr>
+              <a:t>$</a:t>
+            </a:r>
+            <a:r>
+              <a:rPr lang="en-US" altLang="zh-TW" sz="1200" dirty="0">
+                <a:solidFill>
+                  <a:srgbClr val="00FF00"/>
+                </a:solidFill>
+                <a:latin typeface="Courier New" panose="02070309020205020404" pitchFamily="49" charset="0"/>
+                <a:cs typeface="Courier New" panose="02070309020205020404" pitchFamily="49" charset="0"/>
+              </a:rPr>
+              <a:t> git clone d:/Daniel_SIDE_PROJECT/TestDoc/RemoteGit.git</a:t>
+            </a:r>
+          </a:p>
+        </p:txBody>
+      </p:sp>
+      <p:sp>
+        <p:nvSpPr>
+          <p:cNvPr id="12" name="文字方塊 11">
+            <a:extLst>
+              <a:ext uri="{FF2B5EF4-FFF2-40B4-BE49-F238E27FC236}">
+                <a16:creationId xmlns:a16="http://schemas.microsoft.com/office/drawing/2014/main" id="{67E96BE7-C838-22D6-A2E7-A3E3DBCB7C55}"/>
+              </a:ext>
+            </a:extLst>
+          </p:cNvPr>
+          <p:cNvSpPr txBox="1"/>
+          <p:nvPr/>
+        </p:nvSpPr>
+        <p:spPr>
+          <a:xfrm>
+            <a:off x="7353667" y="3987061"/>
+            <a:ext cx="4003019" cy="276999"/>
+          </a:xfrm>
+          <a:prstGeom prst="rect">
+            <a:avLst/>
+          </a:prstGeom>
+          <a:noFill/>
+        </p:spPr>
+        <p:txBody>
+          <a:bodyPr wrap="square" rtlCol="0">
+            <a:spAutoFit/>
+          </a:bodyPr>
+          <a:lstStyle/>
+          <a:p>
+            <a:r>
+              <a:rPr lang="zh-TW" altLang="en-US" sz="1200" dirty="0">
+                <a:solidFill>
+                  <a:schemeClr val="bg1"/>
+                </a:solidFill>
+                <a:latin typeface="Courier New" panose="02070309020205020404" pitchFamily="49" charset="0"/>
+                <a:cs typeface="Courier New" panose="02070309020205020404" pitchFamily="49" charset="0"/>
+              </a:rPr>
+              <a:t>語法 </a:t>
+            </a:r>
+            <a:r>
+              <a:rPr lang="en-US" altLang="zh-TW" sz="1200" dirty="0">
+                <a:solidFill>
+                  <a:schemeClr val="bg1"/>
+                </a:solidFill>
+                <a:latin typeface="Courier New" panose="02070309020205020404" pitchFamily="49" charset="0"/>
+                <a:cs typeface="Courier New" panose="02070309020205020404" pitchFamily="49" charset="0"/>
+              </a:rPr>
+              <a:t>:</a:t>
+            </a:r>
+            <a:r>
+              <a:rPr lang="zh-TW" altLang="en-US" sz="1200" dirty="0">
+                <a:solidFill>
+                  <a:schemeClr val="bg1"/>
+                </a:solidFill>
+                <a:latin typeface="Courier New" panose="02070309020205020404" pitchFamily="49" charset="0"/>
+                <a:cs typeface="Courier New" panose="02070309020205020404" pitchFamily="49" charset="0"/>
+              </a:rPr>
+              <a:t> </a:t>
+            </a:r>
+            <a:r>
+              <a:rPr lang="en-US" altLang="zh-TW" sz="1200" dirty="0">
+                <a:solidFill>
+                  <a:schemeClr val="bg1"/>
+                </a:solidFill>
+                <a:latin typeface="Courier New" panose="02070309020205020404" pitchFamily="49" charset="0"/>
+                <a:cs typeface="Courier New" panose="02070309020205020404" pitchFamily="49" charset="0"/>
+              </a:rPr>
+              <a:t>$</a:t>
+            </a:r>
+            <a:r>
+              <a:rPr lang="zh-TW" altLang="en-US" sz="1200" dirty="0">
+                <a:solidFill>
+                  <a:schemeClr val="bg1"/>
+                </a:solidFill>
+                <a:latin typeface="Courier New" panose="02070309020205020404" pitchFamily="49" charset="0"/>
+                <a:cs typeface="Courier New" panose="02070309020205020404" pitchFamily="49" charset="0"/>
+              </a:rPr>
+              <a:t> </a:t>
+            </a:r>
+            <a:r>
+              <a:rPr lang="en-US" altLang="zh-TW" sz="1200" dirty="0">
+                <a:solidFill>
+                  <a:schemeClr val="bg1"/>
+                </a:solidFill>
+                <a:latin typeface="Courier New" panose="02070309020205020404" pitchFamily="49" charset="0"/>
+                <a:cs typeface="Courier New" panose="02070309020205020404" pitchFamily="49" charset="0"/>
+              </a:rPr>
+              <a:t>git </a:t>
+            </a:r>
+            <a:r>
+              <a:rPr lang="zh-TW" altLang="en-US" sz="1200" dirty="0">
+                <a:solidFill>
+                  <a:schemeClr val="bg1"/>
+                </a:solidFill>
+                <a:latin typeface="Courier New" panose="02070309020205020404" pitchFamily="49" charset="0"/>
+                <a:cs typeface="Courier New" panose="02070309020205020404" pitchFamily="49" charset="0"/>
+              </a:rPr>
+              <a:t>命令</a:t>
+            </a:r>
+            <a:r>
+              <a:rPr lang="en-US" altLang="zh-TW" sz="1200" dirty="0">
+                <a:solidFill>
+                  <a:schemeClr val="bg1"/>
+                </a:solidFill>
+                <a:latin typeface="Courier New" panose="02070309020205020404" pitchFamily="49" charset="0"/>
+                <a:cs typeface="Courier New" panose="02070309020205020404" pitchFamily="49" charset="0"/>
+              </a:rPr>
+              <a:t>(clone) </a:t>
+            </a:r>
+            <a:r>
+              <a:rPr lang="zh-TW" altLang="en-US" sz="1200" dirty="0">
+                <a:solidFill>
+                  <a:schemeClr val="bg1"/>
+                </a:solidFill>
+                <a:latin typeface="Courier New" panose="02070309020205020404" pitchFamily="49" charset="0"/>
+                <a:cs typeface="Courier New" panose="02070309020205020404" pitchFamily="49" charset="0"/>
+              </a:rPr>
+              <a:t>參數</a:t>
+            </a:r>
+            <a:r>
+              <a:rPr lang="en-US" altLang="zh-TW" sz="1200" dirty="0">
+                <a:solidFill>
+                  <a:schemeClr val="bg1"/>
+                </a:solidFill>
+                <a:latin typeface="Courier New" panose="02070309020205020404" pitchFamily="49" charset="0"/>
+                <a:cs typeface="Courier New" panose="02070309020205020404" pitchFamily="49" charset="0"/>
+              </a:rPr>
+              <a:t>(</a:t>
+            </a:r>
+            <a:r>
+              <a:rPr lang="zh-TW" altLang="en-US" sz="1200" dirty="0">
+                <a:solidFill>
+                  <a:schemeClr val="bg1"/>
+                </a:solidFill>
+                <a:latin typeface="Courier New" panose="02070309020205020404" pitchFamily="49" charset="0"/>
+                <a:cs typeface="Courier New" panose="02070309020205020404" pitchFamily="49" charset="0"/>
+              </a:rPr>
+              <a:t>遠端節點的</a:t>
+            </a:r>
+            <a:r>
+              <a:rPr lang="en-US" altLang="zh-TW" sz="1200" dirty="0">
+                <a:solidFill>
+                  <a:schemeClr val="bg1"/>
+                </a:solidFill>
+                <a:latin typeface="Courier New" panose="02070309020205020404" pitchFamily="49" charset="0"/>
+                <a:cs typeface="Courier New" panose="02070309020205020404" pitchFamily="49" charset="0"/>
+              </a:rPr>
+              <a:t>URL)</a:t>
+            </a:r>
+            <a:endParaRPr lang="en-US" altLang="zh-TW" sz="1200" dirty="0">
+              <a:solidFill>
+                <a:srgbClr val="33CCCC"/>
+              </a:solidFill>
+              <a:latin typeface="Courier New" panose="02070309020205020404" pitchFamily="49" charset="0"/>
+              <a:cs typeface="Courier New" panose="02070309020205020404" pitchFamily="49" charset="0"/>
+            </a:endParaRPr>
+          </a:p>
+        </p:txBody>
+      </p:sp>
+      <p:pic>
+        <p:nvPicPr>
+          <p:cNvPr id="14" name="圖片 13">
+            <a:extLst>
+              <a:ext uri="{FF2B5EF4-FFF2-40B4-BE49-F238E27FC236}">
+                <a16:creationId xmlns:a16="http://schemas.microsoft.com/office/drawing/2014/main" id="{492FC85C-2A0A-EBA7-92F9-B547E58A371D}"/>
+              </a:ext>
+            </a:extLst>
+          </p:cNvPr>
+          <p:cNvPicPr>
+            <a:picLocks noChangeAspect="1"/>
+          </p:cNvPicPr>
+          <p:nvPr/>
+        </p:nvPicPr>
+        <p:blipFill>
+          <a:blip r:embed="rId2"/>
+          <a:stretch>
+            <a:fillRect/>
+          </a:stretch>
+        </p:blipFill>
+        <p:spPr>
+          <a:xfrm>
+            <a:off x="1972166" y="4815220"/>
+            <a:ext cx="4873346" cy="669875"/>
+          </a:xfrm>
+          <a:prstGeom prst="rect">
+            <a:avLst/>
+          </a:prstGeom>
+        </p:spPr>
+      </p:pic>
+      <p:pic>
+        <p:nvPicPr>
+          <p:cNvPr id="16" name="圖片 15">
+            <a:extLst>
+              <a:ext uri="{FF2B5EF4-FFF2-40B4-BE49-F238E27FC236}">
+                <a16:creationId xmlns:a16="http://schemas.microsoft.com/office/drawing/2014/main" id="{17A26E90-04F3-1D47-34C8-8BA38B4F8886}"/>
+              </a:ext>
+            </a:extLst>
+          </p:cNvPr>
+          <p:cNvPicPr>
+            <a:picLocks noChangeAspect="1"/>
+          </p:cNvPicPr>
+          <p:nvPr/>
+        </p:nvPicPr>
+        <p:blipFill>
+          <a:blip r:embed="rId3"/>
+          <a:stretch>
+            <a:fillRect/>
+          </a:stretch>
+        </p:blipFill>
+        <p:spPr>
+          <a:xfrm>
+            <a:off x="7541926" y="4786171"/>
+            <a:ext cx="3012296" cy="727972"/>
+          </a:xfrm>
+          <a:prstGeom prst="rect">
+            <a:avLst/>
+          </a:prstGeom>
+        </p:spPr>
+      </p:pic>
+    </p:spTree>
+    <p:extLst>
+      <p:ext uri="{BB962C8B-B14F-4D97-AF65-F5344CB8AC3E}">
+        <p14:creationId xmlns:p14="http://schemas.microsoft.com/office/powerpoint/2010/main" val="961174090"/>
+      </p:ext>
+    </p:extLst>
+  </p:cSld>
+  <p:clrMapOvr>
+    <a:masterClrMapping/>
+  </p:clrMapOvr>
+</p:sld>
+</file>
+
+<file path=ppt/slides/slide13.xml><?xml version="1.0" encoding="utf-8"?>
+<p:sld xmlns:a="http://schemas.openxmlformats.org/drawingml/2006/main" xmlns:r="http://schemas.openxmlformats.org/officeDocument/2006/relationships" xmlns:p="http://schemas.openxmlformats.org/presentationml/2006/main">
+  <p:cSld>
+    <p:bg>
+      <p:bgPr>
+        <a:solidFill>
+          <a:schemeClr val="tx1">
+            <a:lumMod val="75000"/>
+            <a:lumOff val="25000"/>
+          </a:schemeClr>
+        </a:solidFill>
+        <a:effectLst/>
+      </p:bgPr>
+    </p:bg>
+    <p:spTree>
+      <p:nvGrpSpPr>
+        <p:cNvPr id="1" name="">
+          <a:extLst>
+            <a:ext uri="{FF2B5EF4-FFF2-40B4-BE49-F238E27FC236}">
+              <a16:creationId xmlns:a16="http://schemas.microsoft.com/office/drawing/2014/main" id="{8346F350-29EB-5802-A831-30FEAB3E8ADB}"/>
+            </a:ext>
+          </a:extLst>
+        </p:cNvPr>
+        <p:cNvGrpSpPr/>
+        <p:nvPr/>
+      </p:nvGrpSpPr>
+      <p:grpSpPr>
+        <a:xfrm>
+          <a:off x="0" y="0"/>
+          <a:ext cx="0" cy="0"/>
+          <a:chOff x="0" y="0"/>
+          <a:chExt cx="0" cy="0"/>
+        </a:xfrm>
+      </p:grpSpPr>
+      <p:sp>
+        <p:nvSpPr>
+          <p:cNvPr id="2" name="標題 1">
+            <a:extLst>
+              <a:ext uri="{FF2B5EF4-FFF2-40B4-BE49-F238E27FC236}">
+                <a16:creationId xmlns:a16="http://schemas.microsoft.com/office/drawing/2014/main" id="{B45814E1-0D07-DF36-BF95-E4D00FA9AAAE}"/>
+              </a:ext>
+            </a:extLst>
+          </p:cNvPr>
+          <p:cNvSpPr>
+            <a:spLocks noGrp="1"/>
+          </p:cNvSpPr>
+          <p:nvPr>
+            <p:ph type="title"/>
+          </p:nvPr>
+        </p:nvSpPr>
+        <p:spPr>
+          <a:xfrm>
+            <a:off x="640079" y="1102718"/>
+            <a:ext cx="10890929" cy="662474"/>
+          </a:xfrm>
+        </p:spPr>
+        <p:txBody>
+          <a:bodyPr anchor="ctr" anchorCtr="0">
+            <a:normAutofit/>
+          </a:bodyPr>
+          <a:lstStyle/>
+          <a:p>
+            <a:r>
+              <a:rPr lang="en-US" altLang="zh-TW" sz="3200" dirty="0">
+                <a:solidFill>
+                  <a:srgbClr val="FFC000"/>
+                </a:solidFill>
+              </a:rPr>
+              <a:t>Git Bash – Command Line</a:t>
+            </a:r>
+            <a:endParaRPr lang="zh-TW" altLang="en-US" sz="3200" dirty="0">
+              <a:solidFill>
+                <a:srgbClr val="FFC000"/>
+              </a:solidFill>
+            </a:endParaRPr>
+          </a:p>
+        </p:txBody>
+      </p:sp>
+      <p:sp>
+        <p:nvSpPr>
+          <p:cNvPr id="3" name="內容版面配置區 2">
+            <a:extLst>
+              <a:ext uri="{FF2B5EF4-FFF2-40B4-BE49-F238E27FC236}">
+                <a16:creationId xmlns:a16="http://schemas.microsoft.com/office/drawing/2014/main" id="{2D0A11D7-C4A5-9A8A-FFD3-492AD1210420}"/>
+              </a:ext>
+            </a:extLst>
+          </p:cNvPr>
+          <p:cNvSpPr>
+            <a:spLocks noGrp="1"/>
+          </p:cNvSpPr>
+          <p:nvPr>
+            <p:ph idx="1"/>
+          </p:nvPr>
+        </p:nvSpPr>
+        <p:spPr>
+          <a:xfrm>
+            <a:off x="797097" y="1765192"/>
+            <a:ext cx="5496127" cy="547027"/>
+          </a:xfrm>
+        </p:spPr>
+        <p:txBody>
+          <a:bodyPr anchor="ctr" anchorCtr="0">
+            <a:noAutofit/>
+          </a:bodyPr>
+          <a:lstStyle/>
+          <a:p>
+            <a:pPr>
+              <a:buFont typeface="Wingdings" panose="05000000000000000000" pitchFamily="2" charset="2"/>
+              <a:buChar char="l"/>
+            </a:pPr>
+            <a:r>
+              <a:rPr lang="zh-TW" altLang="en-US" dirty="0">
+                <a:solidFill>
+                  <a:srgbClr val="00B0F0"/>
+                </a:solidFill>
+              </a:rPr>
+              <a:t> </a:t>
+            </a:r>
+            <a:r>
+              <a:rPr lang="en-US" altLang="zh-TW" dirty="0">
+                <a:solidFill>
+                  <a:srgbClr val="00B0F0"/>
+                </a:solidFill>
+              </a:rPr>
+              <a:t>Push(</a:t>
+            </a:r>
+            <a:r>
+              <a:rPr lang="zh-TW" altLang="en-US" dirty="0">
+                <a:solidFill>
+                  <a:srgbClr val="00B0F0"/>
+                </a:solidFill>
+              </a:rPr>
+              <a:t>推送</a:t>
+            </a:r>
+            <a:r>
+              <a:rPr lang="en-US" altLang="zh-TW" dirty="0">
+                <a:solidFill>
+                  <a:srgbClr val="00B0F0"/>
+                </a:solidFill>
+              </a:rPr>
+              <a:t>)</a:t>
+            </a:r>
+            <a:r>
+              <a:rPr lang="zh-TW" altLang="en-US" dirty="0">
+                <a:solidFill>
+                  <a:srgbClr val="00B0F0"/>
+                </a:solidFill>
+              </a:rPr>
+              <a:t>數據到遠端</a:t>
+            </a:r>
+            <a:r>
+              <a:rPr lang="en-US" altLang="zh-TW" dirty="0">
+                <a:solidFill>
+                  <a:srgbClr val="00B0F0"/>
+                </a:solidFill>
+              </a:rPr>
+              <a:t>Git</a:t>
+            </a:r>
+            <a:r>
+              <a:rPr lang="zh-TW" altLang="en-US" dirty="0">
+                <a:solidFill>
+                  <a:srgbClr val="00B0F0"/>
+                </a:solidFill>
+              </a:rPr>
+              <a:t> </a:t>
+            </a:r>
+            <a:r>
+              <a:rPr lang="en-US" altLang="zh-TW" dirty="0">
+                <a:solidFill>
+                  <a:srgbClr val="00B0F0"/>
+                </a:solidFill>
+              </a:rPr>
+              <a:t>Repository</a:t>
+            </a:r>
+            <a:r>
+              <a:rPr lang="zh-TW" altLang="en-US" dirty="0">
+                <a:solidFill>
+                  <a:srgbClr val="00B0F0"/>
+                </a:solidFill>
+              </a:rPr>
+              <a:t>目錄</a:t>
+            </a:r>
+          </a:p>
+        </p:txBody>
+      </p:sp>
+      <p:sp>
+        <p:nvSpPr>
+          <p:cNvPr id="4" name="文字方塊 3">
+            <a:extLst>
+              <a:ext uri="{FF2B5EF4-FFF2-40B4-BE49-F238E27FC236}">
+                <a16:creationId xmlns:a16="http://schemas.microsoft.com/office/drawing/2014/main" id="{2C87BD18-FA3B-985B-54C0-EF9B35A851F1}"/>
+              </a:ext>
+            </a:extLst>
+          </p:cNvPr>
+          <p:cNvSpPr txBox="1"/>
+          <p:nvPr/>
+        </p:nvSpPr>
+        <p:spPr>
+          <a:xfrm>
+            <a:off x="1717954" y="2625876"/>
+            <a:ext cx="9918234" cy="387927"/>
+          </a:xfrm>
+          <a:prstGeom prst="rect">
+            <a:avLst/>
+          </a:prstGeom>
+          <a:noFill/>
+        </p:spPr>
+        <p:txBody>
+          <a:bodyPr wrap="square" rtlCol="0">
+            <a:spAutoFit/>
+          </a:bodyPr>
+          <a:lstStyle/>
+          <a:p>
+            <a:pPr>
+              <a:lnSpc>
+                <a:spcPct val="150000"/>
+              </a:lnSpc>
+            </a:pPr>
+            <a:r>
+              <a:rPr lang="zh-TW" altLang="en-US" sz="1400" dirty="0">
+                <a:solidFill>
+                  <a:schemeClr val="bg1"/>
+                </a:solidFill>
+                <a:latin typeface="Courier New" panose="02070309020205020404" pitchFamily="49" charset="0"/>
+                <a:cs typeface="Courier New" panose="02070309020205020404" pitchFamily="49" charset="0"/>
+              </a:rPr>
+              <a:t>將剛才</a:t>
+            </a:r>
+            <a:r>
+              <a:rPr lang="en-US" altLang="zh-TW" sz="1400" dirty="0">
+                <a:solidFill>
+                  <a:schemeClr val="bg1"/>
+                </a:solidFill>
+                <a:latin typeface="Courier New" panose="02070309020205020404" pitchFamily="49" charset="0"/>
+                <a:cs typeface="Courier New" panose="02070309020205020404" pitchFamily="49" charset="0"/>
+              </a:rPr>
+              <a:t>clone</a:t>
+            </a:r>
+            <a:r>
+              <a:rPr lang="zh-TW" altLang="en-US" sz="1400" dirty="0">
+                <a:solidFill>
+                  <a:schemeClr val="bg1"/>
+                </a:solidFill>
+                <a:latin typeface="Courier New" panose="02070309020205020404" pitchFamily="49" charset="0"/>
+                <a:cs typeface="Courier New" panose="02070309020205020404" pitchFamily="49" charset="0"/>
+              </a:rPr>
+              <a:t>下來的資料版本內容進行修改，修改完後使用</a:t>
+            </a:r>
+            <a:r>
+              <a:rPr lang="en-US" altLang="zh-TW" sz="1400" dirty="0">
+                <a:solidFill>
+                  <a:schemeClr val="bg1"/>
+                </a:solidFill>
+                <a:latin typeface="Courier New" panose="02070309020205020404" pitchFamily="49" charset="0"/>
+                <a:cs typeface="Courier New" panose="02070309020205020404" pitchFamily="49" charset="0"/>
+              </a:rPr>
+              <a:t>“git</a:t>
+            </a:r>
+            <a:r>
+              <a:rPr lang="zh-TW" altLang="en-US" sz="1400" dirty="0">
+                <a:solidFill>
+                  <a:schemeClr val="bg1"/>
+                </a:solidFill>
+                <a:latin typeface="Courier New" panose="02070309020205020404" pitchFamily="49" charset="0"/>
+                <a:cs typeface="Courier New" panose="02070309020205020404" pitchFamily="49" charset="0"/>
+              </a:rPr>
+              <a:t> </a:t>
+            </a:r>
+            <a:r>
+              <a:rPr lang="en-US" altLang="zh-TW" sz="1400" dirty="0">
+                <a:solidFill>
+                  <a:schemeClr val="bg1"/>
+                </a:solidFill>
+                <a:latin typeface="Courier New" panose="02070309020205020404" pitchFamily="49" charset="0"/>
+                <a:cs typeface="Courier New" panose="02070309020205020404" pitchFamily="49" charset="0"/>
+              </a:rPr>
+              <a:t>add”</a:t>
+            </a:r>
+            <a:r>
+              <a:rPr lang="zh-TW" altLang="en-US" sz="1400" dirty="0">
+                <a:solidFill>
+                  <a:schemeClr val="bg1"/>
+                </a:solidFill>
+                <a:latin typeface="Courier New" panose="02070309020205020404" pitchFamily="49" charset="0"/>
+                <a:cs typeface="Courier New" panose="02070309020205020404" pitchFamily="49" charset="0"/>
+              </a:rPr>
+              <a:t>與 </a:t>
+            </a:r>
+            <a:r>
+              <a:rPr lang="en-US" altLang="zh-TW" sz="1400" dirty="0">
+                <a:solidFill>
+                  <a:schemeClr val="bg1"/>
+                </a:solidFill>
+                <a:latin typeface="Courier New" panose="02070309020205020404" pitchFamily="49" charset="0"/>
+                <a:cs typeface="Courier New" panose="02070309020205020404" pitchFamily="49" charset="0"/>
+              </a:rPr>
+              <a:t>“git</a:t>
+            </a:r>
+            <a:r>
+              <a:rPr lang="zh-TW" altLang="en-US" sz="1400" dirty="0">
+                <a:solidFill>
+                  <a:schemeClr val="bg1"/>
+                </a:solidFill>
+                <a:latin typeface="Courier New" panose="02070309020205020404" pitchFamily="49" charset="0"/>
+                <a:cs typeface="Courier New" panose="02070309020205020404" pitchFamily="49" charset="0"/>
+              </a:rPr>
+              <a:t> </a:t>
+            </a:r>
+            <a:r>
+              <a:rPr lang="en-US" altLang="zh-TW" sz="1400" dirty="0">
+                <a:solidFill>
+                  <a:schemeClr val="bg1"/>
+                </a:solidFill>
+                <a:latin typeface="Courier New" panose="02070309020205020404" pitchFamily="49" charset="0"/>
+                <a:cs typeface="Courier New" panose="02070309020205020404" pitchFamily="49" charset="0"/>
+              </a:rPr>
+              <a:t>commit”</a:t>
+            </a:r>
+            <a:r>
+              <a:rPr lang="zh-TW" altLang="en-US" sz="1400" dirty="0">
+                <a:solidFill>
+                  <a:schemeClr val="bg1"/>
+                </a:solidFill>
+                <a:latin typeface="Courier New" panose="02070309020205020404" pitchFamily="49" charset="0"/>
+                <a:cs typeface="Courier New" panose="02070309020205020404" pitchFamily="49" charset="0"/>
+              </a:rPr>
+              <a:t>指令更新本地端</a:t>
+            </a:r>
+            <a:r>
+              <a:rPr lang="en-US" altLang="zh-TW" sz="1400" dirty="0">
+                <a:solidFill>
+                  <a:schemeClr val="bg1"/>
+                </a:solidFill>
+                <a:latin typeface="Courier New" panose="02070309020205020404" pitchFamily="49" charset="0"/>
+                <a:cs typeface="Courier New" panose="02070309020205020404" pitchFamily="49" charset="0"/>
+              </a:rPr>
+              <a:t>git</a:t>
+            </a:r>
+            <a:r>
+              <a:rPr lang="zh-TW" altLang="en-US" sz="1400" dirty="0">
+                <a:solidFill>
+                  <a:schemeClr val="bg1"/>
+                </a:solidFill>
+                <a:latin typeface="Courier New" panose="02070309020205020404" pitchFamily="49" charset="0"/>
+                <a:cs typeface="Courier New" panose="02070309020205020404" pitchFamily="49" charset="0"/>
+              </a:rPr>
+              <a:t>數據庫</a:t>
+            </a:r>
+            <a:endParaRPr lang="zh-TW" altLang="en-US" sz="1400" dirty="0">
+              <a:solidFill>
+                <a:srgbClr val="00FF00"/>
+              </a:solidFill>
+              <a:latin typeface="Courier New" panose="02070309020205020404" pitchFamily="49" charset="0"/>
+              <a:cs typeface="Courier New" panose="02070309020205020404" pitchFamily="49" charset="0"/>
+            </a:endParaRPr>
+          </a:p>
+        </p:txBody>
+      </p:sp>
+      <p:sp>
+        <p:nvSpPr>
+          <p:cNvPr id="5" name="內容版面配置區 2">
+            <a:extLst>
+              <a:ext uri="{FF2B5EF4-FFF2-40B4-BE49-F238E27FC236}">
+                <a16:creationId xmlns:a16="http://schemas.microsoft.com/office/drawing/2014/main" id="{F7DC9E2C-C41E-0635-73ED-0EDD9A15459F}"/>
+              </a:ext>
+            </a:extLst>
+          </p:cNvPr>
+          <p:cNvSpPr txBox="1">
+            <a:spLocks/>
+          </p:cNvSpPr>
+          <p:nvPr/>
+        </p:nvSpPr>
+        <p:spPr>
+          <a:xfrm>
+            <a:off x="1340358" y="2289256"/>
+            <a:ext cx="3168889" cy="442048"/>
+          </a:xfrm>
+          <a:prstGeom prst="rect">
+            <a:avLst/>
+          </a:prstGeom>
+        </p:spPr>
+        <p:txBody>
+          <a:bodyPr vert="horz" lIns="91440" tIns="45720" rIns="91440" bIns="45720" rtlCol="0" anchor="ctr" anchorCtr="0">
+            <a:normAutofit/>
+          </a:bodyPr>
+          <a:lstStyle>
+            <a:lvl1pPr marL="228600" indent="-228600" algn="l" defTabSz="914400" rtl="0" eaLnBrk="1" latinLnBrk="0" hangingPunct="1">
+              <a:lnSpc>
+                <a:spcPct val="120000"/>
+              </a:lnSpc>
+              <a:spcBef>
+                <a:spcPts val="1000"/>
+              </a:spcBef>
+              <a:buSzPct val="87000"/>
+              <a:buFont typeface="Arial" panose="020B0604020202020204" pitchFamily="34" charset="0"/>
+              <a:buChar char="•"/>
+              <a:defRPr sz="2000" kern="1200">
+                <a:solidFill>
+                  <a:schemeClr val="tx1"/>
+                </a:solidFill>
+                <a:latin typeface="+mn-lt"/>
+                <a:ea typeface="+mn-ea"/>
+                <a:cs typeface="+mn-cs"/>
+              </a:defRPr>
+            </a:lvl1pPr>
+            <a:lvl2pPr marL="493776" indent="-228600" algn="l" defTabSz="914400" rtl="0" eaLnBrk="1" latinLnBrk="0" hangingPunct="1">
+              <a:lnSpc>
+                <a:spcPct val="120000"/>
+              </a:lnSpc>
+              <a:spcBef>
+                <a:spcPts val="500"/>
+              </a:spcBef>
+              <a:buSzPct val="87000"/>
+              <a:buFont typeface="Arial" panose="020B0604020202020204" pitchFamily="34" charset="0"/>
+              <a:buChar char="•"/>
+              <a:defRPr sz="1800" kern="1200">
+                <a:solidFill>
+                  <a:schemeClr val="tx1"/>
+                </a:solidFill>
+                <a:latin typeface="+mn-lt"/>
+                <a:ea typeface="+mn-ea"/>
+                <a:cs typeface="+mn-cs"/>
+              </a:defRPr>
+            </a:lvl2pPr>
+            <a:lvl3pPr marL="731520" indent="-228600" algn="l" defTabSz="914400" rtl="0" eaLnBrk="1" latinLnBrk="0" hangingPunct="1">
+              <a:lnSpc>
+                <a:spcPct val="120000"/>
+              </a:lnSpc>
+              <a:spcBef>
+                <a:spcPts val="500"/>
+              </a:spcBef>
+              <a:buSzPct val="87000"/>
+              <a:buFont typeface="Arial" panose="020B0604020202020204" pitchFamily="34" charset="0"/>
+              <a:buChar char="•"/>
+              <a:defRPr sz="1600" kern="1200">
+                <a:solidFill>
+                  <a:schemeClr val="tx1"/>
+                </a:solidFill>
+                <a:latin typeface="+mn-lt"/>
+                <a:ea typeface="+mn-ea"/>
+                <a:cs typeface="+mn-cs"/>
+              </a:defRPr>
+            </a:lvl3pPr>
+            <a:lvl4pPr marL="1051560" indent="-285750" algn="l" defTabSz="914400" rtl="0" eaLnBrk="1" latinLnBrk="0" hangingPunct="1">
+              <a:lnSpc>
+                <a:spcPct val="120000"/>
+              </a:lnSpc>
+              <a:spcBef>
+                <a:spcPts val="500"/>
+              </a:spcBef>
+              <a:buSzPct val="87000"/>
+              <a:buFont typeface="Arial" panose="020B0604020202020204" pitchFamily="34" charset="0"/>
+              <a:buChar char="•"/>
+              <a:defRPr sz="1400" kern="1200">
+                <a:solidFill>
+                  <a:schemeClr val="tx1"/>
+                </a:solidFill>
+                <a:latin typeface="+mn-lt"/>
+                <a:ea typeface="+mn-ea"/>
+                <a:cs typeface="+mn-cs"/>
+              </a:defRPr>
+            </a:lvl4pPr>
+            <a:lvl5pPr marL="1298448" indent="-228600" algn="l" defTabSz="914400" rtl="0" eaLnBrk="1" latinLnBrk="0" hangingPunct="1">
+              <a:lnSpc>
+                <a:spcPct val="120000"/>
+              </a:lnSpc>
+              <a:spcBef>
+                <a:spcPts val="500"/>
+              </a:spcBef>
+              <a:buSzPct val="87000"/>
+              <a:buFont typeface="Arial" panose="020B0604020202020204" pitchFamily="34" charset="0"/>
+              <a:buChar char="•"/>
+              <a:defRPr sz="1400" kern="1200">
+                <a:solidFill>
+                  <a:schemeClr val="tx1"/>
+                </a:solidFill>
+                <a:latin typeface="+mn-lt"/>
+                <a:ea typeface="+mn-ea"/>
+                <a:cs typeface="+mn-cs"/>
+              </a:defRPr>
+            </a:lvl5pPr>
+            <a:lvl6pPr marL="2514600" indent="-228600" algn="l" defTabSz="914400" rtl="0" eaLnBrk="1" latinLnBrk="0" hangingPunct="1">
+              <a:lnSpc>
+                <a:spcPct val="90000"/>
+              </a:lnSpc>
+              <a:spcBef>
+                <a:spcPts val="500"/>
+              </a:spcBef>
+              <a:buFont typeface="Arial" panose="020B0604020202020204" pitchFamily="34" charset="0"/>
+              <a:buChar char="•"/>
+              <a:defRPr sz="1800" kern="1200">
+                <a:solidFill>
+                  <a:schemeClr val="tx1"/>
+                </a:solidFill>
+                <a:latin typeface="+mn-lt"/>
+                <a:ea typeface="+mn-ea"/>
+                <a:cs typeface="+mn-cs"/>
+              </a:defRPr>
+            </a:lvl6pPr>
+            <a:lvl7pPr marL="2971800" indent="-228600" algn="l" defTabSz="914400" rtl="0" eaLnBrk="1" latinLnBrk="0" hangingPunct="1">
+              <a:lnSpc>
+                <a:spcPct val="90000"/>
+              </a:lnSpc>
+              <a:spcBef>
+                <a:spcPts val="500"/>
+              </a:spcBef>
+              <a:buFont typeface="Arial" panose="020B0604020202020204" pitchFamily="34" charset="0"/>
+              <a:buChar char="•"/>
+              <a:defRPr sz="1800" kern="1200">
+                <a:solidFill>
+                  <a:schemeClr val="tx1"/>
+                </a:solidFill>
+                <a:latin typeface="+mn-lt"/>
+                <a:ea typeface="+mn-ea"/>
+                <a:cs typeface="+mn-cs"/>
+              </a:defRPr>
+            </a:lvl7pPr>
+            <a:lvl8pPr marL="3429000" indent="-228600" algn="l" defTabSz="914400" rtl="0" eaLnBrk="1" latinLnBrk="0" hangingPunct="1">
+              <a:lnSpc>
+                <a:spcPct val="90000"/>
+              </a:lnSpc>
+              <a:spcBef>
+                <a:spcPts val="500"/>
+              </a:spcBef>
+              <a:buFont typeface="Arial" panose="020B0604020202020204" pitchFamily="34" charset="0"/>
+              <a:buChar char="•"/>
+              <a:defRPr sz="1800" kern="1200">
+                <a:solidFill>
+                  <a:schemeClr val="tx1"/>
+                </a:solidFill>
+                <a:latin typeface="+mn-lt"/>
+                <a:ea typeface="+mn-ea"/>
+                <a:cs typeface="+mn-cs"/>
+              </a:defRPr>
+            </a:lvl8pPr>
+            <a:lvl9pPr marL="3886200" indent="-228600" algn="l" defTabSz="914400" rtl="0" eaLnBrk="1" latinLnBrk="0" hangingPunct="1">
+              <a:lnSpc>
+                <a:spcPct val="90000"/>
+              </a:lnSpc>
+              <a:spcBef>
+                <a:spcPts val="500"/>
+              </a:spcBef>
+              <a:buFont typeface="Arial" panose="020B0604020202020204" pitchFamily="34" charset="0"/>
+              <a:buChar char="•"/>
+              <a:defRPr sz="1800" kern="1200">
+                <a:solidFill>
+                  <a:schemeClr val="tx1"/>
+                </a:solidFill>
+                <a:latin typeface="+mn-lt"/>
+                <a:ea typeface="+mn-ea"/>
+                <a:cs typeface="+mn-cs"/>
+              </a:defRPr>
+            </a:lvl9pPr>
+          </a:lstStyle>
+          <a:p>
+            <a:pPr>
+              <a:buFont typeface="Wingdings" panose="05000000000000000000" pitchFamily="2" charset="2"/>
+              <a:buChar char="Ø"/>
+            </a:pPr>
+            <a:r>
+              <a:rPr lang="zh-TW" altLang="en-US" sz="1600" dirty="0">
+                <a:solidFill>
+                  <a:schemeClr val="bg1"/>
+                </a:solidFill>
+              </a:rPr>
+              <a:t>修改</a:t>
+            </a:r>
+            <a:r>
+              <a:rPr lang="en-US" altLang="zh-TW" sz="1600" dirty="0">
+                <a:solidFill>
+                  <a:schemeClr val="bg1"/>
+                </a:solidFill>
+              </a:rPr>
+              <a:t>clone</a:t>
+            </a:r>
+            <a:r>
+              <a:rPr lang="zh-TW" altLang="en-US" sz="1600" dirty="0">
+                <a:solidFill>
+                  <a:schemeClr val="bg1"/>
+                </a:solidFill>
+              </a:rPr>
+              <a:t>下來的文件</a:t>
+            </a:r>
+          </a:p>
+        </p:txBody>
+      </p:sp>
+      <p:sp>
+        <p:nvSpPr>
+          <p:cNvPr id="12" name="文字方塊 11">
+            <a:extLst>
+              <a:ext uri="{FF2B5EF4-FFF2-40B4-BE49-F238E27FC236}">
+                <a16:creationId xmlns:a16="http://schemas.microsoft.com/office/drawing/2014/main" id="{BE68ED56-69C6-7C26-5D80-9EF4CD91C474}"/>
+              </a:ext>
+            </a:extLst>
+          </p:cNvPr>
+          <p:cNvSpPr txBox="1"/>
+          <p:nvPr/>
+        </p:nvSpPr>
+        <p:spPr>
+          <a:xfrm>
+            <a:off x="4583572" y="3085829"/>
+            <a:ext cx="2373039" cy="276999"/>
+          </a:xfrm>
+          <a:prstGeom prst="rect">
+            <a:avLst/>
+          </a:prstGeom>
+          <a:noFill/>
+        </p:spPr>
+        <p:txBody>
+          <a:bodyPr wrap="square" rtlCol="0">
+            <a:spAutoFit/>
+          </a:bodyPr>
+          <a:lstStyle/>
+          <a:p>
+            <a:r>
+              <a:rPr lang="zh-TW" altLang="en-US" sz="1200" dirty="0">
+                <a:solidFill>
+                  <a:srgbClr val="00FF00"/>
+                </a:solidFill>
+                <a:latin typeface="Courier New" panose="02070309020205020404" pitchFamily="49" charset="0"/>
+                <a:cs typeface="Courier New" panose="02070309020205020404" pitchFamily="49" charset="0"/>
+              </a:rPr>
+              <a:t>參考</a:t>
+            </a:r>
+            <a:r>
+              <a:rPr lang="en-US" altLang="zh-TW" sz="1200" dirty="0">
+                <a:solidFill>
+                  <a:srgbClr val="00FF00"/>
+                </a:solidFill>
+                <a:latin typeface="Courier New" panose="02070309020205020404" pitchFamily="49" charset="0"/>
+                <a:cs typeface="Courier New" panose="02070309020205020404" pitchFamily="49" charset="0"/>
+              </a:rPr>
+              <a:t>page 8 and page 9</a:t>
+            </a:r>
+          </a:p>
+        </p:txBody>
+      </p:sp>
+      <p:sp>
+        <p:nvSpPr>
+          <p:cNvPr id="6" name="內容版面配置區 2">
+            <a:extLst>
+              <a:ext uri="{FF2B5EF4-FFF2-40B4-BE49-F238E27FC236}">
+                <a16:creationId xmlns:a16="http://schemas.microsoft.com/office/drawing/2014/main" id="{3513B655-33FF-DB38-FCF3-07F80694BC5C}"/>
+              </a:ext>
+            </a:extLst>
+          </p:cNvPr>
+          <p:cNvSpPr txBox="1">
+            <a:spLocks/>
+          </p:cNvSpPr>
+          <p:nvPr/>
+        </p:nvSpPr>
+        <p:spPr>
+          <a:xfrm>
+            <a:off x="1340358" y="3370964"/>
+            <a:ext cx="3168889" cy="442048"/>
+          </a:xfrm>
+          <a:prstGeom prst="rect">
+            <a:avLst/>
+          </a:prstGeom>
+        </p:spPr>
+        <p:txBody>
+          <a:bodyPr vert="horz" lIns="91440" tIns="45720" rIns="91440" bIns="45720" rtlCol="0" anchor="ctr" anchorCtr="0">
+            <a:normAutofit/>
+          </a:bodyPr>
+          <a:lstStyle>
+            <a:lvl1pPr marL="228600" indent="-228600" algn="l" defTabSz="914400" rtl="0" eaLnBrk="1" latinLnBrk="0" hangingPunct="1">
+              <a:lnSpc>
+                <a:spcPct val="120000"/>
+              </a:lnSpc>
+              <a:spcBef>
+                <a:spcPts val="1000"/>
+              </a:spcBef>
+              <a:buSzPct val="87000"/>
+              <a:buFont typeface="Arial" panose="020B0604020202020204" pitchFamily="34" charset="0"/>
+              <a:buChar char="•"/>
+              <a:defRPr sz="2000" kern="1200">
+                <a:solidFill>
+                  <a:schemeClr val="tx1"/>
+                </a:solidFill>
+                <a:latin typeface="+mn-lt"/>
+                <a:ea typeface="+mn-ea"/>
+                <a:cs typeface="+mn-cs"/>
+              </a:defRPr>
+            </a:lvl1pPr>
+            <a:lvl2pPr marL="493776" indent="-228600" algn="l" defTabSz="914400" rtl="0" eaLnBrk="1" latinLnBrk="0" hangingPunct="1">
+              <a:lnSpc>
+                <a:spcPct val="120000"/>
+              </a:lnSpc>
+              <a:spcBef>
+                <a:spcPts val="500"/>
+              </a:spcBef>
+              <a:buSzPct val="87000"/>
+              <a:buFont typeface="Arial" panose="020B0604020202020204" pitchFamily="34" charset="0"/>
+              <a:buChar char="•"/>
+              <a:defRPr sz="1800" kern="1200">
+                <a:solidFill>
+                  <a:schemeClr val="tx1"/>
+                </a:solidFill>
+                <a:latin typeface="+mn-lt"/>
+                <a:ea typeface="+mn-ea"/>
+                <a:cs typeface="+mn-cs"/>
+              </a:defRPr>
+            </a:lvl2pPr>
+            <a:lvl3pPr marL="731520" indent="-228600" algn="l" defTabSz="914400" rtl="0" eaLnBrk="1" latinLnBrk="0" hangingPunct="1">
+              <a:lnSpc>
+                <a:spcPct val="120000"/>
+              </a:lnSpc>
+              <a:spcBef>
+                <a:spcPts val="500"/>
+              </a:spcBef>
+              <a:buSzPct val="87000"/>
+              <a:buFont typeface="Arial" panose="020B0604020202020204" pitchFamily="34" charset="0"/>
+              <a:buChar char="•"/>
+              <a:defRPr sz="1600" kern="1200">
+                <a:solidFill>
+                  <a:schemeClr val="tx1"/>
+                </a:solidFill>
+                <a:latin typeface="+mn-lt"/>
+                <a:ea typeface="+mn-ea"/>
+                <a:cs typeface="+mn-cs"/>
+              </a:defRPr>
+            </a:lvl3pPr>
+            <a:lvl4pPr marL="1051560" indent="-285750" algn="l" defTabSz="914400" rtl="0" eaLnBrk="1" latinLnBrk="0" hangingPunct="1">
+              <a:lnSpc>
+                <a:spcPct val="120000"/>
+              </a:lnSpc>
+              <a:spcBef>
+                <a:spcPts val="500"/>
+              </a:spcBef>
+              <a:buSzPct val="87000"/>
+              <a:buFont typeface="Arial" panose="020B0604020202020204" pitchFamily="34" charset="0"/>
+              <a:buChar char="•"/>
+              <a:defRPr sz="1400" kern="1200">
+                <a:solidFill>
+                  <a:schemeClr val="tx1"/>
+                </a:solidFill>
+                <a:latin typeface="+mn-lt"/>
+                <a:ea typeface="+mn-ea"/>
+                <a:cs typeface="+mn-cs"/>
+              </a:defRPr>
+            </a:lvl4pPr>
+            <a:lvl5pPr marL="1298448" indent="-228600" algn="l" defTabSz="914400" rtl="0" eaLnBrk="1" latinLnBrk="0" hangingPunct="1">
+              <a:lnSpc>
+                <a:spcPct val="120000"/>
+              </a:lnSpc>
+              <a:spcBef>
+                <a:spcPts val="500"/>
+              </a:spcBef>
+              <a:buSzPct val="87000"/>
+              <a:buFont typeface="Arial" panose="020B0604020202020204" pitchFamily="34" charset="0"/>
+              <a:buChar char="•"/>
+              <a:defRPr sz="1400" kern="1200">
+                <a:solidFill>
+                  <a:schemeClr val="tx1"/>
+                </a:solidFill>
+                <a:latin typeface="+mn-lt"/>
+                <a:ea typeface="+mn-ea"/>
+                <a:cs typeface="+mn-cs"/>
+              </a:defRPr>
+            </a:lvl5pPr>
+            <a:lvl6pPr marL="2514600" indent="-228600" algn="l" defTabSz="914400" rtl="0" eaLnBrk="1" latinLnBrk="0" hangingPunct="1">
+              <a:lnSpc>
+                <a:spcPct val="90000"/>
+              </a:lnSpc>
+              <a:spcBef>
+                <a:spcPts val="500"/>
+              </a:spcBef>
+              <a:buFont typeface="Arial" panose="020B0604020202020204" pitchFamily="34" charset="0"/>
+              <a:buChar char="•"/>
+              <a:defRPr sz="1800" kern="1200">
+                <a:solidFill>
+                  <a:schemeClr val="tx1"/>
+                </a:solidFill>
+                <a:latin typeface="+mn-lt"/>
+                <a:ea typeface="+mn-ea"/>
+                <a:cs typeface="+mn-cs"/>
+              </a:defRPr>
+            </a:lvl6pPr>
+            <a:lvl7pPr marL="2971800" indent="-228600" algn="l" defTabSz="914400" rtl="0" eaLnBrk="1" latinLnBrk="0" hangingPunct="1">
+              <a:lnSpc>
+                <a:spcPct val="90000"/>
+              </a:lnSpc>
+              <a:spcBef>
+                <a:spcPts val="500"/>
+              </a:spcBef>
+              <a:buFont typeface="Arial" panose="020B0604020202020204" pitchFamily="34" charset="0"/>
+              <a:buChar char="•"/>
+              <a:defRPr sz="1800" kern="1200">
+                <a:solidFill>
+                  <a:schemeClr val="tx1"/>
+                </a:solidFill>
+                <a:latin typeface="+mn-lt"/>
+                <a:ea typeface="+mn-ea"/>
+                <a:cs typeface="+mn-cs"/>
+              </a:defRPr>
+            </a:lvl7pPr>
+            <a:lvl8pPr marL="3429000" indent="-228600" algn="l" defTabSz="914400" rtl="0" eaLnBrk="1" latinLnBrk="0" hangingPunct="1">
+              <a:lnSpc>
+                <a:spcPct val="90000"/>
+              </a:lnSpc>
+              <a:spcBef>
+                <a:spcPts val="500"/>
+              </a:spcBef>
+              <a:buFont typeface="Arial" panose="020B0604020202020204" pitchFamily="34" charset="0"/>
+              <a:buChar char="•"/>
+              <a:defRPr sz="1800" kern="1200">
+                <a:solidFill>
+                  <a:schemeClr val="tx1"/>
+                </a:solidFill>
+                <a:latin typeface="+mn-lt"/>
+                <a:ea typeface="+mn-ea"/>
+                <a:cs typeface="+mn-cs"/>
+              </a:defRPr>
+            </a:lvl8pPr>
+            <a:lvl9pPr marL="3886200" indent="-228600" algn="l" defTabSz="914400" rtl="0" eaLnBrk="1" latinLnBrk="0" hangingPunct="1">
+              <a:lnSpc>
+                <a:spcPct val="90000"/>
+              </a:lnSpc>
+              <a:spcBef>
+                <a:spcPts val="500"/>
+              </a:spcBef>
+              <a:buFont typeface="Arial" panose="020B0604020202020204" pitchFamily="34" charset="0"/>
+              <a:buChar char="•"/>
+              <a:defRPr sz="1800" kern="1200">
+                <a:solidFill>
+                  <a:schemeClr val="tx1"/>
+                </a:solidFill>
+                <a:latin typeface="+mn-lt"/>
+                <a:ea typeface="+mn-ea"/>
+                <a:cs typeface="+mn-cs"/>
+              </a:defRPr>
+            </a:lvl9pPr>
+          </a:lstStyle>
+          <a:p>
+            <a:pPr>
+              <a:buFont typeface="Wingdings" panose="05000000000000000000" pitchFamily="2" charset="2"/>
+              <a:buChar char="Ø"/>
+            </a:pPr>
+            <a:r>
+              <a:rPr lang="zh-TW" altLang="en-US" sz="1600" dirty="0">
+                <a:solidFill>
+                  <a:schemeClr val="bg1"/>
+                </a:solidFill>
+              </a:rPr>
+              <a:t>推送</a:t>
+            </a:r>
+            <a:r>
+              <a:rPr lang="en-US" altLang="zh-TW" sz="1600" dirty="0">
+                <a:solidFill>
+                  <a:schemeClr val="bg1"/>
+                </a:solidFill>
+              </a:rPr>
+              <a:t>Git</a:t>
+            </a:r>
+            <a:r>
+              <a:rPr lang="zh-TW" altLang="en-US" sz="1600" dirty="0">
+                <a:solidFill>
+                  <a:schemeClr val="bg1"/>
+                </a:solidFill>
+              </a:rPr>
+              <a:t>到遠端數據庫</a:t>
+            </a:r>
+          </a:p>
+        </p:txBody>
+      </p:sp>
+      <p:sp>
+        <p:nvSpPr>
+          <p:cNvPr id="8" name="文字方塊 7">
+            <a:extLst>
+              <a:ext uri="{FF2B5EF4-FFF2-40B4-BE49-F238E27FC236}">
+                <a16:creationId xmlns:a16="http://schemas.microsoft.com/office/drawing/2014/main" id="{7B0F3A7E-0B7F-98BA-BFF8-B19C7BF3790C}"/>
+              </a:ext>
+            </a:extLst>
+          </p:cNvPr>
+          <p:cNvSpPr txBox="1"/>
+          <p:nvPr/>
+        </p:nvSpPr>
+        <p:spPr>
+          <a:xfrm>
+            <a:off x="1981129" y="4312943"/>
+            <a:ext cx="6616023" cy="461665"/>
+          </a:xfrm>
+          <a:prstGeom prst="rect">
+            <a:avLst/>
+          </a:prstGeom>
+          <a:noFill/>
+        </p:spPr>
+        <p:txBody>
+          <a:bodyPr wrap="square" rtlCol="0">
+            <a:spAutoFit/>
+          </a:bodyPr>
+          <a:lstStyle/>
+          <a:p>
+            <a:r>
+              <a:rPr lang="en-US" altLang="zh-TW" sz="1200" dirty="0">
+                <a:solidFill>
+                  <a:srgbClr val="00FF00"/>
+                </a:solidFill>
+                <a:latin typeface="Courier New" panose="02070309020205020404" pitchFamily="49" charset="0"/>
+                <a:cs typeface="Courier New" panose="02070309020205020404" pitchFamily="49" charset="0"/>
+              </a:rPr>
+              <a:t>tengc@MSI </a:t>
+            </a:r>
+            <a:r>
+              <a:rPr lang="en-US" altLang="zh-TW" sz="1200" dirty="0">
+                <a:solidFill>
+                  <a:srgbClr val="FF00FF"/>
+                </a:solidFill>
+                <a:latin typeface="Courier New" panose="02070309020205020404" pitchFamily="49" charset="0"/>
+                <a:cs typeface="Courier New" panose="02070309020205020404" pitchFamily="49" charset="0"/>
+              </a:rPr>
+              <a:t>MINGW64</a:t>
+            </a:r>
+            <a:r>
+              <a:rPr lang="en-US" altLang="zh-TW" sz="1200" dirty="0">
+                <a:solidFill>
+                  <a:srgbClr val="00FF00"/>
+                </a:solidFill>
+                <a:latin typeface="Courier New" panose="02070309020205020404" pitchFamily="49" charset="0"/>
+                <a:cs typeface="Courier New" panose="02070309020205020404" pitchFamily="49" charset="0"/>
+              </a:rPr>
+              <a:t> </a:t>
+            </a:r>
+            <a:r>
+              <a:rPr lang="en-US" altLang="zh-TW" sz="1200" dirty="0">
+                <a:solidFill>
+                  <a:srgbClr val="FFC000"/>
+                </a:solidFill>
+                <a:latin typeface="Courier New" panose="02070309020205020404" pitchFamily="49" charset="0"/>
+                <a:cs typeface="Courier New" panose="02070309020205020404" pitchFamily="49" charset="0"/>
+              </a:rPr>
+              <a:t>/d/Daniel_SIDE_PROJECT/clone_test/RemoteGit </a:t>
+            </a:r>
+            <a:r>
+              <a:rPr lang="en-US" altLang="zh-TW" sz="1200" dirty="0">
+                <a:solidFill>
+                  <a:srgbClr val="33CCCC"/>
+                </a:solidFill>
+                <a:latin typeface="Courier New" panose="02070309020205020404" pitchFamily="49" charset="0"/>
+                <a:cs typeface="Courier New" panose="02070309020205020404" pitchFamily="49" charset="0"/>
+              </a:rPr>
+              <a:t>(master)</a:t>
+            </a:r>
+          </a:p>
+          <a:p>
+            <a:r>
+              <a:rPr lang="en-US" altLang="zh-TW" sz="1200" dirty="0">
+                <a:solidFill>
+                  <a:schemeClr val="bg1"/>
+                </a:solidFill>
+                <a:latin typeface="Courier New" panose="02070309020205020404" pitchFamily="49" charset="0"/>
+                <a:cs typeface="Courier New" panose="02070309020205020404" pitchFamily="49" charset="0"/>
+              </a:rPr>
+              <a:t>$</a:t>
+            </a:r>
+            <a:r>
+              <a:rPr lang="en-US" altLang="zh-TW" sz="1200" dirty="0">
+                <a:solidFill>
+                  <a:srgbClr val="00FF00"/>
+                </a:solidFill>
+                <a:latin typeface="Courier New" panose="02070309020205020404" pitchFamily="49" charset="0"/>
+                <a:cs typeface="Courier New" panose="02070309020205020404" pitchFamily="49" charset="0"/>
+              </a:rPr>
+              <a:t> git push</a:t>
+            </a:r>
+          </a:p>
+        </p:txBody>
+      </p:sp>
+      <p:sp>
+        <p:nvSpPr>
+          <p:cNvPr id="10" name="文字方塊 9">
+            <a:extLst>
+              <a:ext uri="{FF2B5EF4-FFF2-40B4-BE49-F238E27FC236}">
+                <a16:creationId xmlns:a16="http://schemas.microsoft.com/office/drawing/2014/main" id="{8A1D02AB-9E96-9746-1104-B5D5193788C2}"/>
+              </a:ext>
+            </a:extLst>
+          </p:cNvPr>
+          <p:cNvSpPr txBox="1"/>
+          <p:nvPr/>
+        </p:nvSpPr>
+        <p:spPr>
+          <a:xfrm>
+            <a:off x="1717954" y="3869014"/>
+            <a:ext cx="3920846" cy="387927"/>
+          </a:xfrm>
+          <a:prstGeom prst="rect">
+            <a:avLst/>
+          </a:prstGeom>
+          <a:noFill/>
+        </p:spPr>
+        <p:txBody>
+          <a:bodyPr wrap="square" rtlCol="0">
+            <a:spAutoFit/>
+          </a:bodyPr>
+          <a:lstStyle/>
+          <a:p>
+            <a:pPr>
+              <a:lnSpc>
+                <a:spcPct val="150000"/>
+              </a:lnSpc>
+            </a:pPr>
+            <a:r>
+              <a:rPr lang="zh-TW" altLang="en-US" sz="1400" dirty="0">
+                <a:solidFill>
+                  <a:schemeClr val="bg1"/>
+                </a:solidFill>
+                <a:latin typeface="Courier New" panose="02070309020205020404" pitchFamily="49" charset="0"/>
+                <a:cs typeface="Courier New" panose="02070309020205020404" pitchFamily="49" charset="0"/>
+              </a:rPr>
+              <a:t>使用</a:t>
+            </a:r>
+            <a:r>
+              <a:rPr lang="en-US" altLang="zh-TW" sz="1400" dirty="0">
+                <a:solidFill>
+                  <a:schemeClr val="bg1"/>
+                </a:solidFill>
+                <a:latin typeface="Courier New" panose="02070309020205020404" pitchFamily="49" charset="0"/>
+                <a:cs typeface="Courier New" panose="02070309020205020404" pitchFamily="49" charset="0"/>
+              </a:rPr>
+              <a:t>“push”</a:t>
+            </a:r>
+            <a:r>
+              <a:rPr lang="zh-TW" altLang="en-US" sz="1400" dirty="0">
+                <a:solidFill>
+                  <a:schemeClr val="bg1"/>
+                </a:solidFill>
+                <a:latin typeface="Courier New" panose="02070309020205020404" pitchFamily="49" charset="0"/>
+                <a:cs typeface="Courier New" panose="02070309020205020404" pitchFamily="49" charset="0"/>
+              </a:rPr>
+              <a:t>指令進行版本推送</a:t>
+            </a:r>
+            <a:endParaRPr lang="zh-TW" altLang="en-US" sz="1400" dirty="0">
+              <a:solidFill>
+                <a:srgbClr val="00FF00"/>
+              </a:solidFill>
+              <a:latin typeface="Courier New" panose="02070309020205020404" pitchFamily="49" charset="0"/>
+              <a:cs typeface="Courier New" panose="02070309020205020404" pitchFamily="49" charset="0"/>
+            </a:endParaRPr>
+          </a:p>
+        </p:txBody>
+      </p:sp>
+      <p:pic>
+        <p:nvPicPr>
+          <p:cNvPr id="13" name="圖片 12">
+            <a:extLst>
+              <a:ext uri="{FF2B5EF4-FFF2-40B4-BE49-F238E27FC236}">
+                <a16:creationId xmlns:a16="http://schemas.microsoft.com/office/drawing/2014/main" id="{91F0B3AB-45D9-9572-EF87-AF62FBE46B08}"/>
+              </a:ext>
+            </a:extLst>
+          </p:cNvPr>
+          <p:cNvPicPr>
+            <a:picLocks noChangeAspect="1"/>
+          </p:cNvPicPr>
+          <p:nvPr/>
+        </p:nvPicPr>
+        <p:blipFill>
+          <a:blip r:embed="rId2"/>
+          <a:stretch>
+            <a:fillRect/>
+          </a:stretch>
+        </p:blipFill>
+        <p:spPr>
+          <a:xfrm>
+            <a:off x="3382863" y="4760609"/>
+            <a:ext cx="4774455" cy="1259643"/>
+          </a:xfrm>
+          <a:prstGeom prst="rect">
+            <a:avLst/>
+          </a:prstGeom>
+        </p:spPr>
+      </p:pic>
+      <p:sp>
+        <p:nvSpPr>
+          <p:cNvPr id="15" name="文字方塊 14">
+            <a:extLst>
+              <a:ext uri="{FF2B5EF4-FFF2-40B4-BE49-F238E27FC236}">
+                <a16:creationId xmlns:a16="http://schemas.microsoft.com/office/drawing/2014/main" id="{5583B6C8-FF61-114A-D752-2AF432419AC3}"/>
+              </a:ext>
+            </a:extLst>
+          </p:cNvPr>
+          <p:cNvSpPr txBox="1"/>
+          <p:nvPr/>
+        </p:nvSpPr>
+        <p:spPr>
+          <a:xfrm>
+            <a:off x="1416423" y="6237085"/>
+            <a:ext cx="8931244" cy="461665"/>
+          </a:xfrm>
+          <a:prstGeom prst="rect">
+            <a:avLst/>
+          </a:prstGeom>
+          <a:noFill/>
+        </p:spPr>
+        <p:txBody>
+          <a:bodyPr wrap="square" rtlCol="0">
+            <a:spAutoFit/>
+          </a:bodyPr>
+          <a:lstStyle/>
+          <a:p>
+            <a:pPr algn="ctr"/>
+            <a:r>
+              <a:rPr lang="zh-TW" altLang="en-US" sz="1200" dirty="0">
+                <a:solidFill>
+                  <a:schemeClr val="bg1">
+                    <a:lumMod val="65000"/>
+                  </a:schemeClr>
+                </a:solidFill>
+                <a:latin typeface="Courier New" panose="02070309020205020404" pitchFamily="49" charset="0"/>
+                <a:cs typeface="Courier New" panose="02070309020205020404" pitchFamily="49" charset="0"/>
+              </a:rPr>
+              <a:t>顯示推送版本到遠端</a:t>
+            </a:r>
+            <a:r>
+              <a:rPr lang="en-US" altLang="zh-TW" sz="1200" dirty="0">
+                <a:solidFill>
+                  <a:schemeClr val="bg1">
+                    <a:lumMod val="65000"/>
+                  </a:schemeClr>
+                </a:solidFill>
+                <a:latin typeface="Courier New" panose="02070309020205020404" pitchFamily="49" charset="0"/>
+                <a:cs typeface="Courier New" panose="02070309020205020404" pitchFamily="49" charset="0"/>
+              </a:rPr>
+              <a:t>git</a:t>
+            </a:r>
+            <a:r>
+              <a:rPr lang="zh-TW" altLang="en-US" sz="1200" dirty="0">
+                <a:solidFill>
+                  <a:schemeClr val="bg1">
+                    <a:lumMod val="65000"/>
+                  </a:schemeClr>
+                </a:solidFill>
+                <a:latin typeface="Courier New" panose="02070309020205020404" pitchFamily="49" charset="0"/>
+                <a:cs typeface="Courier New" panose="02070309020205020404" pitchFamily="49" charset="0"/>
+              </a:rPr>
+              <a:t>數據庫的信息以及要推送本地端某個分支到遠端的分支節點，以左圖例，即是將本地端</a:t>
+            </a:r>
+            <a:r>
+              <a:rPr lang="en-US" altLang="zh-TW" sz="1200" dirty="0">
+                <a:solidFill>
+                  <a:schemeClr val="bg1">
+                    <a:lumMod val="65000"/>
+                  </a:schemeClr>
+                </a:solidFill>
+                <a:latin typeface="Courier New" panose="02070309020205020404" pitchFamily="49" charset="0"/>
+                <a:cs typeface="Courier New" panose="02070309020205020404" pitchFamily="49" charset="0"/>
+              </a:rPr>
+              <a:t>master</a:t>
+            </a:r>
+            <a:r>
+              <a:rPr lang="zh-TW" altLang="en-US" sz="1200" dirty="0">
+                <a:solidFill>
+                  <a:schemeClr val="bg1">
+                    <a:lumMod val="65000"/>
+                  </a:schemeClr>
+                </a:solidFill>
+                <a:latin typeface="Courier New" panose="02070309020205020404" pitchFamily="49" charset="0"/>
+                <a:cs typeface="Courier New" panose="02070309020205020404" pitchFamily="49" charset="0"/>
+              </a:rPr>
+              <a:t>分支節點推送到遠端的</a:t>
+            </a:r>
+            <a:r>
+              <a:rPr lang="en-US" altLang="zh-TW" sz="1200" dirty="0">
+                <a:solidFill>
+                  <a:schemeClr val="bg1">
+                    <a:lumMod val="65000"/>
+                  </a:schemeClr>
+                </a:solidFill>
+                <a:latin typeface="Courier New" panose="02070309020205020404" pitchFamily="49" charset="0"/>
+                <a:cs typeface="Courier New" panose="02070309020205020404" pitchFamily="49" charset="0"/>
+              </a:rPr>
+              <a:t>master</a:t>
+            </a:r>
+            <a:r>
+              <a:rPr lang="zh-TW" altLang="en-US" sz="1200" dirty="0">
+                <a:solidFill>
+                  <a:schemeClr val="bg1">
+                    <a:lumMod val="65000"/>
+                  </a:schemeClr>
+                </a:solidFill>
+                <a:latin typeface="Courier New" panose="02070309020205020404" pitchFamily="49" charset="0"/>
+                <a:cs typeface="Courier New" panose="02070309020205020404" pitchFamily="49" charset="0"/>
+              </a:rPr>
+              <a:t>分支節點</a:t>
+            </a:r>
+            <a:endParaRPr lang="en-US" altLang="zh-TW" sz="1200" dirty="0">
+              <a:solidFill>
+                <a:schemeClr val="bg1">
+                  <a:lumMod val="65000"/>
+                </a:schemeClr>
+              </a:solidFill>
+              <a:latin typeface="Courier New" panose="02070309020205020404" pitchFamily="49" charset="0"/>
+              <a:cs typeface="Courier New" panose="02070309020205020404" pitchFamily="49" charset="0"/>
+            </a:endParaRPr>
+          </a:p>
+        </p:txBody>
+      </p:sp>
+    </p:spTree>
+    <p:extLst>
+      <p:ext uri="{BB962C8B-B14F-4D97-AF65-F5344CB8AC3E}">
+        <p14:creationId xmlns:p14="http://schemas.microsoft.com/office/powerpoint/2010/main" val="637548206"/>
+      </p:ext>
+    </p:extLst>
+  </p:cSld>
+  <p:clrMapOvr>
+    <a:masterClrMapping/>
+  </p:clrMapOvr>
+</p:sld>
+</file>
+
+<file path=ppt/slides/slide14.xml><?xml version="1.0" encoding="utf-8"?>
 <p:sld xmlns:a="http://schemas.openxmlformats.org/drawingml/2006/main" xmlns:r="http://schemas.openxmlformats.org/officeDocument/2006/relationships" xmlns:p="http://schemas.openxmlformats.org/presentationml/2006/main">
   <p:cSld>
     <p:spTree>

</xml_diff>

<commit_message>
modify power point file-20251124
</commit_message>
<xml_diff>
--- a/GitHub_note.pptx
+++ b/GitHub_note.pptx
@@ -14,17 +14,19 @@
     <p:sldId id="262" r:id="rId8"/>
     <p:sldId id="263" r:id="rId9"/>
     <p:sldId id="264" r:id="rId10"/>
-    <p:sldId id="265" r:id="rId11"/>
-    <p:sldId id="267" r:id="rId12"/>
-    <p:sldId id="268" r:id="rId13"/>
-    <p:sldId id="269" r:id="rId14"/>
-    <p:sldId id="270" r:id="rId15"/>
-    <p:sldId id="271" r:id="rId16"/>
-    <p:sldId id="272" r:id="rId17"/>
-    <p:sldId id="273" r:id="rId18"/>
-    <p:sldId id="274" r:id="rId19"/>
-    <p:sldId id="275" r:id="rId20"/>
-    <p:sldId id="266" r:id="rId21"/>
+    <p:sldId id="276" r:id="rId11"/>
+    <p:sldId id="265" r:id="rId12"/>
+    <p:sldId id="267" r:id="rId13"/>
+    <p:sldId id="268" r:id="rId14"/>
+    <p:sldId id="269" r:id="rId15"/>
+    <p:sldId id="277" r:id="rId16"/>
+    <p:sldId id="270" r:id="rId17"/>
+    <p:sldId id="271" r:id="rId18"/>
+    <p:sldId id="272" r:id="rId19"/>
+    <p:sldId id="273" r:id="rId20"/>
+    <p:sldId id="274" r:id="rId21"/>
+    <p:sldId id="275" r:id="rId22"/>
+    <p:sldId id="266" r:id="rId23"/>
   </p:sldIdLst>
   <p:sldSz cx="12192000" cy="6858000"/>
   <p:notesSz cx="6858000" cy="9144000"/>
@@ -287,7 +289,7 @@
           <a:p>
             <a:fld id="{6444479B-705B-4489-957E-7E8A228BDFA0}" type="datetime1">
               <a:rPr lang="en-US" smtClean="0"/>
-              <a:t>11/17/2025</a:t>
+              <a:t>11/24/2025</a:t>
             </a:fld>
             <a:endParaRPr lang="en-US"/>
           </a:p>
@@ -487,7 +489,7 @@
           <a:p>
             <a:fld id="{C07B66AD-7C08-490A-ADA4-B47E10FB2407}" type="datetime1">
               <a:rPr lang="en-US" smtClean="0"/>
-              <a:t>11/17/2025</a:t>
+              <a:t>11/24/2025</a:t>
             </a:fld>
             <a:endParaRPr lang="en-US"/>
           </a:p>
@@ -746,7 +748,7 @@
           <a:p>
             <a:fld id="{05B95027-4255-49E7-9841-CD21BCC99996}" type="datetime1">
               <a:rPr lang="en-US" smtClean="0"/>
-              <a:t>11/17/2025</a:t>
+              <a:t>11/24/2025</a:t>
             </a:fld>
             <a:endParaRPr lang="en-US"/>
           </a:p>
@@ -987,7 +989,7 @@
           <a:p>
             <a:fld id="{9F89F774-3FA6-43B8-9241-99959C8FD463}" type="datetime1">
               <a:rPr lang="en-US" smtClean="0"/>
-              <a:t>11/17/2025</a:t>
+              <a:t>11/24/2025</a:t>
             </a:fld>
             <a:endParaRPr lang="en-US"/>
           </a:p>
@@ -1314,7 +1316,7 @@
           <a:p>
             <a:fld id="{F9504452-5DCC-4FE2-A5C9-8A5EF6714D65}" type="datetime1">
               <a:rPr lang="en-US" smtClean="0"/>
-              <a:t>11/17/2025</a:t>
+              <a:t>11/24/2025</a:t>
             </a:fld>
             <a:endParaRPr lang="en-US"/>
           </a:p>
@@ -1624,7 +1626,7 @@
           <a:p>
             <a:fld id="{E579ABC2-0180-4F3A-A895-A85BC724D472}" type="datetime1">
               <a:rPr lang="en-US" smtClean="0"/>
-              <a:t>11/17/2025</a:t>
+              <a:t>11/24/2025</a:t>
             </a:fld>
             <a:endParaRPr lang="en-US"/>
           </a:p>
@@ -2042,7 +2044,7 @@
           <a:p>
             <a:fld id="{6AEEA9BA-4E8F-439E-BEA4-91FBA01E3F5F}" type="datetime1">
               <a:rPr lang="en-US" smtClean="0"/>
-              <a:t>11/17/2025</a:t>
+              <a:t>11/24/2025</a:t>
             </a:fld>
             <a:endParaRPr lang="en-US"/>
           </a:p>
@@ -2184,7 +2186,7 @@
           <a:p>
             <a:fld id="{BE15BF18-0007-481C-AA29-413124BC3EE7}" type="datetime1">
               <a:rPr lang="en-US" smtClean="0"/>
-              <a:t>11/17/2025</a:t>
+              <a:t>11/24/2025</a:t>
             </a:fld>
             <a:endParaRPr lang="en-US"/>
           </a:p>
@@ -2346,7 +2348,7 @@
           <a:p>
             <a:fld id="{09BE9870-3748-43AD-B547-02A075CB4A1D}" type="datetime1">
               <a:rPr lang="en-US" smtClean="0"/>
-              <a:t>11/17/2025</a:t>
+              <a:t>11/24/2025</a:t>
             </a:fld>
             <a:endParaRPr lang="en-US"/>
           </a:p>
@@ -2663,7 +2665,7 @@
           <a:p>
             <a:fld id="{558E7897-33C5-4F1A-9307-D068E37F3DC7}" type="datetime1">
               <a:rPr lang="en-US" smtClean="0"/>
-              <a:t>11/17/2025</a:t>
+              <a:t>11/24/2025</a:t>
             </a:fld>
             <a:endParaRPr lang="en-US"/>
           </a:p>
@@ -2958,7 +2960,7 @@
           <a:p>
             <a:fld id="{82E171BA-CC09-47C8-A6DF-F5C5CB59CEEC}" type="datetime1">
               <a:rPr lang="en-US" smtClean="0"/>
-              <a:t>11/17/2025</a:t>
+              <a:t>11/24/2025</a:t>
             </a:fld>
             <a:endParaRPr lang="en-US"/>
           </a:p>
@@ -3199,7 +3201,7 @@
           <a:p>
             <a:fld id="{7DA38F49-B3E2-4BF0-BEC7-C30D34ABBB8D}" type="datetime1">
               <a:rPr lang="en-US" smtClean="0"/>
-              <a:t>11/17/2025</a:t>
+              <a:t>11/24/2025</a:t>
             </a:fld>
             <a:endParaRPr lang="en-US"/>
           </a:p>
@@ -4019,6 +4021,961 @@
         <p:cNvPr id="1" name="">
           <a:extLst>
             <a:ext uri="{FF2B5EF4-FFF2-40B4-BE49-F238E27FC236}">
+              <a16:creationId xmlns:a16="http://schemas.microsoft.com/office/drawing/2014/main" id="{DAFDD00A-0995-D6EB-3242-75514E443CAF}"/>
+            </a:ext>
+          </a:extLst>
+        </p:cNvPr>
+        <p:cNvGrpSpPr/>
+        <p:nvPr/>
+      </p:nvGrpSpPr>
+      <p:grpSpPr>
+        <a:xfrm>
+          <a:off x="0" y="0"/>
+          <a:ext cx="0" cy="0"/>
+          <a:chOff x="0" y="0"/>
+          <a:chExt cx="0" cy="0"/>
+        </a:xfrm>
+      </p:grpSpPr>
+      <p:sp>
+        <p:nvSpPr>
+          <p:cNvPr id="2" name="標題 1">
+            <a:extLst>
+              <a:ext uri="{FF2B5EF4-FFF2-40B4-BE49-F238E27FC236}">
+                <a16:creationId xmlns:a16="http://schemas.microsoft.com/office/drawing/2014/main" id="{4E245827-B405-8CB4-2B08-E9B0FADF7DF3}"/>
+              </a:ext>
+            </a:extLst>
+          </p:cNvPr>
+          <p:cNvSpPr>
+            <a:spLocks noGrp="1"/>
+          </p:cNvSpPr>
+          <p:nvPr>
+            <p:ph type="title"/>
+          </p:nvPr>
+        </p:nvSpPr>
+        <p:spPr>
+          <a:xfrm>
+            <a:off x="640079" y="1102718"/>
+            <a:ext cx="5948643" cy="662474"/>
+          </a:xfrm>
+        </p:spPr>
+        <p:txBody>
+          <a:bodyPr anchor="ctr" anchorCtr="0">
+            <a:normAutofit/>
+          </a:bodyPr>
+          <a:lstStyle/>
+          <a:p>
+            <a:r>
+              <a:rPr lang="en-US" altLang="zh-TW" sz="3200" dirty="0">
+                <a:solidFill>
+                  <a:srgbClr val="FFC000"/>
+                </a:solidFill>
+              </a:rPr>
+              <a:t>Git Bash – Command Line</a:t>
+            </a:r>
+            <a:endParaRPr lang="zh-TW" altLang="en-US" sz="3200" dirty="0">
+              <a:solidFill>
+                <a:srgbClr val="FFC000"/>
+              </a:solidFill>
+            </a:endParaRPr>
+          </a:p>
+        </p:txBody>
+      </p:sp>
+      <p:sp>
+        <p:nvSpPr>
+          <p:cNvPr id="3" name="內容版面配置區 2">
+            <a:extLst>
+              <a:ext uri="{FF2B5EF4-FFF2-40B4-BE49-F238E27FC236}">
+                <a16:creationId xmlns:a16="http://schemas.microsoft.com/office/drawing/2014/main" id="{D35C46EB-351A-CDFB-6A8A-BDE8335BAD52}"/>
+              </a:ext>
+            </a:extLst>
+          </p:cNvPr>
+          <p:cNvSpPr>
+            <a:spLocks noGrp="1"/>
+          </p:cNvSpPr>
+          <p:nvPr>
+            <p:ph idx="1"/>
+          </p:nvPr>
+        </p:nvSpPr>
+        <p:spPr>
+          <a:xfrm>
+            <a:off x="797097" y="1765192"/>
+            <a:ext cx="6329844" cy="547027"/>
+          </a:xfrm>
+        </p:spPr>
+        <p:txBody>
+          <a:bodyPr anchor="ctr" anchorCtr="0">
+            <a:noAutofit/>
+          </a:bodyPr>
+          <a:lstStyle/>
+          <a:p>
+            <a:pPr>
+              <a:buFont typeface="Wingdings" panose="05000000000000000000" pitchFamily="2" charset="2"/>
+              <a:buChar char="l"/>
+            </a:pPr>
+            <a:r>
+              <a:rPr lang="zh-TW" altLang="en-US" dirty="0">
+                <a:solidFill>
+                  <a:srgbClr val="00B0F0"/>
+                </a:solidFill>
+              </a:rPr>
+              <a:t> 將</a:t>
+            </a:r>
+            <a:r>
+              <a:rPr lang="en-US" altLang="zh-TW" dirty="0">
+                <a:solidFill>
+                  <a:srgbClr val="00B0F0"/>
+                </a:solidFill>
+              </a:rPr>
+              <a:t>Git Repository</a:t>
+            </a:r>
+            <a:r>
+              <a:rPr lang="zh-TW" altLang="en-US" dirty="0">
+                <a:solidFill>
+                  <a:srgbClr val="00B0F0"/>
+                </a:solidFill>
+              </a:rPr>
+              <a:t>進行</a:t>
+            </a:r>
+            <a:r>
+              <a:rPr lang="en-US" altLang="zh-TW" dirty="0">
+                <a:solidFill>
+                  <a:srgbClr val="00B0F0"/>
+                </a:solidFill>
+              </a:rPr>
+              <a:t>Commit(</a:t>
+            </a:r>
+            <a:r>
+              <a:rPr lang="zh-TW" altLang="en-US" dirty="0">
+                <a:solidFill>
+                  <a:srgbClr val="00B0F0"/>
+                </a:solidFill>
+              </a:rPr>
+              <a:t>理解為存檔的概念</a:t>
+            </a:r>
+            <a:r>
+              <a:rPr lang="en-US" altLang="zh-TW" dirty="0">
+                <a:solidFill>
+                  <a:srgbClr val="00B0F0"/>
+                </a:solidFill>
+              </a:rPr>
+              <a:t>)</a:t>
+            </a:r>
+            <a:endParaRPr lang="zh-TW" altLang="en-US" dirty="0">
+              <a:solidFill>
+                <a:srgbClr val="00B0F0"/>
+              </a:solidFill>
+            </a:endParaRPr>
+          </a:p>
+        </p:txBody>
+      </p:sp>
+      <p:sp>
+        <p:nvSpPr>
+          <p:cNvPr id="6" name="內容版面配置區 2">
+            <a:extLst>
+              <a:ext uri="{FF2B5EF4-FFF2-40B4-BE49-F238E27FC236}">
+                <a16:creationId xmlns:a16="http://schemas.microsoft.com/office/drawing/2014/main" id="{4E5B34E1-96F3-5E67-A3A4-FA01AE67FA2D}"/>
+              </a:ext>
+            </a:extLst>
+          </p:cNvPr>
+          <p:cNvSpPr txBox="1">
+            <a:spLocks/>
+          </p:cNvSpPr>
+          <p:nvPr/>
+        </p:nvSpPr>
+        <p:spPr>
+          <a:xfrm>
+            <a:off x="1340358" y="2252412"/>
+            <a:ext cx="4388089" cy="514673"/>
+          </a:xfrm>
+          <a:prstGeom prst="rect">
+            <a:avLst/>
+          </a:prstGeom>
+        </p:spPr>
+        <p:txBody>
+          <a:bodyPr vert="horz" lIns="91440" tIns="45720" rIns="91440" bIns="45720" rtlCol="0" anchor="ctr" anchorCtr="0">
+            <a:normAutofit/>
+          </a:bodyPr>
+          <a:lstStyle>
+            <a:lvl1pPr marL="228600" indent="-228600" algn="l" defTabSz="914400" rtl="0" eaLnBrk="1" latinLnBrk="0" hangingPunct="1">
+              <a:lnSpc>
+                <a:spcPct val="120000"/>
+              </a:lnSpc>
+              <a:spcBef>
+                <a:spcPts val="1000"/>
+              </a:spcBef>
+              <a:buSzPct val="87000"/>
+              <a:buFont typeface="Arial" panose="020B0604020202020204" pitchFamily="34" charset="0"/>
+              <a:buChar char="•"/>
+              <a:defRPr sz="2000" kern="1200">
+                <a:solidFill>
+                  <a:schemeClr val="tx1"/>
+                </a:solidFill>
+                <a:latin typeface="+mn-lt"/>
+                <a:ea typeface="+mn-ea"/>
+                <a:cs typeface="+mn-cs"/>
+              </a:defRPr>
+            </a:lvl1pPr>
+            <a:lvl2pPr marL="493776" indent="-228600" algn="l" defTabSz="914400" rtl="0" eaLnBrk="1" latinLnBrk="0" hangingPunct="1">
+              <a:lnSpc>
+                <a:spcPct val="120000"/>
+              </a:lnSpc>
+              <a:spcBef>
+                <a:spcPts val="500"/>
+              </a:spcBef>
+              <a:buSzPct val="87000"/>
+              <a:buFont typeface="Arial" panose="020B0604020202020204" pitchFamily="34" charset="0"/>
+              <a:buChar char="•"/>
+              <a:defRPr sz="1800" kern="1200">
+                <a:solidFill>
+                  <a:schemeClr val="tx1"/>
+                </a:solidFill>
+                <a:latin typeface="+mn-lt"/>
+                <a:ea typeface="+mn-ea"/>
+                <a:cs typeface="+mn-cs"/>
+              </a:defRPr>
+            </a:lvl2pPr>
+            <a:lvl3pPr marL="731520" indent="-228600" algn="l" defTabSz="914400" rtl="0" eaLnBrk="1" latinLnBrk="0" hangingPunct="1">
+              <a:lnSpc>
+                <a:spcPct val="120000"/>
+              </a:lnSpc>
+              <a:spcBef>
+                <a:spcPts val="500"/>
+              </a:spcBef>
+              <a:buSzPct val="87000"/>
+              <a:buFont typeface="Arial" panose="020B0604020202020204" pitchFamily="34" charset="0"/>
+              <a:buChar char="•"/>
+              <a:defRPr sz="1600" kern="1200">
+                <a:solidFill>
+                  <a:schemeClr val="tx1"/>
+                </a:solidFill>
+                <a:latin typeface="+mn-lt"/>
+                <a:ea typeface="+mn-ea"/>
+                <a:cs typeface="+mn-cs"/>
+              </a:defRPr>
+            </a:lvl3pPr>
+            <a:lvl4pPr marL="1051560" indent="-285750" algn="l" defTabSz="914400" rtl="0" eaLnBrk="1" latinLnBrk="0" hangingPunct="1">
+              <a:lnSpc>
+                <a:spcPct val="120000"/>
+              </a:lnSpc>
+              <a:spcBef>
+                <a:spcPts val="500"/>
+              </a:spcBef>
+              <a:buSzPct val="87000"/>
+              <a:buFont typeface="Arial" panose="020B0604020202020204" pitchFamily="34" charset="0"/>
+              <a:buChar char="•"/>
+              <a:defRPr sz="1400" kern="1200">
+                <a:solidFill>
+                  <a:schemeClr val="tx1"/>
+                </a:solidFill>
+                <a:latin typeface="+mn-lt"/>
+                <a:ea typeface="+mn-ea"/>
+                <a:cs typeface="+mn-cs"/>
+              </a:defRPr>
+            </a:lvl4pPr>
+            <a:lvl5pPr marL="1298448" indent="-228600" algn="l" defTabSz="914400" rtl="0" eaLnBrk="1" latinLnBrk="0" hangingPunct="1">
+              <a:lnSpc>
+                <a:spcPct val="120000"/>
+              </a:lnSpc>
+              <a:spcBef>
+                <a:spcPts val="500"/>
+              </a:spcBef>
+              <a:buSzPct val="87000"/>
+              <a:buFont typeface="Arial" panose="020B0604020202020204" pitchFamily="34" charset="0"/>
+              <a:buChar char="•"/>
+              <a:defRPr sz="1400" kern="1200">
+                <a:solidFill>
+                  <a:schemeClr val="tx1"/>
+                </a:solidFill>
+                <a:latin typeface="+mn-lt"/>
+                <a:ea typeface="+mn-ea"/>
+                <a:cs typeface="+mn-cs"/>
+              </a:defRPr>
+            </a:lvl5pPr>
+            <a:lvl6pPr marL="2514600" indent="-228600" algn="l" defTabSz="914400" rtl="0" eaLnBrk="1" latinLnBrk="0" hangingPunct="1">
+              <a:lnSpc>
+                <a:spcPct val="90000"/>
+              </a:lnSpc>
+              <a:spcBef>
+                <a:spcPts val="500"/>
+              </a:spcBef>
+              <a:buFont typeface="Arial" panose="020B0604020202020204" pitchFamily="34" charset="0"/>
+              <a:buChar char="•"/>
+              <a:defRPr sz="1800" kern="1200">
+                <a:solidFill>
+                  <a:schemeClr val="tx1"/>
+                </a:solidFill>
+                <a:latin typeface="+mn-lt"/>
+                <a:ea typeface="+mn-ea"/>
+                <a:cs typeface="+mn-cs"/>
+              </a:defRPr>
+            </a:lvl6pPr>
+            <a:lvl7pPr marL="2971800" indent="-228600" algn="l" defTabSz="914400" rtl="0" eaLnBrk="1" latinLnBrk="0" hangingPunct="1">
+              <a:lnSpc>
+                <a:spcPct val="90000"/>
+              </a:lnSpc>
+              <a:spcBef>
+                <a:spcPts val="500"/>
+              </a:spcBef>
+              <a:buFont typeface="Arial" panose="020B0604020202020204" pitchFamily="34" charset="0"/>
+              <a:buChar char="•"/>
+              <a:defRPr sz="1800" kern="1200">
+                <a:solidFill>
+                  <a:schemeClr val="tx1"/>
+                </a:solidFill>
+                <a:latin typeface="+mn-lt"/>
+                <a:ea typeface="+mn-ea"/>
+                <a:cs typeface="+mn-cs"/>
+              </a:defRPr>
+            </a:lvl7pPr>
+            <a:lvl8pPr marL="3429000" indent="-228600" algn="l" defTabSz="914400" rtl="0" eaLnBrk="1" latinLnBrk="0" hangingPunct="1">
+              <a:lnSpc>
+                <a:spcPct val="90000"/>
+              </a:lnSpc>
+              <a:spcBef>
+                <a:spcPts val="500"/>
+              </a:spcBef>
+              <a:buFont typeface="Arial" panose="020B0604020202020204" pitchFamily="34" charset="0"/>
+              <a:buChar char="•"/>
+              <a:defRPr sz="1800" kern="1200">
+                <a:solidFill>
+                  <a:schemeClr val="tx1"/>
+                </a:solidFill>
+                <a:latin typeface="+mn-lt"/>
+                <a:ea typeface="+mn-ea"/>
+                <a:cs typeface="+mn-cs"/>
+              </a:defRPr>
+            </a:lvl8pPr>
+            <a:lvl9pPr marL="3886200" indent="-228600" algn="l" defTabSz="914400" rtl="0" eaLnBrk="1" latinLnBrk="0" hangingPunct="1">
+              <a:lnSpc>
+                <a:spcPct val="90000"/>
+              </a:lnSpc>
+              <a:spcBef>
+                <a:spcPts val="500"/>
+              </a:spcBef>
+              <a:buFont typeface="Arial" panose="020B0604020202020204" pitchFamily="34" charset="0"/>
+              <a:buChar char="•"/>
+              <a:defRPr sz="1800" kern="1200">
+                <a:solidFill>
+                  <a:schemeClr val="tx1"/>
+                </a:solidFill>
+                <a:latin typeface="+mn-lt"/>
+                <a:ea typeface="+mn-ea"/>
+                <a:cs typeface="+mn-cs"/>
+              </a:defRPr>
+            </a:lvl9pPr>
+          </a:lstStyle>
+          <a:p>
+            <a:pPr>
+              <a:buFont typeface="Wingdings" panose="05000000000000000000" pitchFamily="2" charset="2"/>
+              <a:buChar char="Ø"/>
+            </a:pPr>
+            <a:r>
+              <a:rPr lang="zh-TW" altLang="en-US" sz="1600" dirty="0">
+                <a:solidFill>
+                  <a:schemeClr val="bg1"/>
+                </a:solidFill>
+              </a:rPr>
+              <a:t>追加新的檔案到最新進行的</a:t>
+            </a:r>
+            <a:r>
+              <a:rPr lang="en-US" altLang="zh-TW" sz="1600" dirty="0">
+                <a:solidFill>
+                  <a:schemeClr val="bg1"/>
+                </a:solidFill>
+              </a:rPr>
+              <a:t>Commit</a:t>
+            </a:r>
+            <a:endParaRPr lang="zh-TW" altLang="en-US" sz="1600" dirty="0">
+              <a:solidFill>
+                <a:schemeClr val="bg1"/>
+              </a:solidFill>
+            </a:endParaRPr>
+          </a:p>
+        </p:txBody>
+      </p:sp>
+      <p:sp>
+        <p:nvSpPr>
+          <p:cNvPr id="10" name="文字方塊 9">
+            <a:extLst>
+              <a:ext uri="{FF2B5EF4-FFF2-40B4-BE49-F238E27FC236}">
+                <a16:creationId xmlns:a16="http://schemas.microsoft.com/office/drawing/2014/main" id="{5925BB02-DA3D-9216-B478-858AAC4E8C5C}"/>
+              </a:ext>
+            </a:extLst>
+          </p:cNvPr>
+          <p:cNvSpPr txBox="1"/>
+          <p:nvPr/>
+        </p:nvSpPr>
+        <p:spPr>
+          <a:xfrm>
+            <a:off x="1717954" y="2747130"/>
+            <a:ext cx="4270470" cy="387927"/>
+          </a:xfrm>
+          <a:prstGeom prst="rect">
+            <a:avLst/>
+          </a:prstGeom>
+          <a:noFill/>
+        </p:spPr>
+        <p:txBody>
+          <a:bodyPr wrap="square" rtlCol="0">
+            <a:spAutoFit/>
+          </a:bodyPr>
+          <a:lstStyle/>
+          <a:p>
+            <a:pPr>
+              <a:lnSpc>
+                <a:spcPct val="150000"/>
+              </a:lnSpc>
+            </a:pPr>
+            <a:r>
+              <a:rPr lang="zh-TW" altLang="en-US" sz="1400" dirty="0">
+                <a:solidFill>
+                  <a:schemeClr val="bg1"/>
+                </a:solidFill>
+                <a:latin typeface="Courier New" panose="02070309020205020404" pitchFamily="49" charset="0"/>
+                <a:cs typeface="Courier New" panose="02070309020205020404" pitchFamily="49" charset="0"/>
+              </a:rPr>
+              <a:t>先使用</a:t>
+            </a:r>
+            <a:r>
+              <a:rPr lang="en-US" altLang="zh-TW" sz="1400" dirty="0">
+                <a:solidFill>
+                  <a:schemeClr val="bg1"/>
+                </a:solidFill>
+                <a:latin typeface="Courier New" panose="02070309020205020404" pitchFamily="49" charset="0"/>
+                <a:cs typeface="Courier New" panose="02070309020205020404" pitchFamily="49" charset="0"/>
+              </a:rPr>
+              <a:t>”</a:t>
+            </a:r>
+            <a:r>
+              <a:rPr lang="en-US" altLang="zh-TW" sz="1400" dirty="0">
+                <a:solidFill>
+                  <a:srgbClr val="00FF00"/>
+                </a:solidFill>
+                <a:latin typeface="Courier New" panose="02070309020205020404" pitchFamily="49" charset="0"/>
+                <a:cs typeface="Courier New" panose="02070309020205020404" pitchFamily="49" charset="0"/>
+              </a:rPr>
+              <a:t>add</a:t>
+            </a:r>
+            <a:r>
+              <a:rPr lang="en-US" altLang="zh-TW" sz="1400" dirty="0">
+                <a:solidFill>
+                  <a:schemeClr val="bg1"/>
+                </a:solidFill>
+                <a:latin typeface="Courier New" panose="02070309020205020404" pitchFamily="49" charset="0"/>
+                <a:cs typeface="Courier New" panose="02070309020205020404" pitchFamily="49" charset="0"/>
+              </a:rPr>
+              <a:t>”</a:t>
+            </a:r>
+            <a:r>
+              <a:rPr lang="zh-TW" altLang="en-US" sz="1400" dirty="0">
+                <a:solidFill>
+                  <a:schemeClr val="bg1"/>
+                </a:solidFill>
+                <a:latin typeface="Courier New" panose="02070309020205020404" pitchFamily="49" charset="0"/>
+                <a:cs typeface="Courier New" panose="02070309020205020404" pitchFamily="49" charset="0"/>
+              </a:rPr>
+              <a:t>指令將追加新增的檔案存入暫存區</a:t>
+            </a:r>
+            <a:endParaRPr lang="zh-TW" altLang="en-US" sz="1400" dirty="0">
+              <a:solidFill>
+                <a:srgbClr val="00FF00"/>
+              </a:solidFill>
+              <a:latin typeface="Courier New" panose="02070309020205020404" pitchFamily="49" charset="0"/>
+              <a:cs typeface="Courier New" panose="02070309020205020404" pitchFamily="49" charset="0"/>
+            </a:endParaRPr>
+          </a:p>
+        </p:txBody>
+      </p:sp>
+      <p:sp>
+        <p:nvSpPr>
+          <p:cNvPr id="11" name="文字方塊 10">
+            <a:extLst>
+              <a:ext uri="{FF2B5EF4-FFF2-40B4-BE49-F238E27FC236}">
+                <a16:creationId xmlns:a16="http://schemas.microsoft.com/office/drawing/2014/main" id="{82ADFFC7-B86B-E118-5A9F-D17BE24B8679}"/>
+              </a:ext>
+            </a:extLst>
+          </p:cNvPr>
+          <p:cNvSpPr txBox="1"/>
+          <p:nvPr/>
+        </p:nvSpPr>
+        <p:spPr>
+          <a:xfrm>
+            <a:off x="2034847" y="5092946"/>
+            <a:ext cx="3433623" cy="276999"/>
+          </a:xfrm>
+          <a:prstGeom prst="rect">
+            <a:avLst/>
+          </a:prstGeom>
+          <a:noFill/>
+        </p:spPr>
+        <p:txBody>
+          <a:bodyPr wrap="square" rtlCol="0">
+            <a:spAutoFit/>
+          </a:bodyPr>
+          <a:lstStyle/>
+          <a:p>
+            <a:r>
+              <a:rPr lang="en-US" altLang="zh-TW" sz="1200" dirty="0">
+                <a:solidFill>
+                  <a:schemeClr val="bg1"/>
+                </a:solidFill>
+                <a:latin typeface="Courier New" panose="02070309020205020404" pitchFamily="49" charset="0"/>
+                <a:cs typeface="Courier New" panose="02070309020205020404" pitchFamily="49" charset="0"/>
+              </a:rPr>
+              <a:t>$</a:t>
+            </a:r>
+            <a:r>
+              <a:rPr lang="zh-TW" altLang="en-US" sz="1200" dirty="0">
+                <a:solidFill>
+                  <a:srgbClr val="00FF00"/>
+                </a:solidFill>
+                <a:latin typeface="Courier New" panose="02070309020205020404" pitchFamily="49" charset="0"/>
+                <a:cs typeface="Courier New" panose="02070309020205020404" pitchFamily="49" charset="0"/>
+              </a:rPr>
+              <a:t> </a:t>
+            </a:r>
+            <a:r>
+              <a:rPr lang="en-US" altLang="zh-TW" sz="1200" dirty="0">
+                <a:solidFill>
+                  <a:srgbClr val="00FF00"/>
+                </a:solidFill>
+                <a:latin typeface="Courier New" panose="02070309020205020404" pitchFamily="49" charset="0"/>
+                <a:cs typeface="Courier New" panose="02070309020205020404" pitchFamily="49" charset="0"/>
+              </a:rPr>
+              <a:t>git commit –-amend --no-edit</a:t>
+            </a:r>
+            <a:endParaRPr lang="en-US" altLang="zh-TW" sz="1200" dirty="0">
+              <a:solidFill>
+                <a:srgbClr val="33CCCC"/>
+              </a:solidFill>
+              <a:latin typeface="Courier New" panose="02070309020205020404" pitchFamily="49" charset="0"/>
+              <a:cs typeface="Courier New" panose="02070309020205020404" pitchFamily="49" charset="0"/>
+            </a:endParaRPr>
+          </a:p>
+        </p:txBody>
+      </p:sp>
+      <p:sp>
+        <p:nvSpPr>
+          <p:cNvPr id="15" name="文字方塊 14">
+            <a:extLst>
+              <a:ext uri="{FF2B5EF4-FFF2-40B4-BE49-F238E27FC236}">
+                <a16:creationId xmlns:a16="http://schemas.microsoft.com/office/drawing/2014/main" id="{E19796DC-BFAE-3104-49F0-5B9F5D065D7E}"/>
+              </a:ext>
+            </a:extLst>
+          </p:cNvPr>
+          <p:cNvSpPr txBox="1"/>
+          <p:nvPr/>
+        </p:nvSpPr>
+        <p:spPr>
+          <a:xfrm>
+            <a:off x="1717954" y="4527738"/>
+            <a:ext cx="6215811" cy="387927"/>
+          </a:xfrm>
+          <a:prstGeom prst="rect">
+            <a:avLst/>
+          </a:prstGeom>
+          <a:noFill/>
+        </p:spPr>
+        <p:txBody>
+          <a:bodyPr wrap="square" rtlCol="0">
+            <a:spAutoFit/>
+          </a:bodyPr>
+          <a:lstStyle/>
+          <a:p>
+            <a:pPr>
+              <a:lnSpc>
+                <a:spcPct val="150000"/>
+              </a:lnSpc>
+            </a:pPr>
+            <a:r>
+              <a:rPr lang="zh-TW" altLang="en-US" sz="1400" dirty="0">
+                <a:solidFill>
+                  <a:schemeClr val="bg1"/>
+                </a:solidFill>
+                <a:latin typeface="Courier New" panose="02070309020205020404" pitchFamily="49" charset="0"/>
+                <a:cs typeface="Courier New" panose="02070309020205020404" pitchFamily="49" charset="0"/>
+              </a:rPr>
+              <a:t>使用</a:t>
+            </a:r>
+            <a:r>
+              <a:rPr lang="en-US" altLang="zh-TW" sz="1400" dirty="0">
+                <a:solidFill>
+                  <a:schemeClr val="bg1"/>
+                </a:solidFill>
+                <a:latin typeface="Courier New" panose="02070309020205020404" pitchFamily="49" charset="0"/>
+                <a:cs typeface="Courier New" panose="02070309020205020404" pitchFamily="49" charset="0"/>
+              </a:rPr>
+              <a:t>“</a:t>
+            </a:r>
+            <a:r>
+              <a:rPr lang="en-US" altLang="zh-TW" sz="1400" dirty="0">
+                <a:solidFill>
+                  <a:srgbClr val="00FF00"/>
+                </a:solidFill>
+                <a:latin typeface="Courier New" panose="02070309020205020404" pitchFamily="49" charset="0"/>
+                <a:cs typeface="Courier New" panose="02070309020205020404" pitchFamily="49" charset="0"/>
+              </a:rPr>
+              <a:t>commit</a:t>
+            </a:r>
+            <a:r>
+              <a:rPr lang="en-US" altLang="zh-TW" sz="1400" dirty="0">
+                <a:solidFill>
+                  <a:schemeClr val="bg1"/>
+                </a:solidFill>
+                <a:latin typeface="Courier New" panose="02070309020205020404" pitchFamily="49" charset="0"/>
+                <a:cs typeface="Courier New" panose="02070309020205020404" pitchFamily="49" charset="0"/>
+              </a:rPr>
+              <a:t>”</a:t>
+            </a:r>
+            <a:r>
+              <a:rPr lang="zh-TW" altLang="en-US" sz="1400" dirty="0">
+                <a:solidFill>
+                  <a:schemeClr val="bg1"/>
+                </a:solidFill>
+                <a:latin typeface="Courier New" panose="02070309020205020404" pitchFamily="49" charset="0"/>
+                <a:cs typeface="Courier New" panose="02070309020205020404" pitchFamily="49" charset="0"/>
+              </a:rPr>
+              <a:t>指令，後面加上參數 </a:t>
+            </a:r>
+            <a:r>
+              <a:rPr lang="en-US" altLang="zh-TW" sz="1400" dirty="0">
+                <a:solidFill>
+                  <a:schemeClr val="bg1"/>
+                </a:solidFill>
+                <a:latin typeface="Courier New" panose="02070309020205020404" pitchFamily="49" charset="0"/>
+                <a:cs typeface="Courier New" panose="02070309020205020404" pitchFamily="49" charset="0"/>
+              </a:rPr>
+              <a:t>“</a:t>
+            </a:r>
+            <a:r>
+              <a:rPr lang="en-US" altLang="zh-TW" sz="1400" dirty="0">
+                <a:solidFill>
+                  <a:srgbClr val="FFFF00"/>
+                </a:solidFill>
+                <a:latin typeface="Courier New" panose="02070309020205020404" pitchFamily="49" charset="0"/>
+                <a:cs typeface="Courier New" panose="02070309020205020404" pitchFamily="49" charset="0"/>
+              </a:rPr>
+              <a:t>--amend --no-edit</a:t>
+            </a:r>
+            <a:r>
+              <a:rPr lang="en-US" altLang="zh-TW" sz="1400" dirty="0">
+                <a:solidFill>
+                  <a:schemeClr val="bg1"/>
+                </a:solidFill>
+                <a:latin typeface="Courier New" panose="02070309020205020404" pitchFamily="49" charset="0"/>
+                <a:cs typeface="Courier New" panose="02070309020205020404" pitchFamily="49" charset="0"/>
+              </a:rPr>
+              <a:t>”:</a:t>
+            </a:r>
+            <a:endParaRPr lang="zh-TW" altLang="en-US" sz="1400" dirty="0">
+              <a:solidFill>
+                <a:srgbClr val="00FF00"/>
+              </a:solidFill>
+              <a:latin typeface="Courier New" panose="02070309020205020404" pitchFamily="49" charset="0"/>
+              <a:cs typeface="Courier New" panose="02070309020205020404" pitchFamily="49" charset="0"/>
+            </a:endParaRPr>
+          </a:p>
+        </p:txBody>
+      </p:sp>
+      <p:sp>
+        <p:nvSpPr>
+          <p:cNvPr id="17" name="文字方塊 16">
+            <a:extLst>
+              <a:ext uri="{FF2B5EF4-FFF2-40B4-BE49-F238E27FC236}">
+                <a16:creationId xmlns:a16="http://schemas.microsoft.com/office/drawing/2014/main" id="{D28976AA-47BA-5BA4-690F-09CE49A5E27F}"/>
+              </a:ext>
+            </a:extLst>
+          </p:cNvPr>
+          <p:cNvSpPr txBox="1"/>
+          <p:nvPr/>
+        </p:nvSpPr>
+        <p:spPr>
+          <a:xfrm>
+            <a:off x="6334460" y="5951402"/>
+            <a:ext cx="3600953" cy="345672"/>
+          </a:xfrm>
+          <a:prstGeom prst="rect">
+            <a:avLst/>
+          </a:prstGeom>
+          <a:noFill/>
+        </p:spPr>
+        <p:txBody>
+          <a:bodyPr wrap="square" rtlCol="0">
+            <a:spAutoFit/>
+          </a:bodyPr>
+          <a:lstStyle/>
+          <a:p>
+            <a:pPr>
+              <a:lnSpc>
+                <a:spcPct val="150000"/>
+              </a:lnSpc>
+            </a:pPr>
+            <a:r>
+              <a:rPr lang="zh-TW" altLang="en-US" sz="1200" dirty="0">
+                <a:solidFill>
+                  <a:schemeClr val="bg1">
+                    <a:lumMod val="65000"/>
+                  </a:schemeClr>
+                </a:solidFill>
+                <a:latin typeface="Courier New" panose="02070309020205020404" pitchFamily="49" charset="0"/>
+                <a:cs typeface="Courier New" panose="02070309020205020404" pitchFamily="49" charset="0"/>
+              </a:rPr>
+              <a:t>直接將追加的檔案合併到最新一次的</a:t>
+            </a:r>
+            <a:r>
+              <a:rPr lang="en-US" altLang="zh-TW" sz="1200" dirty="0">
+                <a:solidFill>
+                  <a:schemeClr val="bg1">
+                    <a:lumMod val="65000"/>
+                  </a:schemeClr>
+                </a:solidFill>
+                <a:latin typeface="Courier New" panose="02070309020205020404" pitchFamily="49" charset="0"/>
+                <a:cs typeface="Courier New" panose="02070309020205020404" pitchFamily="49" charset="0"/>
+              </a:rPr>
+              <a:t>commit</a:t>
+            </a:r>
+            <a:r>
+              <a:rPr lang="zh-TW" altLang="en-US" sz="1200" dirty="0">
+                <a:solidFill>
+                  <a:schemeClr val="bg1">
+                    <a:lumMod val="65000"/>
+                  </a:schemeClr>
+                </a:solidFill>
+                <a:latin typeface="Courier New" panose="02070309020205020404" pitchFamily="49" charset="0"/>
+                <a:cs typeface="Courier New" panose="02070309020205020404" pitchFamily="49" charset="0"/>
+              </a:rPr>
+              <a:t>中。</a:t>
+            </a:r>
+            <a:endParaRPr lang="zh-TW" altLang="en-US" sz="1200" dirty="0">
+              <a:solidFill>
+                <a:srgbClr val="00FF00"/>
+              </a:solidFill>
+              <a:latin typeface="Courier New" panose="02070309020205020404" pitchFamily="49" charset="0"/>
+              <a:cs typeface="Courier New" panose="02070309020205020404" pitchFamily="49" charset="0"/>
+            </a:endParaRPr>
+          </a:p>
+        </p:txBody>
+      </p:sp>
+      <p:sp>
+        <p:nvSpPr>
+          <p:cNvPr id="18" name="文字方塊 17">
+            <a:extLst>
+              <a:ext uri="{FF2B5EF4-FFF2-40B4-BE49-F238E27FC236}">
+                <a16:creationId xmlns:a16="http://schemas.microsoft.com/office/drawing/2014/main" id="{6CDF7418-1A23-891C-B24F-A967AF472913}"/>
+              </a:ext>
+            </a:extLst>
+          </p:cNvPr>
+          <p:cNvSpPr txBox="1"/>
+          <p:nvPr/>
+        </p:nvSpPr>
+        <p:spPr>
+          <a:xfrm>
+            <a:off x="5203817" y="5072941"/>
+            <a:ext cx="4478065" cy="276999"/>
+          </a:xfrm>
+          <a:prstGeom prst="rect">
+            <a:avLst/>
+          </a:prstGeom>
+          <a:noFill/>
+        </p:spPr>
+        <p:txBody>
+          <a:bodyPr wrap="square" rtlCol="0">
+            <a:spAutoFit/>
+          </a:bodyPr>
+          <a:lstStyle/>
+          <a:p>
+            <a:r>
+              <a:rPr lang="en-US" altLang="zh-TW" sz="1200" dirty="0">
+                <a:solidFill>
+                  <a:schemeClr val="bg1"/>
+                </a:solidFill>
+                <a:latin typeface="Courier New" panose="02070309020205020404" pitchFamily="49" charset="0"/>
+                <a:cs typeface="Courier New" panose="02070309020205020404" pitchFamily="49" charset="0"/>
+              </a:rPr>
+              <a:t>no-edit</a:t>
+            </a:r>
+            <a:r>
+              <a:rPr lang="zh-TW" altLang="en-US" sz="1200" dirty="0">
+                <a:solidFill>
+                  <a:schemeClr val="bg1"/>
+                </a:solidFill>
+                <a:latin typeface="Courier New" panose="02070309020205020404" pitchFamily="49" charset="0"/>
+                <a:cs typeface="Courier New" panose="02070309020205020404" pitchFamily="49" charset="0"/>
+              </a:rPr>
+              <a:t>就是代表此次的</a:t>
+            </a:r>
+            <a:r>
+              <a:rPr lang="en-US" altLang="zh-TW" sz="1200" dirty="0">
+                <a:solidFill>
+                  <a:schemeClr val="bg1"/>
+                </a:solidFill>
+                <a:latin typeface="Courier New" panose="02070309020205020404" pitchFamily="49" charset="0"/>
+                <a:cs typeface="Courier New" panose="02070309020205020404" pitchFamily="49" charset="0"/>
+              </a:rPr>
+              <a:t>commit</a:t>
+            </a:r>
+            <a:r>
+              <a:rPr lang="zh-TW" altLang="en-US" sz="1200" dirty="0">
+                <a:solidFill>
+                  <a:schemeClr val="bg1"/>
+                </a:solidFill>
+                <a:latin typeface="Courier New" panose="02070309020205020404" pitchFamily="49" charset="0"/>
+                <a:cs typeface="Courier New" panose="02070309020205020404" pitchFamily="49" charset="0"/>
+              </a:rPr>
+              <a:t>不要加入</a:t>
+            </a:r>
+            <a:r>
+              <a:rPr lang="en-US" altLang="zh-TW" sz="1200" dirty="0">
+                <a:solidFill>
+                  <a:schemeClr val="bg1"/>
+                </a:solidFill>
+                <a:latin typeface="Courier New" panose="02070309020205020404" pitchFamily="49" charset="0"/>
+                <a:cs typeface="Courier New" panose="02070309020205020404" pitchFamily="49" charset="0"/>
+              </a:rPr>
+              <a:t>commit</a:t>
+            </a:r>
+            <a:r>
+              <a:rPr lang="zh-TW" altLang="en-US" sz="1200" dirty="0">
+                <a:solidFill>
+                  <a:schemeClr val="bg1"/>
+                </a:solidFill>
+                <a:latin typeface="Courier New" panose="02070309020205020404" pitchFamily="49" charset="0"/>
+                <a:cs typeface="Courier New" panose="02070309020205020404" pitchFamily="49" charset="0"/>
+              </a:rPr>
+              <a:t>內容編輯</a:t>
+            </a:r>
+            <a:endParaRPr lang="en-US" altLang="zh-TW" sz="1200" dirty="0">
+              <a:solidFill>
+                <a:srgbClr val="33CCCC"/>
+              </a:solidFill>
+              <a:latin typeface="Courier New" panose="02070309020205020404" pitchFamily="49" charset="0"/>
+              <a:cs typeface="Courier New" panose="02070309020205020404" pitchFamily="49" charset="0"/>
+            </a:endParaRPr>
+          </a:p>
+        </p:txBody>
+      </p:sp>
+      <p:pic>
+        <p:nvPicPr>
+          <p:cNvPr id="19" name="圖片 18">
+            <a:extLst>
+              <a:ext uri="{FF2B5EF4-FFF2-40B4-BE49-F238E27FC236}">
+                <a16:creationId xmlns:a16="http://schemas.microsoft.com/office/drawing/2014/main" id="{AF02831A-2004-6F04-81C3-0F59BEECCC5B}"/>
+              </a:ext>
+            </a:extLst>
+          </p:cNvPr>
+          <p:cNvPicPr>
+            <a:picLocks noChangeAspect="1"/>
+          </p:cNvPicPr>
+          <p:nvPr/>
+        </p:nvPicPr>
+        <p:blipFill>
+          <a:blip r:embed="rId2"/>
+          <a:stretch>
+            <a:fillRect/>
+          </a:stretch>
+        </p:blipFill>
+        <p:spPr>
+          <a:xfrm>
+            <a:off x="6588722" y="2397680"/>
+            <a:ext cx="5243947" cy="738810"/>
+          </a:xfrm>
+          <a:prstGeom prst="rect">
+            <a:avLst/>
+          </a:prstGeom>
+        </p:spPr>
+      </p:pic>
+      <p:pic>
+        <p:nvPicPr>
+          <p:cNvPr id="20" name="圖片 19">
+            <a:extLst>
+              <a:ext uri="{FF2B5EF4-FFF2-40B4-BE49-F238E27FC236}">
+                <a16:creationId xmlns:a16="http://schemas.microsoft.com/office/drawing/2014/main" id="{4EC2DAD0-3073-DB2F-30BF-8E91C4D2F297}"/>
+              </a:ext>
+            </a:extLst>
+          </p:cNvPr>
+          <p:cNvPicPr>
+            <a:picLocks noChangeAspect="1"/>
+          </p:cNvPicPr>
+          <p:nvPr/>
+        </p:nvPicPr>
+        <p:blipFill>
+          <a:blip r:embed="rId3"/>
+          <a:stretch>
+            <a:fillRect/>
+          </a:stretch>
+        </p:blipFill>
+        <p:spPr>
+          <a:xfrm>
+            <a:off x="2193726" y="3393350"/>
+            <a:ext cx="5450125" cy="1078129"/>
+          </a:xfrm>
+          <a:prstGeom prst="rect">
+            <a:avLst/>
+          </a:prstGeom>
+        </p:spPr>
+      </p:pic>
+      <p:pic>
+        <p:nvPicPr>
+          <p:cNvPr id="21" name="圖片 20">
+            <a:extLst>
+              <a:ext uri="{FF2B5EF4-FFF2-40B4-BE49-F238E27FC236}">
+                <a16:creationId xmlns:a16="http://schemas.microsoft.com/office/drawing/2014/main" id="{3DBD206C-1A03-E952-C854-C05B07E41B09}"/>
+              </a:ext>
+            </a:extLst>
+          </p:cNvPr>
+          <p:cNvPicPr>
+            <a:picLocks noChangeAspect="1"/>
+          </p:cNvPicPr>
+          <p:nvPr/>
+        </p:nvPicPr>
+        <p:blipFill>
+          <a:blip r:embed="rId4"/>
+          <a:stretch>
+            <a:fillRect/>
+          </a:stretch>
+        </p:blipFill>
+        <p:spPr>
+          <a:xfrm>
+            <a:off x="2495047" y="5644420"/>
+            <a:ext cx="3600953" cy="895475"/>
+          </a:xfrm>
+          <a:prstGeom prst="rect">
+            <a:avLst/>
+          </a:prstGeom>
+        </p:spPr>
+      </p:pic>
+    </p:spTree>
+    <p:extLst>
+      <p:ext uri="{BB962C8B-B14F-4D97-AF65-F5344CB8AC3E}">
+        <p14:creationId xmlns:p14="http://schemas.microsoft.com/office/powerpoint/2010/main" val="2303895570"/>
+      </p:ext>
+    </p:extLst>
+  </p:cSld>
+  <p:clrMapOvr>
+    <a:masterClrMapping/>
+  </p:clrMapOvr>
+</p:sld>
+</file>
+
+<file path=ppt/slides/slide11.xml><?xml version="1.0" encoding="utf-8"?>
+<p:sld xmlns:a="http://schemas.openxmlformats.org/drawingml/2006/main" xmlns:r="http://schemas.openxmlformats.org/officeDocument/2006/relationships" xmlns:p="http://schemas.openxmlformats.org/presentationml/2006/main">
+  <p:cSld>
+    <p:bg>
+      <p:bgPr>
+        <a:solidFill>
+          <a:schemeClr val="tx1">
+            <a:lumMod val="75000"/>
+            <a:lumOff val="25000"/>
+          </a:schemeClr>
+        </a:solidFill>
+        <a:effectLst/>
+      </p:bgPr>
+    </p:bg>
+    <p:spTree>
+      <p:nvGrpSpPr>
+        <p:cNvPr id="1" name="">
+          <a:extLst>
+            <a:ext uri="{FF2B5EF4-FFF2-40B4-BE49-F238E27FC236}">
               <a16:creationId xmlns:a16="http://schemas.microsoft.com/office/drawing/2014/main" id="{FD82A9D9-DE65-9FDC-801B-CA651E8E4D47}"/>
             </a:ext>
           </a:extLst>
@@ -5233,7 +6190,7 @@
 </p:sld>
 </file>
 
-<file path=ppt/slides/slide11.xml><?xml version="1.0" encoding="utf-8"?>
+<file path=ppt/slides/slide12.xml><?xml version="1.0" encoding="utf-8"?>
 <p:sld xmlns:a="http://schemas.openxmlformats.org/drawingml/2006/main" xmlns:r="http://schemas.openxmlformats.org/officeDocument/2006/relationships" xmlns:p="http://schemas.openxmlformats.org/presentationml/2006/main">
   <p:cSld>
     <p:bg>
@@ -6651,7 +7608,7 @@
 </p:sld>
 </file>
 
-<file path=ppt/slides/slide12.xml><?xml version="1.0" encoding="utf-8"?>
+<file path=ppt/slides/slide13.xml><?xml version="1.0" encoding="utf-8"?>
 <p:sld xmlns:a="http://schemas.openxmlformats.org/drawingml/2006/main" xmlns:r="http://schemas.openxmlformats.org/officeDocument/2006/relationships" xmlns:p="http://schemas.openxmlformats.org/presentationml/2006/main">
   <p:cSld>
     <p:bg>
@@ -7847,7 +8804,7 @@
 </p:sld>
 </file>
 
-<file path=ppt/slides/slide13.xml><?xml version="1.0" encoding="utf-8"?>
+<file path=ppt/slides/slide14.xml><?xml version="1.0" encoding="utf-8"?>
 <p:sld xmlns:a="http://schemas.openxmlformats.org/drawingml/2006/main" xmlns:r="http://schemas.openxmlformats.org/officeDocument/2006/relationships" xmlns:p="http://schemas.openxmlformats.org/presentationml/2006/main">
   <p:cSld>
     <p:bg>
@@ -9056,7 +10013,973 @@
 </p:sld>
 </file>
 
-<file path=ppt/slides/slide14.xml><?xml version="1.0" encoding="utf-8"?>
+<file path=ppt/slides/slide15.xml><?xml version="1.0" encoding="utf-8"?>
+<p:sld xmlns:a="http://schemas.openxmlformats.org/drawingml/2006/main" xmlns:r="http://schemas.openxmlformats.org/officeDocument/2006/relationships" xmlns:p="http://schemas.openxmlformats.org/presentationml/2006/main">
+  <p:cSld>
+    <p:bg>
+      <p:bgPr>
+        <a:solidFill>
+          <a:schemeClr val="tx1">
+            <a:lumMod val="75000"/>
+            <a:lumOff val="25000"/>
+          </a:schemeClr>
+        </a:solidFill>
+        <a:effectLst/>
+      </p:bgPr>
+    </p:bg>
+    <p:spTree>
+      <p:nvGrpSpPr>
+        <p:cNvPr id="1" name="">
+          <a:extLst>
+            <a:ext uri="{FF2B5EF4-FFF2-40B4-BE49-F238E27FC236}">
+              <a16:creationId xmlns:a16="http://schemas.microsoft.com/office/drawing/2014/main" id="{6F8949AB-C3E1-5412-C113-45D77003CA2A}"/>
+            </a:ext>
+          </a:extLst>
+        </p:cNvPr>
+        <p:cNvGrpSpPr/>
+        <p:nvPr/>
+      </p:nvGrpSpPr>
+      <p:grpSpPr>
+        <a:xfrm>
+          <a:off x="0" y="0"/>
+          <a:ext cx="0" cy="0"/>
+          <a:chOff x="0" y="0"/>
+          <a:chExt cx="0" cy="0"/>
+        </a:xfrm>
+      </p:grpSpPr>
+      <p:sp>
+        <p:nvSpPr>
+          <p:cNvPr id="2" name="標題 1">
+            <a:extLst>
+              <a:ext uri="{FF2B5EF4-FFF2-40B4-BE49-F238E27FC236}">
+                <a16:creationId xmlns:a16="http://schemas.microsoft.com/office/drawing/2014/main" id="{37A7A89E-3358-F33C-635C-A82680813661}"/>
+              </a:ext>
+            </a:extLst>
+          </p:cNvPr>
+          <p:cNvSpPr>
+            <a:spLocks noGrp="1"/>
+          </p:cNvSpPr>
+          <p:nvPr>
+            <p:ph type="title"/>
+          </p:nvPr>
+        </p:nvSpPr>
+        <p:spPr>
+          <a:xfrm>
+            <a:off x="640079" y="1102718"/>
+            <a:ext cx="10890929" cy="662474"/>
+          </a:xfrm>
+        </p:spPr>
+        <p:txBody>
+          <a:bodyPr anchor="ctr" anchorCtr="0">
+            <a:normAutofit/>
+          </a:bodyPr>
+          <a:lstStyle/>
+          <a:p>
+            <a:r>
+              <a:rPr lang="en-US" altLang="zh-TW" sz="3200" dirty="0">
+                <a:solidFill>
+                  <a:srgbClr val="FFC000"/>
+                </a:solidFill>
+              </a:rPr>
+              <a:t>Git Bash – Command Line</a:t>
+            </a:r>
+            <a:endParaRPr lang="zh-TW" altLang="en-US" sz="3200" dirty="0">
+              <a:solidFill>
+                <a:srgbClr val="FFC000"/>
+              </a:solidFill>
+            </a:endParaRPr>
+          </a:p>
+        </p:txBody>
+      </p:sp>
+      <p:sp>
+        <p:nvSpPr>
+          <p:cNvPr id="3" name="內容版面配置區 2">
+            <a:extLst>
+              <a:ext uri="{FF2B5EF4-FFF2-40B4-BE49-F238E27FC236}">
+                <a16:creationId xmlns:a16="http://schemas.microsoft.com/office/drawing/2014/main" id="{BCD1334E-696C-48ED-124F-550400F12E74}"/>
+              </a:ext>
+            </a:extLst>
+          </p:cNvPr>
+          <p:cNvSpPr>
+            <a:spLocks noGrp="1"/>
+          </p:cNvSpPr>
+          <p:nvPr>
+            <p:ph idx="1"/>
+          </p:nvPr>
+        </p:nvSpPr>
+        <p:spPr>
+          <a:xfrm>
+            <a:off x="797097" y="1765192"/>
+            <a:ext cx="5496127" cy="547027"/>
+          </a:xfrm>
+        </p:spPr>
+        <p:txBody>
+          <a:bodyPr anchor="ctr" anchorCtr="0">
+            <a:noAutofit/>
+          </a:bodyPr>
+          <a:lstStyle/>
+          <a:p>
+            <a:pPr>
+              <a:buFont typeface="Wingdings" panose="05000000000000000000" pitchFamily="2" charset="2"/>
+              <a:buChar char="l"/>
+            </a:pPr>
+            <a:r>
+              <a:rPr lang="zh-TW" altLang="en-US" dirty="0">
+                <a:solidFill>
+                  <a:srgbClr val="00B0F0"/>
+                </a:solidFill>
+              </a:rPr>
+              <a:t> </a:t>
+            </a:r>
+            <a:r>
+              <a:rPr lang="en-US" altLang="zh-TW" dirty="0">
+                <a:solidFill>
+                  <a:srgbClr val="00B0F0"/>
+                </a:solidFill>
+              </a:rPr>
+              <a:t>Push(</a:t>
+            </a:r>
+            <a:r>
+              <a:rPr lang="zh-TW" altLang="en-US" dirty="0">
+                <a:solidFill>
+                  <a:srgbClr val="00B0F0"/>
+                </a:solidFill>
+              </a:rPr>
+              <a:t>推送</a:t>
+            </a:r>
+            <a:r>
+              <a:rPr lang="en-US" altLang="zh-TW" dirty="0">
+                <a:solidFill>
+                  <a:srgbClr val="00B0F0"/>
+                </a:solidFill>
+              </a:rPr>
+              <a:t>)</a:t>
+            </a:r>
+            <a:r>
+              <a:rPr lang="zh-TW" altLang="en-US" dirty="0">
+                <a:solidFill>
+                  <a:srgbClr val="00B0F0"/>
+                </a:solidFill>
+              </a:rPr>
+              <a:t>新分支到遠端</a:t>
+            </a:r>
+            <a:r>
+              <a:rPr lang="en-US" altLang="zh-TW" dirty="0">
+                <a:solidFill>
+                  <a:srgbClr val="00B0F0"/>
+                </a:solidFill>
+              </a:rPr>
+              <a:t>Git</a:t>
+            </a:r>
+            <a:r>
+              <a:rPr lang="zh-TW" altLang="en-US" dirty="0">
+                <a:solidFill>
+                  <a:srgbClr val="00B0F0"/>
+                </a:solidFill>
+              </a:rPr>
+              <a:t> 新分支</a:t>
+            </a:r>
+          </a:p>
+        </p:txBody>
+      </p:sp>
+      <p:sp>
+        <p:nvSpPr>
+          <p:cNvPr id="11" name="內容版面配置區 2">
+            <a:extLst>
+              <a:ext uri="{FF2B5EF4-FFF2-40B4-BE49-F238E27FC236}">
+                <a16:creationId xmlns:a16="http://schemas.microsoft.com/office/drawing/2014/main" id="{F5F62EB3-DD38-A0F2-E557-DEF1097D4922}"/>
+              </a:ext>
+            </a:extLst>
+          </p:cNvPr>
+          <p:cNvSpPr txBox="1">
+            <a:spLocks/>
+          </p:cNvSpPr>
+          <p:nvPr/>
+        </p:nvSpPr>
+        <p:spPr>
+          <a:xfrm>
+            <a:off x="1340358" y="2431410"/>
+            <a:ext cx="6503760" cy="442048"/>
+          </a:xfrm>
+          <a:prstGeom prst="rect">
+            <a:avLst/>
+          </a:prstGeom>
+        </p:spPr>
+        <p:txBody>
+          <a:bodyPr vert="horz" lIns="91440" tIns="45720" rIns="91440" bIns="45720" rtlCol="0" anchor="ctr" anchorCtr="0">
+            <a:normAutofit/>
+          </a:bodyPr>
+          <a:lstStyle>
+            <a:lvl1pPr marL="228600" indent="-228600" algn="l" defTabSz="914400" rtl="0" eaLnBrk="1" latinLnBrk="0" hangingPunct="1">
+              <a:lnSpc>
+                <a:spcPct val="120000"/>
+              </a:lnSpc>
+              <a:spcBef>
+                <a:spcPts val="1000"/>
+              </a:spcBef>
+              <a:buSzPct val="87000"/>
+              <a:buFont typeface="Arial" panose="020B0604020202020204" pitchFamily="34" charset="0"/>
+              <a:buChar char="•"/>
+              <a:defRPr sz="2000" kern="1200">
+                <a:solidFill>
+                  <a:schemeClr val="tx1"/>
+                </a:solidFill>
+                <a:latin typeface="+mn-lt"/>
+                <a:ea typeface="+mn-ea"/>
+                <a:cs typeface="+mn-cs"/>
+              </a:defRPr>
+            </a:lvl1pPr>
+            <a:lvl2pPr marL="493776" indent="-228600" algn="l" defTabSz="914400" rtl="0" eaLnBrk="1" latinLnBrk="0" hangingPunct="1">
+              <a:lnSpc>
+                <a:spcPct val="120000"/>
+              </a:lnSpc>
+              <a:spcBef>
+                <a:spcPts val="500"/>
+              </a:spcBef>
+              <a:buSzPct val="87000"/>
+              <a:buFont typeface="Arial" panose="020B0604020202020204" pitchFamily="34" charset="0"/>
+              <a:buChar char="•"/>
+              <a:defRPr sz="1800" kern="1200">
+                <a:solidFill>
+                  <a:schemeClr val="tx1"/>
+                </a:solidFill>
+                <a:latin typeface="+mn-lt"/>
+                <a:ea typeface="+mn-ea"/>
+                <a:cs typeface="+mn-cs"/>
+              </a:defRPr>
+            </a:lvl2pPr>
+            <a:lvl3pPr marL="731520" indent="-228600" algn="l" defTabSz="914400" rtl="0" eaLnBrk="1" latinLnBrk="0" hangingPunct="1">
+              <a:lnSpc>
+                <a:spcPct val="120000"/>
+              </a:lnSpc>
+              <a:spcBef>
+                <a:spcPts val="500"/>
+              </a:spcBef>
+              <a:buSzPct val="87000"/>
+              <a:buFont typeface="Arial" panose="020B0604020202020204" pitchFamily="34" charset="0"/>
+              <a:buChar char="•"/>
+              <a:defRPr sz="1600" kern="1200">
+                <a:solidFill>
+                  <a:schemeClr val="tx1"/>
+                </a:solidFill>
+                <a:latin typeface="+mn-lt"/>
+                <a:ea typeface="+mn-ea"/>
+                <a:cs typeface="+mn-cs"/>
+              </a:defRPr>
+            </a:lvl3pPr>
+            <a:lvl4pPr marL="1051560" indent="-285750" algn="l" defTabSz="914400" rtl="0" eaLnBrk="1" latinLnBrk="0" hangingPunct="1">
+              <a:lnSpc>
+                <a:spcPct val="120000"/>
+              </a:lnSpc>
+              <a:spcBef>
+                <a:spcPts val="500"/>
+              </a:spcBef>
+              <a:buSzPct val="87000"/>
+              <a:buFont typeface="Arial" panose="020B0604020202020204" pitchFamily="34" charset="0"/>
+              <a:buChar char="•"/>
+              <a:defRPr sz="1400" kern="1200">
+                <a:solidFill>
+                  <a:schemeClr val="tx1"/>
+                </a:solidFill>
+                <a:latin typeface="+mn-lt"/>
+                <a:ea typeface="+mn-ea"/>
+                <a:cs typeface="+mn-cs"/>
+              </a:defRPr>
+            </a:lvl4pPr>
+            <a:lvl5pPr marL="1298448" indent="-228600" algn="l" defTabSz="914400" rtl="0" eaLnBrk="1" latinLnBrk="0" hangingPunct="1">
+              <a:lnSpc>
+                <a:spcPct val="120000"/>
+              </a:lnSpc>
+              <a:spcBef>
+                <a:spcPts val="500"/>
+              </a:spcBef>
+              <a:buSzPct val="87000"/>
+              <a:buFont typeface="Arial" panose="020B0604020202020204" pitchFamily="34" charset="0"/>
+              <a:buChar char="•"/>
+              <a:defRPr sz="1400" kern="1200">
+                <a:solidFill>
+                  <a:schemeClr val="tx1"/>
+                </a:solidFill>
+                <a:latin typeface="+mn-lt"/>
+                <a:ea typeface="+mn-ea"/>
+                <a:cs typeface="+mn-cs"/>
+              </a:defRPr>
+            </a:lvl5pPr>
+            <a:lvl6pPr marL="2514600" indent="-228600" algn="l" defTabSz="914400" rtl="0" eaLnBrk="1" latinLnBrk="0" hangingPunct="1">
+              <a:lnSpc>
+                <a:spcPct val="90000"/>
+              </a:lnSpc>
+              <a:spcBef>
+                <a:spcPts val="500"/>
+              </a:spcBef>
+              <a:buFont typeface="Arial" panose="020B0604020202020204" pitchFamily="34" charset="0"/>
+              <a:buChar char="•"/>
+              <a:defRPr sz="1800" kern="1200">
+                <a:solidFill>
+                  <a:schemeClr val="tx1"/>
+                </a:solidFill>
+                <a:latin typeface="+mn-lt"/>
+                <a:ea typeface="+mn-ea"/>
+                <a:cs typeface="+mn-cs"/>
+              </a:defRPr>
+            </a:lvl6pPr>
+            <a:lvl7pPr marL="2971800" indent="-228600" algn="l" defTabSz="914400" rtl="0" eaLnBrk="1" latinLnBrk="0" hangingPunct="1">
+              <a:lnSpc>
+                <a:spcPct val="90000"/>
+              </a:lnSpc>
+              <a:spcBef>
+                <a:spcPts val="500"/>
+              </a:spcBef>
+              <a:buFont typeface="Arial" panose="020B0604020202020204" pitchFamily="34" charset="0"/>
+              <a:buChar char="•"/>
+              <a:defRPr sz="1800" kern="1200">
+                <a:solidFill>
+                  <a:schemeClr val="tx1"/>
+                </a:solidFill>
+                <a:latin typeface="+mn-lt"/>
+                <a:ea typeface="+mn-ea"/>
+                <a:cs typeface="+mn-cs"/>
+              </a:defRPr>
+            </a:lvl7pPr>
+            <a:lvl8pPr marL="3429000" indent="-228600" algn="l" defTabSz="914400" rtl="0" eaLnBrk="1" latinLnBrk="0" hangingPunct="1">
+              <a:lnSpc>
+                <a:spcPct val="90000"/>
+              </a:lnSpc>
+              <a:spcBef>
+                <a:spcPts val="500"/>
+              </a:spcBef>
+              <a:buFont typeface="Arial" panose="020B0604020202020204" pitchFamily="34" charset="0"/>
+              <a:buChar char="•"/>
+              <a:defRPr sz="1800" kern="1200">
+                <a:solidFill>
+                  <a:schemeClr val="tx1"/>
+                </a:solidFill>
+                <a:latin typeface="+mn-lt"/>
+                <a:ea typeface="+mn-ea"/>
+                <a:cs typeface="+mn-cs"/>
+              </a:defRPr>
+            </a:lvl8pPr>
+            <a:lvl9pPr marL="3886200" indent="-228600" algn="l" defTabSz="914400" rtl="0" eaLnBrk="1" latinLnBrk="0" hangingPunct="1">
+              <a:lnSpc>
+                <a:spcPct val="90000"/>
+              </a:lnSpc>
+              <a:spcBef>
+                <a:spcPts val="500"/>
+              </a:spcBef>
+              <a:buFont typeface="Arial" panose="020B0604020202020204" pitchFamily="34" charset="0"/>
+              <a:buChar char="•"/>
+              <a:defRPr sz="1800" kern="1200">
+                <a:solidFill>
+                  <a:schemeClr val="tx1"/>
+                </a:solidFill>
+                <a:latin typeface="+mn-lt"/>
+                <a:ea typeface="+mn-ea"/>
+                <a:cs typeface="+mn-cs"/>
+              </a:defRPr>
+            </a:lvl9pPr>
+          </a:lstStyle>
+          <a:p>
+            <a:pPr>
+              <a:buFont typeface="Wingdings" panose="05000000000000000000" pitchFamily="2" charset="2"/>
+              <a:buChar char="Ø"/>
+            </a:pPr>
+            <a:r>
+              <a:rPr lang="zh-TW" altLang="en-US" sz="1600" dirty="0">
+                <a:solidFill>
+                  <a:schemeClr val="bg1"/>
+                </a:solidFill>
+              </a:rPr>
+              <a:t>推送</a:t>
+            </a:r>
+            <a:r>
+              <a:rPr lang="en-US" altLang="zh-TW" sz="1600" dirty="0">
+                <a:solidFill>
+                  <a:schemeClr val="bg1"/>
+                </a:solidFill>
+              </a:rPr>
+              <a:t>Git</a:t>
+            </a:r>
+            <a:r>
+              <a:rPr lang="zh-TW" altLang="en-US" sz="1600" dirty="0">
+                <a:solidFill>
+                  <a:schemeClr val="bg1"/>
+                </a:solidFill>
+              </a:rPr>
+              <a:t>到遠端數據庫，同時設定追蹤</a:t>
+            </a:r>
+            <a:r>
+              <a:rPr lang="en-US" altLang="zh-TW" sz="1600" dirty="0">
+                <a:solidFill>
+                  <a:schemeClr val="bg1"/>
+                </a:solidFill>
+              </a:rPr>
+              <a:t>(track)</a:t>
+            </a:r>
+            <a:r>
+              <a:rPr lang="zh-TW" altLang="en-US" sz="1600" dirty="0">
+                <a:solidFill>
+                  <a:schemeClr val="bg1"/>
+                </a:solidFill>
+              </a:rPr>
+              <a:t>遠端分支</a:t>
+            </a:r>
+          </a:p>
+        </p:txBody>
+      </p:sp>
+      <p:sp>
+        <p:nvSpPr>
+          <p:cNvPr id="14" name="文字方塊 13">
+            <a:extLst>
+              <a:ext uri="{FF2B5EF4-FFF2-40B4-BE49-F238E27FC236}">
+                <a16:creationId xmlns:a16="http://schemas.microsoft.com/office/drawing/2014/main" id="{78CC2848-B619-D87F-35F2-FEA7D6DAD172}"/>
+              </a:ext>
+            </a:extLst>
+          </p:cNvPr>
+          <p:cNvSpPr txBox="1"/>
+          <p:nvPr/>
+        </p:nvSpPr>
+        <p:spPr>
+          <a:xfrm>
+            <a:off x="1717953" y="2974693"/>
+            <a:ext cx="9389318" cy="387927"/>
+          </a:xfrm>
+          <a:prstGeom prst="rect">
+            <a:avLst/>
+          </a:prstGeom>
+          <a:noFill/>
+        </p:spPr>
+        <p:txBody>
+          <a:bodyPr wrap="square" rtlCol="0">
+            <a:spAutoFit/>
+          </a:bodyPr>
+          <a:lstStyle/>
+          <a:p>
+            <a:pPr>
+              <a:lnSpc>
+                <a:spcPct val="150000"/>
+              </a:lnSpc>
+            </a:pPr>
+            <a:r>
+              <a:rPr lang="zh-TW" altLang="en-US" sz="1400" dirty="0">
+                <a:solidFill>
+                  <a:schemeClr val="bg1"/>
+                </a:solidFill>
+                <a:latin typeface="Courier New" panose="02070309020205020404" pitchFamily="49" charset="0"/>
+                <a:cs typeface="Courier New" panose="02070309020205020404" pitchFamily="49" charset="0"/>
+              </a:rPr>
+              <a:t>在</a:t>
+            </a:r>
+            <a:r>
+              <a:rPr lang="en-US" altLang="zh-TW" sz="1400" dirty="0">
+                <a:solidFill>
+                  <a:schemeClr val="bg1"/>
+                </a:solidFill>
+                <a:latin typeface="Courier New" panose="02070309020205020404" pitchFamily="49" charset="0"/>
+                <a:cs typeface="Courier New" panose="02070309020205020404" pitchFamily="49" charset="0"/>
+              </a:rPr>
+              <a:t>“push”</a:t>
+            </a:r>
+            <a:r>
+              <a:rPr lang="zh-TW" altLang="en-US" sz="1400" dirty="0">
+                <a:solidFill>
+                  <a:schemeClr val="bg1"/>
+                </a:solidFill>
+                <a:latin typeface="Courier New" panose="02070309020205020404" pitchFamily="49" charset="0"/>
+                <a:cs typeface="Courier New" panose="02070309020205020404" pitchFamily="49" charset="0"/>
+              </a:rPr>
+              <a:t>指令後加上參數 </a:t>
+            </a:r>
+            <a:r>
+              <a:rPr lang="en-US" altLang="zh-TW" sz="1400" dirty="0">
+                <a:solidFill>
+                  <a:schemeClr val="bg1"/>
+                </a:solidFill>
+                <a:latin typeface="Courier New" panose="02070309020205020404" pitchFamily="49" charset="0"/>
+                <a:cs typeface="Courier New" panose="02070309020205020404" pitchFamily="49" charset="0"/>
+              </a:rPr>
+              <a:t>“— —set—upstream” &lt;</a:t>
+            </a:r>
+            <a:r>
+              <a:rPr lang="zh-TW" altLang="en-US" sz="1400" dirty="0">
+                <a:solidFill>
+                  <a:schemeClr val="bg1"/>
+                </a:solidFill>
+                <a:latin typeface="Courier New" panose="02070309020205020404" pitchFamily="49" charset="0"/>
+                <a:cs typeface="Courier New" panose="02070309020205020404" pitchFamily="49" charset="0"/>
+              </a:rPr>
+              <a:t>遠端分支路徑</a:t>
+            </a:r>
+            <a:r>
+              <a:rPr lang="en-US" altLang="zh-TW" sz="1400" dirty="0">
+                <a:solidFill>
+                  <a:schemeClr val="bg1"/>
+                </a:solidFill>
+                <a:latin typeface="Courier New" panose="02070309020205020404" pitchFamily="49" charset="0"/>
+                <a:cs typeface="Courier New" panose="02070309020205020404" pitchFamily="49" charset="0"/>
+              </a:rPr>
+              <a:t>&gt;</a:t>
+            </a:r>
+            <a:r>
+              <a:rPr lang="zh-TW" altLang="en-US" sz="1400" dirty="0">
+                <a:solidFill>
+                  <a:schemeClr val="bg1"/>
+                </a:solidFill>
+                <a:latin typeface="Courier New" panose="02070309020205020404" pitchFamily="49" charset="0"/>
+                <a:cs typeface="Courier New" panose="02070309020205020404" pitchFamily="49" charset="0"/>
+              </a:rPr>
+              <a:t> </a:t>
+            </a:r>
+            <a:r>
+              <a:rPr lang="en-US" altLang="zh-TW" sz="1400" dirty="0">
+                <a:solidFill>
+                  <a:schemeClr val="bg1"/>
+                </a:solidFill>
+                <a:latin typeface="Courier New" panose="02070309020205020404" pitchFamily="49" charset="0"/>
+                <a:cs typeface="Courier New" panose="02070309020205020404" pitchFamily="49" charset="0"/>
+              </a:rPr>
+              <a:t>&lt;</a:t>
+            </a:r>
+            <a:r>
+              <a:rPr lang="zh-TW" altLang="en-US" sz="1400" dirty="0">
+                <a:solidFill>
+                  <a:schemeClr val="bg1"/>
+                </a:solidFill>
+                <a:latin typeface="Courier New" panose="02070309020205020404" pitchFamily="49" charset="0"/>
+                <a:cs typeface="Courier New" panose="02070309020205020404" pitchFamily="49" charset="0"/>
+              </a:rPr>
+              <a:t>本地端分支名稱</a:t>
+            </a:r>
+            <a:r>
+              <a:rPr lang="en-US" altLang="zh-TW" sz="1400" dirty="0">
+                <a:solidFill>
+                  <a:schemeClr val="bg1"/>
+                </a:solidFill>
+                <a:latin typeface="Courier New" panose="02070309020205020404" pitchFamily="49" charset="0"/>
+                <a:cs typeface="Courier New" panose="02070309020205020404" pitchFamily="49" charset="0"/>
+              </a:rPr>
+              <a:t>&gt;:&lt;</a:t>
+            </a:r>
+            <a:r>
+              <a:rPr lang="zh-TW" altLang="en-US" sz="1400" dirty="0">
+                <a:solidFill>
+                  <a:schemeClr val="bg1"/>
+                </a:solidFill>
+                <a:latin typeface="Courier New" panose="02070309020205020404" pitchFamily="49" charset="0"/>
+                <a:cs typeface="Courier New" panose="02070309020205020404" pitchFamily="49" charset="0"/>
+              </a:rPr>
+              <a:t>遠端分支名稱</a:t>
+            </a:r>
+            <a:r>
+              <a:rPr lang="en-US" altLang="zh-TW" sz="1400" dirty="0">
+                <a:solidFill>
+                  <a:schemeClr val="bg1"/>
+                </a:solidFill>
+                <a:latin typeface="Courier New" panose="02070309020205020404" pitchFamily="49" charset="0"/>
+                <a:cs typeface="Courier New" panose="02070309020205020404" pitchFamily="49" charset="0"/>
+              </a:rPr>
+              <a:t>&gt;</a:t>
+            </a:r>
+            <a:endParaRPr lang="zh-TW" altLang="en-US" sz="1400" dirty="0">
+              <a:solidFill>
+                <a:srgbClr val="00FF00"/>
+              </a:solidFill>
+              <a:latin typeface="Courier New" panose="02070309020205020404" pitchFamily="49" charset="0"/>
+              <a:cs typeface="Courier New" panose="02070309020205020404" pitchFamily="49" charset="0"/>
+            </a:endParaRPr>
+          </a:p>
+        </p:txBody>
+      </p:sp>
+      <p:sp>
+        <p:nvSpPr>
+          <p:cNvPr id="16" name="文字方塊 15">
+            <a:extLst>
+              <a:ext uri="{FF2B5EF4-FFF2-40B4-BE49-F238E27FC236}">
+                <a16:creationId xmlns:a16="http://schemas.microsoft.com/office/drawing/2014/main" id="{01D7F75B-2E4A-5543-0FC3-0B66DC65F618}"/>
+              </a:ext>
+            </a:extLst>
+          </p:cNvPr>
+          <p:cNvSpPr txBox="1"/>
+          <p:nvPr/>
+        </p:nvSpPr>
+        <p:spPr>
+          <a:xfrm>
+            <a:off x="1981130" y="3493191"/>
+            <a:ext cx="8525506" cy="276999"/>
+          </a:xfrm>
+          <a:prstGeom prst="rect">
+            <a:avLst/>
+          </a:prstGeom>
+          <a:noFill/>
+        </p:spPr>
+        <p:txBody>
+          <a:bodyPr wrap="square" rtlCol="0">
+            <a:spAutoFit/>
+          </a:bodyPr>
+          <a:lstStyle/>
+          <a:p>
+            <a:r>
+              <a:rPr lang="en-US" altLang="zh-TW" sz="1200" dirty="0">
+                <a:solidFill>
+                  <a:schemeClr val="bg1"/>
+                </a:solidFill>
+                <a:latin typeface="Courier New" panose="02070309020205020404" pitchFamily="49" charset="0"/>
+                <a:cs typeface="Courier New" panose="02070309020205020404" pitchFamily="49" charset="0"/>
+              </a:rPr>
+              <a:t>$</a:t>
+            </a:r>
+            <a:r>
+              <a:rPr lang="en-US" altLang="zh-TW" sz="1200" dirty="0">
+                <a:solidFill>
+                  <a:srgbClr val="00FF00"/>
+                </a:solidFill>
+                <a:latin typeface="Courier New" panose="02070309020205020404" pitchFamily="49" charset="0"/>
+                <a:cs typeface="Courier New" panose="02070309020205020404" pitchFamily="49" charset="0"/>
+              </a:rPr>
+              <a:t> git push</a:t>
+            </a:r>
+            <a:r>
+              <a:rPr lang="zh-TW" altLang="en-US" sz="1200" dirty="0">
+                <a:solidFill>
+                  <a:srgbClr val="00FF00"/>
+                </a:solidFill>
+                <a:latin typeface="Courier New" panose="02070309020205020404" pitchFamily="49" charset="0"/>
+                <a:cs typeface="Courier New" panose="02070309020205020404" pitchFamily="49" charset="0"/>
+              </a:rPr>
+              <a:t> </a:t>
+            </a:r>
+            <a:r>
+              <a:rPr lang="en-US" altLang="zh-TW" sz="1200" dirty="0">
+                <a:solidFill>
+                  <a:srgbClr val="00FF00"/>
+                </a:solidFill>
+                <a:latin typeface="Courier New" panose="02070309020205020404" pitchFamily="49" charset="0"/>
+                <a:cs typeface="Courier New" panose="02070309020205020404" pitchFamily="49" charset="0"/>
+              </a:rPr>
+              <a:t>––set–upstream d:/Daniel_SIDE_PROJECT/TestFolder/Remote master:master </a:t>
+            </a:r>
+          </a:p>
+        </p:txBody>
+      </p:sp>
+      <p:sp>
+        <p:nvSpPr>
+          <p:cNvPr id="17" name="文字方塊 16">
+            <a:extLst>
+              <a:ext uri="{FF2B5EF4-FFF2-40B4-BE49-F238E27FC236}">
+                <a16:creationId xmlns:a16="http://schemas.microsoft.com/office/drawing/2014/main" id="{56DFB556-169B-B060-1BA3-0D20DD9216CF}"/>
+              </a:ext>
+            </a:extLst>
+          </p:cNvPr>
+          <p:cNvSpPr txBox="1"/>
+          <p:nvPr/>
+        </p:nvSpPr>
+        <p:spPr>
+          <a:xfrm>
+            <a:off x="2227452" y="3944459"/>
+            <a:ext cx="8817066" cy="276999"/>
+          </a:xfrm>
+          <a:prstGeom prst="rect">
+            <a:avLst/>
+          </a:prstGeom>
+          <a:noFill/>
+        </p:spPr>
+        <p:txBody>
+          <a:bodyPr wrap="square" rtlCol="0">
+            <a:spAutoFit/>
+          </a:bodyPr>
+          <a:lstStyle/>
+          <a:p>
+            <a:r>
+              <a:rPr lang="zh-TW" altLang="en-US" sz="1200" dirty="0">
+                <a:solidFill>
+                  <a:schemeClr val="bg1"/>
+                </a:solidFill>
+                <a:latin typeface="Courier New" panose="02070309020205020404" pitchFamily="49" charset="0"/>
+                <a:cs typeface="Courier New" panose="02070309020205020404" pitchFamily="49" charset="0"/>
+              </a:rPr>
+              <a:t>語法說明 </a:t>
+            </a:r>
+            <a:r>
+              <a:rPr lang="en-US" altLang="zh-TW" sz="1200" dirty="0">
+                <a:solidFill>
+                  <a:schemeClr val="bg1"/>
+                </a:solidFill>
+                <a:latin typeface="Courier New" panose="02070309020205020404" pitchFamily="49" charset="0"/>
+                <a:cs typeface="Courier New" panose="02070309020205020404" pitchFamily="49" charset="0"/>
+              </a:rPr>
+              <a:t>:</a:t>
+            </a:r>
+            <a:r>
+              <a:rPr lang="zh-TW" altLang="en-US" sz="1200" dirty="0">
+                <a:solidFill>
+                  <a:schemeClr val="bg1"/>
+                </a:solidFill>
+                <a:latin typeface="Courier New" panose="02070309020205020404" pitchFamily="49" charset="0"/>
+                <a:cs typeface="Courier New" panose="02070309020205020404" pitchFamily="49" charset="0"/>
+              </a:rPr>
+              <a:t> 上述指令即是將本地端分支名稱</a:t>
+            </a:r>
+            <a:r>
+              <a:rPr lang="en-US" altLang="zh-TW" sz="1200" dirty="0">
+                <a:solidFill>
+                  <a:schemeClr val="bg1"/>
+                </a:solidFill>
+                <a:latin typeface="Courier New" panose="02070309020205020404" pitchFamily="49" charset="0"/>
+                <a:cs typeface="Courier New" panose="02070309020205020404" pitchFamily="49" charset="0"/>
+              </a:rPr>
+              <a:t>master</a:t>
+            </a:r>
+            <a:r>
+              <a:rPr lang="zh-TW" altLang="en-US" sz="1200" dirty="0">
+                <a:solidFill>
+                  <a:schemeClr val="bg1"/>
+                </a:solidFill>
+                <a:latin typeface="Courier New" panose="02070309020205020404" pitchFamily="49" charset="0"/>
+                <a:cs typeface="Courier New" panose="02070309020205020404" pitchFamily="49" charset="0"/>
+              </a:rPr>
+              <a:t>推送到遠地端分支名稱</a:t>
+            </a:r>
+            <a:r>
+              <a:rPr lang="en-US" altLang="zh-TW" sz="1200" dirty="0">
+                <a:solidFill>
+                  <a:schemeClr val="bg1"/>
+                </a:solidFill>
+                <a:latin typeface="Courier New" panose="02070309020205020404" pitchFamily="49" charset="0"/>
+                <a:cs typeface="Courier New" panose="02070309020205020404" pitchFamily="49" charset="0"/>
+              </a:rPr>
+              <a:t>master</a:t>
+            </a:r>
+            <a:r>
+              <a:rPr lang="zh-TW" altLang="en-US" sz="1200" dirty="0">
+                <a:solidFill>
+                  <a:schemeClr val="bg1"/>
+                </a:solidFill>
+                <a:latin typeface="Courier New" panose="02070309020205020404" pitchFamily="49" charset="0"/>
+                <a:cs typeface="Courier New" panose="02070309020205020404" pitchFamily="49" charset="0"/>
+              </a:rPr>
+              <a:t>，並同時設定本地端追蹤遠端分支路徑。</a:t>
+            </a:r>
+            <a:endParaRPr lang="en-US" altLang="zh-TW" sz="1200" dirty="0">
+              <a:solidFill>
+                <a:srgbClr val="33CCCC"/>
+              </a:solidFill>
+              <a:latin typeface="Courier New" panose="02070309020205020404" pitchFamily="49" charset="0"/>
+              <a:cs typeface="Courier New" panose="02070309020205020404" pitchFamily="49" charset="0"/>
+            </a:endParaRPr>
+          </a:p>
+        </p:txBody>
+      </p:sp>
+      <p:sp>
+        <p:nvSpPr>
+          <p:cNvPr id="18" name="文字方塊 17">
+            <a:extLst>
+              <a:ext uri="{FF2B5EF4-FFF2-40B4-BE49-F238E27FC236}">
+                <a16:creationId xmlns:a16="http://schemas.microsoft.com/office/drawing/2014/main" id="{3C1CFFF9-1BC2-1B20-B45A-660F582A4CB9}"/>
+              </a:ext>
+            </a:extLst>
+          </p:cNvPr>
+          <p:cNvSpPr txBox="1"/>
+          <p:nvPr/>
+        </p:nvSpPr>
+        <p:spPr>
+          <a:xfrm>
+            <a:off x="3988094" y="6299394"/>
+            <a:ext cx="4215808" cy="276999"/>
+          </a:xfrm>
+          <a:prstGeom prst="rect">
+            <a:avLst/>
+          </a:prstGeom>
+          <a:noFill/>
+        </p:spPr>
+        <p:txBody>
+          <a:bodyPr wrap="square" rtlCol="0">
+            <a:spAutoFit/>
+          </a:bodyPr>
+          <a:lstStyle/>
+          <a:p>
+            <a:pPr algn="ctr"/>
+            <a:r>
+              <a:rPr lang="zh-TW" altLang="en-US" sz="1200" dirty="0">
+                <a:solidFill>
+                  <a:schemeClr val="bg1">
+                    <a:lumMod val="65000"/>
+                  </a:schemeClr>
+                </a:solidFill>
+                <a:latin typeface="Courier New" panose="02070309020205020404" pitchFamily="49" charset="0"/>
+                <a:cs typeface="Courier New" panose="02070309020205020404" pitchFamily="49" charset="0"/>
+              </a:rPr>
+              <a:t>紅框上指出已設定本地端</a:t>
+            </a:r>
+            <a:r>
+              <a:rPr lang="en-US" altLang="zh-TW" sz="1200" dirty="0">
+                <a:solidFill>
+                  <a:schemeClr val="bg1">
+                    <a:lumMod val="65000"/>
+                  </a:schemeClr>
+                </a:solidFill>
+                <a:latin typeface="Courier New" panose="02070309020205020404" pitchFamily="49" charset="0"/>
+                <a:cs typeface="Courier New" panose="02070309020205020404" pitchFamily="49" charset="0"/>
+              </a:rPr>
+              <a:t>master</a:t>
+            </a:r>
+            <a:r>
+              <a:rPr lang="zh-TW" altLang="en-US" sz="1200" dirty="0">
+                <a:solidFill>
+                  <a:schemeClr val="bg1">
+                    <a:lumMod val="65000"/>
+                  </a:schemeClr>
+                </a:solidFill>
+                <a:latin typeface="Courier New" panose="02070309020205020404" pitchFamily="49" charset="0"/>
+                <a:cs typeface="Courier New" panose="02070309020205020404" pitchFamily="49" charset="0"/>
+              </a:rPr>
+              <a:t>分支追蹤遠端</a:t>
+            </a:r>
+            <a:r>
+              <a:rPr lang="en-US" altLang="zh-TW" sz="1200" dirty="0">
+                <a:solidFill>
+                  <a:schemeClr val="bg1">
+                    <a:lumMod val="65000"/>
+                  </a:schemeClr>
+                </a:solidFill>
+                <a:latin typeface="Courier New" panose="02070309020205020404" pitchFamily="49" charset="0"/>
+                <a:cs typeface="Courier New" panose="02070309020205020404" pitchFamily="49" charset="0"/>
+              </a:rPr>
+              <a:t>master</a:t>
+            </a:r>
+            <a:r>
+              <a:rPr lang="zh-TW" altLang="en-US" sz="1200" dirty="0">
+                <a:solidFill>
+                  <a:schemeClr val="bg1">
+                    <a:lumMod val="65000"/>
+                  </a:schemeClr>
+                </a:solidFill>
+                <a:latin typeface="Courier New" panose="02070309020205020404" pitchFamily="49" charset="0"/>
+                <a:cs typeface="Courier New" panose="02070309020205020404" pitchFamily="49" charset="0"/>
+              </a:rPr>
+              <a:t>分支</a:t>
+            </a:r>
+            <a:endParaRPr lang="en-US" altLang="zh-TW" sz="1200" dirty="0">
+              <a:solidFill>
+                <a:schemeClr val="bg1">
+                  <a:lumMod val="65000"/>
+                </a:schemeClr>
+              </a:solidFill>
+              <a:latin typeface="Courier New" panose="02070309020205020404" pitchFamily="49" charset="0"/>
+              <a:cs typeface="Courier New" panose="02070309020205020404" pitchFamily="49" charset="0"/>
+            </a:endParaRPr>
+          </a:p>
+        </p:txBody>
+      </p:sp>
+      <p:grpSp>
+        <p:nvGrpSpPr>
+          <p:cNvPr id="19" name="群組 18">
+            <a:extLst>
+              <a:ext uri="{FF2B5EF4-FFF2-40B4-BE49-F238E27FC236}">
+                <a16:creationId xmlns:a16="http://schemas.microsoft.com/office/drawing/2014/main" id="{FB27BF0C-8178-EBF7-1422-86006A3FC7BA}"/>
+              </a:ext>
+            </a:extLst>
+          </p:cNvPr>
+          <p:cNvGrpSpPr/>
+          <p:nvPr/>
+        </p:nvGrpSpPr>
+        <p:grpSpPr>
+          <a:xfrm>
+            <a:off x="2600048" y="4572121"/>
+            <a:ext cx="6991902" cy="1464644"/>
+            <a:chOff x="2600048" y="4572121"/>
+            <a:chExt cx="6991902" cy="1464644"/>
+          </a:xfrm>
+        </p:grpSpPr>
+        <p:pic>
+          <p:nvPicPr>
+            <p:cNvPr id="20" name="圖片 19">
+              <a:extLst>
+                <a:ext uri="{FF2B5EF4-FFF2-40B4-BE49-F238E27FC236}">
+                  <a16:creationId xmlns:a16="http://schemas.microsoft.com/office/drawing/2014/main" id="{3E9D9419-205E-27B7-4FAA-051A72F1E0E6}"/>
+                </a:ext>
+              </a:extLst>
+            </p:cNvPr>
+            <p:cNvPicPr>
+              <a:picLocks noChangeAspect="1"/>
+            </p:cNvPicPr>
+            <p:nvPr/>
+          </p:nvPicPr>
+          <p:blipFill>
+            <a:blip r:embed="rId2"/>
+            <a:stretch>
+              <a:fillRect/>
+            </a:stretch>
+          </p:blipFill>
+          <p:spPr>
+            <a:xfrm>
+              <a:off x="2600049" y="4572121"/>
+              <a:ext cx="6991901" cy="1435535"/>
+            </a:xfrm>
+            <a:prstGeom prst="rect">
+              <a:avLst/>
+            </a:prstGeom>
+          </p:spPr>
+        </p:pic>
+        <p:sp>
+          <p:nvSpPr>
+            <p:cNvPr id="21" name="矩形 20">
+              <a:extLst>
+                <a:ext uri="{FF2B5EF4-FFF2-40B4-BE49-F238E27FC236}">
+                  <a16:creationId xmlns:a16="http://schemas.microsoft.com/office/drawing/2014/main" id="{06DA336A-50FB-4F0A-1748-5C043B0251C3}"/>
+                </a:ext>
+              </a:extLst>
+            </p:cNvPr>
+            <p:cNvSpPr/>
+            <p:nvPr/>
+          </p:nvSpPr>
+          <p:spPr>
+            <a:xfrm>
+              <a:off x="2600048" y="5759766"/>
+              <a:ext cx="6991901" cy="276999"/>
+            </a:xfrm>
+            <a:prstGeom prst="rect">
+              <a:avLst/>
+            </a:prstGeom>
+            <a:noFill/>
+            <a:ln w="19050"/>
+          </p:spPr>
+          <p:style>
+            <a:lnRef idx="2">
+              <a:schemeClr val="accent5"/>
+            </a:lnRef>
+            <a:fillRef idx="1">
+              <a:schemeClr val="lt1"/>
+            </a:fillRef>
+            <a:effectRef idx="0">
+              <a:schemeClr val="accent5"/>
+            </a:effectRef>
+            <a:fontRef idx="minor">
+              <a:schemeClr val="dk1"/>
+            </a:fontRef>
+          </p:style>
+          <p:txBody>
+            <a:bodyPr rtlCol="0" anchor="ctr"/>
+            <a:lstStyle/>
+            <a:p>
+              <a:pPr algn="ctr"/>
+              <a:endParaRPr lang="zh-TW" altLang="en-US"/>
+            </a:p>
+          </p:txBody>
+        </p:sp>
+      </p:grpSp>
+    </p:spTree>
+    <p:extLst>
+      <p:ext uri="{BB962C8B-B14F-4D97-AF65-F5344CB8AC3E}">
+        <p14:creationId xmlns:p14="http://schemas.microsoft.com/office/powerpoint/2010/main" val="3694130762"/>
+      </p:ext>
+    </p:extLst>
+  </p:cSld>
+  <p:clrMapOvr>
+    <a:masterClrMapping/>
+  </p:clrMapOvr>
+</p:sld>
+</file>
+
+<file path=ppt/slides/slide16.xml><?xml version="1.0" encoding="utf-8"?>
 <p:sld xmlns:a="http://schemas.openxmlformats.org/drawingml/2006/main" xmlns:r="http://schemas.openxmlformats.org/officeDocument/2006/relationships" xmlns:p="http://schemas.openxmlformats.org/presentationml/2006/main">
   <p:cSld>
     <p:bg>
@@ -10706,7 +12629,7 @@
 </p:sld>
 </file>
 
-<file path=ppt/slides/slide15.xml><?xml version="1.0" encoding="utf-8"?>
+<file path=ppt/slides/slide17.xml><?xml version="1.0" encoding="utf-8"?>
 <p:sld xmlns:a="http://schemas.openxmlformats.org/drawingml/2006/main" xmlns:r="http://schemas.openxmlformats.org/officeDocument/2006/relationships" xmlns:p="http://schemas.openxmlformats.org/presentationml/2006/main">
   <p:cSld>
     <p:bg>
@@ -11983,7 +13906,7 @@
 </p:sld>
 </file>
 
-<file path=ppt/slides/slide16.xml><?xml version="1.0" encoding="utf-8"?>
+<file path=ppt/slides/slide18.xml><?xml version="1.0" encoding="utf-8"?>
 <p:sld xmlns:a="http://schemas.openxmlformats.org/drawingml/2006/main" xmlns:r="http://schemas.openxmlformats.org/officeDocument/2006/relationships" xmlns:p="http://schemas.openxmlformats.org/presentationml/2006/main">
   <p:cSld>
     <p:bg>
@@ -13502,7 +15425,7 @@
 </p:sld>
 </file>
 
-<file path=ppt/slides/slide17.xml><?xml version="1.0" encoding="utf-8"?>
+<file path=ppt/slides/slide19.xml><?xml version="1.0" encoding="utf-8"?>
 <p:sld xmlns:a="http://schemas.openxmlformats.org/drawingml/2006/main" xmlns:r="http://schemas.openxmlformats.org/officeDocument/2006/relationships" xmlns:p="http://schemas.openxmlformats.org/presentationml/2006/main">
   <p:cSld>
     <p:bg>
@@ -14994,7 +16917,843 @@
 </p:sld>
 </file>
 
-<file path=ppt/slides/slide18.xml><?xml version="1.0" encoding="utf-8"?>
+<file path=ppt/slides/slide2.xml><?xml version="1.0" encoding="utf-8"?>
+<p:sld xmlns:a="http://schemas.openxmlformats.org/drawingml/2006/main" xmlns:r="http://schemas.openxmlformats.org/officeDocument/2006/relationships" xmlns:p="http://schemas.openxmlformats.org/presentationml/2006/main">
+  <p:cSld>
+    <p:bg>
+      <p:bgPr>
+        <a:solidFill>
+          <a:schemeClr val="tx1">
+            <a:lumMod val="75000"/>
+            <a:lumOff val="25000"/>
+          </a:schemeClr>
+        </a:solidFill>
+        <a:effectLst/>
+      </p:bgPr>
+    </p:bg>
+    <p:spTree>
+      <p:nvGrpSpPr>
+        <p:cNvPr id="1" name=""/>
+        <p:cNvGrpSpPr/>
+        <p:nvPr/>
+      </p:nvGrpSpPr>
+      <p:grpSpPr>
+        <a:xfrm>
+          <a:off x="0" y="0"/>
+          <a:ext cx="0" cy="0"/>
+          <a:chOff x="0" y="0"/>
+          <a:chExt cx="0" cy="0"/>
+        </a:xfrm>
+      </p:grpSpPr>
+      <p:sp>
+        <p:nvSpPr>
+          <p:cNvPr id="2" name="標題 1">
+            <a:extLst>
+              <a:ext uri="{FF2B5EF4-FFF2-40B4-BE49-F238E27FC236}">
+                <a16:creationId xmlns:a16="http://schemas.microsoft.com/office/drawing/2014/main" id="{D0319E0B-CE52-5BD1-E3E7-765C35AA9D1D}"/>
+              </a:ext>
+            </a:extLst>
+          </p:cNvPr>
+          <p:cNvSpPr>
+            <a:spLocks noGrp="1"/>
+          </p:cNvSpPr>
+          <p:nvPr>
+            <p:ph type="title"/>
+          </p:nvPr>
+        </p:nvSpPr>
+        <p:spPr>
+          <a:xfrm>
+            <a:off x="640079" y="1123237"/>
+            <a:ext cx="10890929" cy="1097280"/>
+          </a:xfrm>
+        </p:spPr>
+        <p:txBody>
+          <a:bodyPr anchor="ctr" anchorCtr="0"/>
+          <a:lstStyle/>
+          <a:p>
+            <a:r>
+              <a:rPr lang="en-US" altLang="zh-TW" dirty="0">
+                <a:solidFill>
+                  <a:srgbClr val="FFC000"/>
+                </a:solidFill>
+              </a:rPr>
+              <a:t>Git Bash – Command Line</a:t>
+            </a:r>
+            <a:endParaRPr lang="zh-TW" altLang="en-US" dirty="0">
+              <a:solidFill>
+                <a:srgbClr val="FFC000"/>
+              </a:solidFill>
+            </a:endParaRPr>
+          </a:p>
+        </p:txBody>
+      </p:sp>
+      <p:sp>
+        <p:nvSpPr>
+          <p:cNvPr id="3" name="內容版面配置區 2">
+            <a:extLst>
+              <a:ext uri="{FF2B5EF4-FFF2-40B4-BE49-F238E27FC236}">
+                <a16:creationId xmlns:a16="http://schemas.microsoft.com/office/drawing/2014/main" id="{D6F5BB14-CB00-FB25-B911-203A52C54E35}"/>
+              </a:ext>
+            </a:extLst>
+          </p:cNvPr>
+          <p:cNvSpPr>
+            <a:spLocks noGrp="1"/>
+          </p:cNvSpPr>
+          <p:nvPr>
+            <p:ph idx="1"/>
+          </p:nvPr>
+        </p:nvSpPr>
+        <p:spPr>
+          <a:xfrm>
+            <a:off x="797098" y="2122664"/>
+            <a:ext cx="8439266" cy="692434"/>
+          </a:xfrm>
+        </p:spPr>
+        <p:txBody>
+          <a:bodyPr anchor="ctr" anchorCtr="0">
+            <a:noAutofit/>
+          </a:bodyPr>
+          <a:lstStyle/>
+          <a:p>
+            <a:pPr>
+              <a:buFont typeface="Wingdings" panose="05000000000000000000" pitchFamily="2" charset="2"/>
+              <a:buChar char="l"/>
+            </a:pPr>
+            <a:r>
+              <a:rPr lang="zh-TW" altLang="en-US" dirty="0">
+                <a:solidFill>
+                  <a:srgbClr val="00B0F0"/>
+                </a:solidFill>
+              </a:rPr>
+              <a:t> </a:t>
+            </a:r>
+            <a:r>
+              <a:rPr lang="en-US" altLang="zh-TW" dirty="0">
+                <a:solidFill>
+                  <a:srgbClr val="00B0F0"/>
+                </a:solidFill>
+              </a:rPr>
+              <a:t>Git</a:t>
+            </a:r>
+            <a:r>
+              <a:rPr lang="zh-TW" altLang="en-US" dirty="0">
+                <a:solidFill>
+                  <a:srgbClr val="00B0F0"/>
+                </a:solidFill>
+              </a:rPr>
+              <a:t>初次安裝完成後可透過</a:t>
+            </a:r>
+            <a:r>
+              <a:rPr lang="en-US" altLang="zh-TW" dirty="0">
+                <a:solidFill>
+                  <a:srgbClr val="00B0F0"/>
+                </a:solidFill>
+              </a:rPr>
+              <a:t>Git</a:t>
+            </a:r>
+            <a:r>
+              <a:rPr lang="zh-TW" altLang="en-US" dirty="0">
+                <a:solidFill>
+                  <a:srgbClr val="00B0F0"/>
+                </a:solidFill>
+              </a:rPr>
+              <a:t> </a:t>
+            </a:r>
+            <a:r>
+              <a:rPr lang="en-US" altLang="zh-TW" dirty="0">
+                <a:solidFill>
+                  <a:srgbClr val="00B0F0"/>
+                </a:solidFill>
+              </a:rPr>
+              <a:t>Bash</a:t>
+            </a:r>
+            <a:r>
+              <a:rPr lang="zh-TW" altLang="en-US" dirty="0">
+                <a:solidFill>
+                  <a:srgbClr val="00B0F0"/>
+                </a:solidFill>
+              </a:rPr>
+              <a:t>輸入指令查看初始的設定參數</a:t>
+            </a:r>
+          </a:p>
+        </p:txBody>
+      </p:sp>
+      <p:sp>
+        <p:nvSpPr>
+          <p:cNvPr id="4" name="文字方塊 3">
+            <a:extLst>
+              <a:ext uri="{FF2B5EF4-FFF2-40B4-BE49-F238E27FC236}">
+                <a16:creationId xmlns:a16="http://schemas.microsoft.com/office/drawing/2014/main" id="{1FBCA4F5-E5BB-3189-07AB-217E3BC6A781}"/>
+              </a:ext>
+            </a:extLst>
+          </p:cNvPr>
+          <p:cNvSpPr txBox="1"/>
+          <p:nvPr/>
+        </p:nvSpPr>
+        <p:spPr>
+          <a:xfrm>
+            <a:off x="1717955" y="3824497"/>
+            <a:ext cx="4598623" cy="338554"/>
+          </a:xfrm>
+          <a:prstGeom prst="rect">
+            <a:avLst/>
+          </a:prstGeom>
+          <a:noFill/>
+        </p:spPr>
+        <p:txBody>
+          <a:bodyPr wrap="square" rtlCol="0">
+            <a:spAutoFit/>
+          </a:bodyPr>
+          <a:lstStyle/>
+          <a:p>
+            <a:r>
+              <a:rPr lang="en-US" altLang="zh-TW" sz="1600" dirty="0">
+                <a:solidFill>
+                  <a:schemeClr val="bg1"/>
+                </a:solidFill>
+                <a:latin typeface="Courier New" panose="02070309020205020404" pitchFamily="49" charset="0"/>
+                <a:cs typeface="Courier New" panose="02070309020205020404" pitchFamily="49" charset="0"/>
+              </a:rPr>
+              <a:t>$</a:t>
+            </a:r>
+            <a:r>
+              <a:rPr lang="en-US" altLang="zh-TW" sz="1600" dirty="0">
+                <a:solidFill>
+                  <a:srgbClr val="00FF00"/>
+                </a:solidFill>
+                <a:latin typeface="Courier New" panose="02070309020205020404" pitchFamily="49" charset="0"/>
+                <a:cs typeface="Courier New" panose="02070309020205020404" pitchFamily="49" charset="0"/>
+              </a:rPr>
+              <a:t> git config ––list ––show—origin </a:t>
+            </a:r>
+            <a:endParaRPr lang="zh-TW" altLang="en-US" sz="1600" dirty="0">
+              <a:solidFill>
+                <a:srgbClr val="00FF00"/>
+              </a:solidFill>
+              <a:latin typeface="Courier New" panose="02070309020205020404" pitchFamily="49" charset="0"/>
+              <a:cs typeface="Courier New" panose="02070309020205020404" pitchFamily="49" charset="0"/>
+            </a:endParaRPr>
+          </a:p>
+        </p:txBody>
+      </p:sp>
+      <p:sp>
+        <p:nvSpPr>
+          <p:cNvPr id="5" name="內容版面配置區 2">
+            <a:extLst>
+              <a:ext uri="{FF2B5EF4-FFF2-40B4-BE49-F238E27FC236}">
+                <a16:creationId xmlns:a16="http://schemas.microsoft.com/office/drawing/2014/main" id="{D444E1D1-AFAD-CB4A-F777-381A4CD925C5}"/>
+              </a:ext>
+            </a:extLst>
+          </p:cNvPr>
+          <p:cNvSpPr txBox="1">
+            <a:spLocks/>
+          </p:cNvSpPr>
+          <p:nvPr/>
+        </p:nvSpPr>
+        <p:spPr>
+          <a:xfrm>
+            <a:off x="1340359" y="2986683"/>
+            <a:ext cx="8662622" cy="692434"/>
+          </a:xfrm>
+          <a:prstGeom prst="rect">
+            <a:avLst/>
+          </a:prstGeom>
+        </p:spPr>
+        <p:txBody>
+          <a:bodyPr vert="horz" lIns="91440" tIns="45720" rIns="91440" bIns="45720" rtlCol="0" anchor="ctr" anchorCtr="0">
+            <a:normAutofit/>
+          </a:bodyPr>
+          <a:lstStyle>
+            <a:lvl1pPr marL="228600" indent="-228600" algn="l" defTabSz="914400" rtl="0" eaLnBrk="1" latinLnBrk="0" hangingPunct="1">
+              <a:lnSpc>
+                <a:spcPct val="120000"/>
+              </a:lnSpc>
+              <a:spcBef>
+                <a:spcPts val="1000"/>
+              </a:spcBef>
+              <a:buSzPct val="87000"/>
+              <a:buFont typeface="Arial" panose="020B0604020202020204" pitchFamily="34" charset="0"/>
+              <a:buChar char="•"/>
+              <a:defRPr sz="2000" kern="1200">
+                <a:solidFill>
+                  <a:schemeClr val="tx1"/>
+                </a:solidFill>
+                <a:latin typeface="+mn-lt"/>
+                <a:ea typeface="+mn-ea"/>
+                <a:cs typeface="+mn-cs"/>
+              </a:defRPr>
+            </a:lvl1pPr>
+            <a:lvl2pPr marL="493776" indent="-228600" algn="l" defTabSz="914400" rtl="0" eaLnBrk="1" latinLnBrk="0" hangingPunct="1">
+              <a:lnSpc>
+                <a:spcPct val="120000"/>
+              </a:lnSpc>
+              <a:spcBef>
+                <a:spcPts val="500"/>
+              </a:spcBef>
+              <a:buSzPct val="87000"/>
+              <a:buFont typeface="Arial" panose="020B0604020202020204" pitchFamily="34" charset="0"/>
+              <a:buChar char="•"/>
+              <a:defRPr sz="1800" kern="1200">
+                <a:solidFill>
+                  <a:schemeClr val="tx1"/>
+                </a:solidFill>
+                <a:latin typeface="+mn-lt"/>
+                <a:ea typeface="+mn-ea"/>
+                <a:cs typeface="+mn-cs"/>
+              </a:defRPr>
+            </a:lvl2pPr>
+            <a:lvl3pPr marL="731520" indent="-228600" algn="l" defTabSz="914400" rtl="0" eaLnBrk="1" latinLnBrk="0" hangingPunct="1">
+              <a:lnSpc>
+                <a:spcPct val="120000"/>
+              </a:lnSpc>
+              <a:spcBef>
+                <a:spcPts val="500"/>
+              </a:spcBef>
+              <a:buSzPct val="87000"/>
+              <a:buFont typeface="Arial" panose="020B0604020202020204" pitchFamily="34" charset="0"/>
+              <a:buChar char="•"/>
+              <a:defRPr sz="1600" kern="1200">
+                <a:solidFill>
+                  <a:schemeClr val="tx1"/>
+                </a:solidFill>
+                <a:latin typeface="+mn-lt"/>
+                <a:ea typeface="+mn-ea"/>
+                <a:cs typeface="+mn-cs"/>
+              </a:defRPr>
+            </a:lvl3pPr>
+            <a:lvl4pPr marL="1051560" indent="-285750" algn="l" defTabSz="914400" rtl="0" eaLnBrk="1" latinLnBrk="0" hangingPunct="1">
+              <a:lnSpc>
+                <a:spcPct val="120000"/>
+              </a:lnSpc>
+              <a:spcBef>
+                <a:spcPts val="500"/>
+              </a:spcBef>
+              <a:buSzPct val="87000"/>
+              <a:buFont typeface="Arial" panose="020B0604020202020204" pitchFamily="34" charset="0"/>
+              <a:buChar char="•"/>
+              <a:defRPr sz="1400" kern="1200">
+                <a:solidFill>
+                  <a:schemeClr val="tx1"/>
+                </a:solidFill>
+                <a:latin typeface="+mn-lt"/>
+                <a:ea typeface="+mn-ea"/>
+                <a:cs typeface="+mn-cs"/>
+              </a:defRPr>
+            </a:lvl4pPr>
+            <a:lvl5pPr marL="1298448" indent="-228600" algn="l" defTabSz="914400" rtl="0" eaLnBrk="1" latinLnBrk="0" hangingPunct="1">
+              <a:lnSpc>
+                <a:spcPct val="120000"/>
+              </a:lnSpc>
+              <a:spcBef>
+                <a:spcPts val="500"/>
+              </a:spcBef>
+              <a:buSzPct val="87000"/>
+              <a:buFont typeface="Arial" panose="020B0604020202020204" pitchFamily="34" charset="0"/>
+              <a:buChar char="•"/>
+              <a:defRPr sz="1400" kern="1200">
+                <a:solidFill>
+                  <a:schemeClr val="tx1"/>
+                </a:solidFill>
+                <a:latin typeface="+mn-lt"/>
+                <a:ea typeface="+mn-ea"/>
+                <a:cs typeface="+mn-cs"/>
+              </a:defRPr>
+            </a:lvl5pPr>
+            <a:lvl6pPr marL="2514600" indent="-228600" algn="l" defTabSz="914400" rtl="0" eaLnBrk="1" latinLnBrk="0" hangingPunct="1">
+              <a:lnSpc>
+                <a:spcPct val="90000"/>
+              </a:lnSpc>
+              <a:spcBef>
+                <a:spcPts val="500"/>
+              </a:spcBef>
+              <a:buFont typeface="Arial" panose="020B0604020202020204" pitchFamily="34" charset="0"/>
+              <a:buChar char="•"/>
+              <a:defRPr sz="1800" kern="1200">
+                <a:solidFill>
+                  <a:schemeClr val="tx1"/>
+                </a:solidFill>
+                <a:latin typeface="+mn-lt"/>
+                <a:ea typeface="+mn-ea"/>
+                <a:cs typeface="+mn-cs"/>
+              </a:defRPr>
+            </a:lvl6pPr>
+            <a:lvl7pPr marL="2971800" indent="-228600" algn="l" defTabSz="914400" rtl="0" eaLnBrk="1" latinLnBrk="0" hangingPunct="1">
+              <a:lnSpc>
+                <a:spcPct val="90000"/>
+              </a:lnSpc>
+              <a:spcBef>
+                <a:spcPts val="500"/>
+              </a:spcBef>
+              <a:buFont typeface="Arial" panose="020B0604020202020204" pitchFamily="34" charset="0"/>
+              <a:buChar char="•"/>
+              <a:defRPr sz="1800" kern="1200">
+                <a:solidFill>
+                  <a:schemeClr val="tx1"/>
+                </a:solidFill>
+                <a:latin typeface="+mn-lt"/>
+                <a:ea typeface="+mn-ea"/>
+                <a:cs typeface="+mn-cs"/>
+              </a:defRPr>
+            </a:lvl7pPr>
+            <a:lvl8pPr marL="3429000" indent="-228600" algn="l" defTabSz="914400" rtl="0" eaLnBrk="1" latinLnBrk="0" hangingPunct="1">
+              <a:lnSpc>
+                <a:spcPct val="90000"/>
+              </a:lnSpc>
+              <a:spcBef>
+                <a:spcPts val="500"/>
+              </a:spcBef>
+              <a:buFont typeface="Arial" panose="020B0604020202020204" pitchFamily="34" charset="0"/>
+              <a:buChar char="•"/>
+              <a:defRPr sz="1800" kern="1200">
+                <a:solidFill>
+                  <a:schemeClr val="tx1"/>
+                </a:solidFill>
+                <a:latin typeface="+mn-lt"/>
+                <a:ea typeface="+mn-ea"/>
+                <a:cs typeface="+mn-cs"/>
+              </a:defRPr>
+            </a:lvl8pPr>
+            <a:lvl9pPr marL="3886200" indent="-228600" algn="l" defTabSz="914400" rtl="0" eaLnBrk="1" latinLnBrk="0" hangingPunct="1">
+              <a:lnSpc>
+                <a:spcPct val="90000"/>
+              </a:lnSpc>
+              <a:spcBef>
+                <a:spcPts val="500"/>
+              </a:spcBef>
+              <a:buFont typeface="Arial" panose="020B0604020202020204" pitchFamily="34" charset="0"/>
+              <a:buChar char="•"/>
+              <a:defRPr sz="1800" kern="1200">
+                <a:solidFill>
+                  <a:schemeClr val="tx1"/>
+                </a:solidFill>
+                <a:latin typeface="+mn-lt"/>
+                <a:ea typeface="+mn-ea"/>
+                <a:cs typeface="+mn-cs"/>
+              </a:defRPr>
+            </a:lvl9pPr>
+          </a:lstStyle>
+          <a:p>
+            <a:pPr>
+              <a:buFont typeface="Wingdings" panose="05000000000000000000" pitchFamily="2" charset="2"/>
+              <a:buChar char="Ø"/>
+            </a:pPr>
+            <a:r>
+              <a:rPr lang="zh-TW" altLang="en-US" sz="1800" dirty="0">
+                <a:solidFill>
+                  <a:schemeClr val="bg1"/>
+                </a:solidFill>
+              </a:rPr>
+              <a:t>查看</a:t>
+            </a:r>
+            <a:r>
+              <a:rPr lang="en-US" altLang="zh-TW" sz="1800" dirty="0">
+                <a:solidFill>
+                  <a:schemeClr val="bg1"/>
+                </a:solidFill>
+              </a:rPr>
+              <a:t>Git</a:t>
+            </a:r>
+            <a:r>
+              <a:rPr lang="zh-TW" altLang="en-US" sz="1800" dirty="0">
+                <a:solidFill>
+                  <a:schemeClr val="bg1"/>
+                </a:solidFill>
+              </a:rPr>
+              <a:t>所有設定與來源命令</a:t>
+            </a:r>
+            <a:r>
+              <a:rPr lang="en-US" altLang="zh-TW" sz="1800" dirty="0">
+                <a:solidFill>
+                  <a:schemeClr val="bg1"/>
+                </a:solidFill>
+              </a:rPr>
+              <a:t>(</a:t>
+            </a:r>
+            <a:r>
+              <a:rPr lang="zh-TW" altLang="en-US" sz="1800" dirty="0">
+                <a:solidFill>
+                  <a:schemeClr val="bg1"/>
+                </a:solidFill>
+              </a:rPr>
+              <a:t>顯示</a:t>
+            </a:r>
+            <a:r>
+              <a:rPr lang="en-US" altLang="zh-TW" sz="1800" dirty="0">
+                <a:solidFill>
+                  <a:schemeClr val="bg1"/>
+                </a:solidFill>
+              </a:rPr>
+              <a:t>Git</a:t>
+            </a:r>
+            <a:r>
+              <a:rPr lang="zh-TW" altLang="en-US" sz="1800" dirty="0">
+                <a:solidFill>
+                  <a:schemeClr val="bg1"/>
+                </a:solidFill>
+              </a:rPr>
+              <a:t>的設定值及設定值所在的文件來源位置</a:t>
+            </a:r>
+            <a:r>
+              <a:rPr lang="en-US" altLang="zh-TW" sz="1800" dirty="0">
+                <a:solidFill>
+                  <a:schemeClr val="bg1"/>
+                </a:solidFill>
+              </a:rPr>
+              <a:t>)</a:t>
+            </a:r>
+            <a:endParaRPr lang="zh-TW" altLang="en-US" sz="1800" dirty="0">
+              <a:solidFill>
+                <a:schemeClr val="bg1"/>
+              </a:solidFill>
+            </a:endParaRPr>
+          </a:p>
+        </p:txBody>
+      </p:sp>
+      <p:sp>
+        <p:nvSpPr>
+          <p:cNvPr id="6" name="內容版面配置區 2">
+            <a:extLst>
+              <a:ext uri="{FF2B5EF4-FFF2-40B4-BE49-F238E27FC236}">
+                <a16:creationId xmlns:a16="http://schemas.microsoft.com/office/drawing/2014/main" id="{45676DA1-17B6-2797-918C-06A37D64808C}"/>
+              </a:ext>
+            </a:extLst>
+          </p:cNvPr>
+          <p:cNvSpPr txBox="1">
+            <a:spLocks/>
+          </p:cNvSpPr>
+          <p:nvPr/>
+        </p:nvSpPr>
+        <p:spPr>
+          <a:xfrm>
+            <a:off x="1340359" y="4684263"/>
+            <a:ext cx="6907714" cy="692434"/>
+          </a:xfrm>
+          <a:prstGeom prst="rect">
+            <a:avLst/>
+          </a:prstGeom>
+        </p:spPr>
+        <p:txBody>
+          <a:bodyPr vert="horz" lIns="91440" tIns="45720" rIns="91440" bIns="45720" rtlCol="0" anchor="ctr" anchorCtr="0">
+            <a:normAutofit/>
+          </a:bodyPr>
+          <a:lstStyle>
+            <a:lvl1pPr marL="228600" indent="-228600" algn="l" defTabSz="914400" rtl="0" eaLnBrk="1" latinLnBrk="0" hangingPunct="1">
+              <a:lnSpc>
+                <a:spcPct val="120000"/>
+              </a:lnSpc>
+              <a:spcBef>
+                <a:spcPts val="1000"/>
+              </a:spcBef>
+              <a:buSzPct val="87000"/>
+              <a:buFont typeface="Arial" panose="020B0604020202020204" pitchFamily="34" charset="0"/>
+              <a:buChar char="•"/>
+              <a:defRPr sz="2000" kern="1200">
+                <a:solidFill>
+                  <a:schemeClr val="tx1"/>
+                </a:solidFill>
+                <a:latin typeface="+mn-lt"/>
+                <a:ea typeface="+mn-ea"/>
+                <a:cs typeface="+mn-cs"/>
+              </a:defRPr>
+            </a:lvl1pPr>
+            <a:lvl2pPr marL="493776" indent="-228600" algn="l" defTabSz="914400" rtl="0" eaLnBrk="1" latinLnBrk="0" hangingPunct="1">
+              <a:lnSpc>
+                <a:spcPct val="120000"/>
+              </a:lnSpc>
+              <a:spcBef>
+                <a:spcPts val="500"/>
+              </a:spcBef>
+              <a:buSzPct val="87000"/>
+              <a:buFont typeface="Arial" panose="020B0604020202020204" pitchFamily="34" charset="0"/>
+              <a:buChar char="•"/>
+              <a:defRPr sz="1800" kern="1200">
+                <a:solidFill>
+                  <a:schemeClr val="tx1"/>
+                </a:solidFill>
+                <a:latin typeface="+mn-lt"/>
+                <a:ea typeface="+mn-ea"/>
+                <a:cs typeface="+mn-cs"/>
+              </a:defRPr>
+            </a:lvl2pPr>
+            <a:lvl3pPr marL="731520" indent="-228600" algn="l" defTabSz="914400" rtl="0" eaLnBrk="1" latinLnBrk="0" hangingPunct="1">
+              <a:lnSpc>
+                <a:spcPct val="120000"/>
+              </a:lnSpc>
+              <a:spcBef>
+                <a:spcPts val="500"/>
+              </a:spcBef>
+              <a:buSzPct val="87000"/>
+              <a:buFont typeface="Arial" panose="020B0604020202020204" pitchFamily="34" charset="0"/>
+              <a:buChar char="•"/>
+              <a:defRPr sz="1600" kern="1200">
+                <a:solidFill>
+                  <a:schemeClr val="tx1"/>
+                </a:solidFill>
+                <a:latin typeface="+mn-lt"/>
+                <a:ea typeface="+mn-ea"/>
+                <a:cs typeface="+mn-cs"/>
+              </a:defRPr>
+            </a:lvl3pPr>
+            <a:lvl4pPr marL="1051560" indent="-285750" algn="l" defTabSz="914400" rtl="0" eaLnBrk="1" latinLnBrk="0" hangingPunct="1">
+              <a:lnSpc>
+                <a:spcPct val="120000"/>
+              </a:lnSpc>
+              <a:spcBef>
+                <a:spcPts val="500"/>
+              </a:spcBef>
+              <a:buSzPct val="87000"/>
+              <a:buFont typeface="Arial" panose="020B0604020202020204" pitchFamily="34" charset="0"/>
+              <a:buChar char="•"/>
+              <a:defRPr sz="1400" kern="1200">
+                <a:solidFill>
+                  <a:schemeClr val="tx1"/>
+                </a:solidFill>
+                <a:latin typeface="+mn-lt"/>
+                <a:ea typeface="+mn-ea"/>
+                <a:cs typeface="+mn-cs"/>
+              </a:defRPr>
+            </a:lvl4pPr>
+            <a:lvl5pPr marL="1298448" indent="-228600" algn="l" defTabSz="914400" rtl="0" eaLnBrk="1" latinLnBrk="0" hangingPunct="1">
+              <a:lnSpc>
+                <a:spcPct val="120000"/>
+              </a:lnSpc>
+              <a:spcBef>
+                <a:spcPts val="500"/>
+              </a:spcBef>
+              <a:buSzPct val="87000"/>
+              <a:buFont typeface="Arial" panose="020B0604020202020204" pitchFamily="34" charset="0"/>
+              <a:buChar char="•"/>
+              <a:defRPr sz="1400" kern="1200">
+                <a:solidFill>
+                  <a:schemeClr val="tx1"/>
+                </a:solidFill>
+                <a:latin typeface="+mn-lt"/>
+                <a:ea typeface="+mn-ea"/>
+                <a:cs typeface="+mn-cs"/>
+              </a:defRPr>
+            </a:lvl5pPr>
+            <a:lvl6pPr marL="2514600" indent="-228600" algn="l" defTabSz="914400" rtl="0" eaLnBrk="1" latinLnBrk="0" hangingPunct="1">
+              <a:lnSpc>
+                <a:spcPct val="90000"/>
+              </a:lnSpc>
+              <a:spcBef>
+                <a:spcPts val="500"/>
+              </a:spcBef>
+              <a:buFont typeface="Arial" panose="020B0604020202020204" pitchFamily="34" charset="0"/>
+              <a:buChar char="•"/>
+              <a:defRPr sz="1800" kern="1200">
+                <a:solidFill>
+                  <a:schemeClr val="tx1"/>
+                </a:solidFill>
+                <a:latin typeface="+mn-lt"/>
+                <a:ea typeface="+mn-ea"/>
+                <a:cs typeface="+mn-cs"/>
+              </a:defRPr>
+            </a:lvl6pPr>
+            <a:lvl7pPr marL="2971800" indent="-228600" algn="l" defTabSz="914400" rtl="0" eaLnBrk="1" latinLnBrk="0" hangingPunct="1">
+              <a:lnSpc>
+                <a:spcPct val="90000"/>
+              </a:lnSpc>
+              <a:spcBef>
+                <a:spcPts val="500"/>
+              </a:spcBef>
+              <a:buFont typeface="Arial" panose="020B0604020202020204" pitchFamily="34" charset="0"/>
+              <a:buChar char="•"/>
+              <a:defRPr sz="1800" kern="1200">
+                <a:solidFill>
+                  <a:schemeClr val="tx1"/>
+                </a:solidFill>
+                <a:latin typeface="+mn-lt"/>
+                <a:ea typeface="+mn-ea"/>
+                <a:cs typeface="+mn-cs"/>
+              </a:defRPr>
+            </a:lvl7pPr>
+            <a:lvl8pPr marL="3429000" indent="-228600" algn="l" defTabSz="914400" rtl="0" eaLnBrk="1" latinLnBrk="0" hangingPunct="1">
+              <a:lnSpc>
+                <a:spcPct val="90000"/>
+              </a:lnSpc>
+              <a:spcBef>
+                <a:spcPts val="500"/>
+              </a:spcBef>
+              <a:buFont typeface="Arial" panose="020B0604020202020204" pitchFamily="34" charset="0"/>
+              <a:buChar char="•"/>
+              <a:defRPr sz="1800" kern="1200">
+                <a:solidFill>
+                  <a:schemeClr val="tx1"/>
+                </a:solidFill>
+                <a:latin typeface="+mn-lt"/>
+                <a:ea typeface="+mn-ea"/>
+                <a:cs typeface="+mn-cs"/>
+              </a:defRPr>
+            </a:lvl8pPr>
+            <a:lvl9pPr marL="3886200" indent="-228600" algn="l" defTabSz="914400" rtl="0" eaLnBrk="1" latinLnBrk="0" hangingPunct="1">
+              <a:lnSpc>
+                <a:spcPct val="90000"/>
+              </a:lnSpc>
+              <a:spcBef>
+                <a:spcPts val="500"/>
+              </a:spcBef>
+              <a:buFont typeface="Arial" panose="020B0604020202020204" pitchFamily="34" charset="0"/>
+              <a:buChar char="•"/>
+              <a:defRPr sz="1800" kern="1200">
+                <a:solidFill>
+                  <a:schemeClr val="tx1"/>
+                </a:solidFill>
+                <a:latin typeface="+mn-lt"/>
+                <a:ea typeface="+mn-ea"/>
+                <a:cs typeface="+mn-cs"/>
+              </a:defRPr>
+            </a:lvl9pPr>
+          </a:lstStyle>
+          <a:p>
+            <a:pPr>
+              <a:buFont typeface="Wingdings" panose="05000000000000000000" pitchFamily="2" charset="2"/>
+              <a:buChar char="Ø"/>
+            </a:pPr>
+            <a:r>
+              <a:rPr lang="zh-TW" altLang="en-US" sz="1800" dirty="0">
+                <a:solidFill>
+                  <a:schemeClr val="bg1"/>
+                </a:solidFill>
+              </a:rPr>
+              <a:t>查看</a:t>
+            </a:r>
+            <a:r>
+              <a:rPr lang="en-US" altLang="zh-TW" sz="1800" dirty="0">
+                <a:solidFill>
+                  <a:schemeClr val="bg1"/>
+                </a:solidFill>
+              </a:rPr>
+              <a:t>Git</a:t>
+            </a:r>
+            <a:r>
+              <a:rPr lang="zh-TW" altLang="en-US" sz="1800" dirty="0">
+                <a:solidFill>
+                  <a:schemeClr val="bg1"/>
+                </a:solidFill>
+              </a:rPr>
+              <a:t>所有設定命令</a:t>
+            </a:r>
+            <a:r>
+              <a:rPr lang="en-US" altLang="zh-TW" sz="1800" dirty="0">
+                <a:solidFill>
+                  <a:schemeClr val="bg1"/>
+                </a:solidFill>
+              </a:rPr>
+              <a:t>(</a:t>
+            </a:r>
+            <a:r>
+              <a:rPr lang="zh-TW" altLang="en-US" sz="1800" dirty="0">
+                <a:solidFill>
+                  <a:schemeClr val="bg1"/>
+                </a:solidFill>
+              </a:rPr>
+              <a:t>僅顯示當前</a:t>
+            </a:r>
+            <a:r>
+              <a:rPr lang="en-US" altLang="zh-TW" sz="1800" dirty="0">
+                <a:solidFill>
+                  <a:schemeClr val="bg1"/>
+                </a:solidFill>
+              </a:rPr>
+              <a:t>Git</a:t>
+            </a:r>
+            <a:r>
+              <a:rPr lang="zh-TW" altLang="en-US" sz="1800" dirty="0">
+                <a:solidFill>
+                  <a:schemeClr val="bg1"/>
+                </a:solidFill>
+              </a:rPr>
+              <a:t>使用者的設定值</a:t>
+            </a:r>
+            <a:r>
+              <a:rPr lang="en-US" altLang="zh-TW" sz="1800" dirty="0">
+                <a:solidFill>
+                  <a:schemeClr val="bg1"/>
+                </a:solidFill>
+              </a:rPr>
+              <a:t>)</a:t>
+            </a:r>
+            <a:endParaRPr lang="zh-TW" altLang="en-US" sz="1800" dirty="0">
+              <a:solidFill>
+                <a:schemeClr val="bg1"/>
+              </a:solidFill>
+            </a:endParaRPr>
+          </a:p>
+        </p:txBody>
+      </p:sp>
+      <p:sp>
+        <p:nvSpPr>
+          <p:cNvPr id="7" name="文字方塊 6">
+            <a:extLst>
+              <a:ext uri="{FF2B5EF4-FFF2-40B4-BE49-F238E27FC236}">
+                <a16:creationId xmlns:a16="http://schemas.microsoft.com/office/drawing/2014/main" id="{EAD653F4-6C55-8C9B-A60D-C8EACCCAF416}"/>
+              </a:ext>
+            </a:extLst>
+          </p:cNvPr>
+          <p:cNvSpPr txBox="1"/>
+          <p:nvPr/>
+        </p:nvSpPr>
+        <p:spPr>
+          <a:xfrm>
+            <a:off x="1717955" y="5548282"/>
+            <a:ext cx="3139277" cy="338554"/>
+          </a:xfrm>
+          <a:prstGeom prst="rect">
+            <a:avLst/>
+          </a:prstGeom>
+          <a:noFill/>
+        </p:spPr>
+        <p:txBody>
+          <a:bodyPr wrap="square" rtlCol="0">
+            <a:spAutoFit/>
+          </a:bodyPr>
+          <a:lstStyle/>
+          <a:p>
+            <a:r>
+              <a:rPr lang="en-US" altLang="zh-TW" sz="1600" dirty="0">
+                <a:solidFill>
+                  <a:schemeClr val="bg1"/>
+                </a:solidFill>
+                <a:latin typeface="Courier New" panose="02070309020205020404" pitchFamily="49" charset="0"/>
+                <a:cs typeface="Courier New" panose="02070309020205020404" pitchFamily="49" charset="0"/>
+              </a:rPr>
+              <a:t>$</a:t>
+            </a:r>
+            <a:r>
+              <a:rPr lang="en-US" altLang="zh-TW" sz="1600" dirty="0">
+                <a:solidFill>
+                  <a:srgbClr val="00FF00"/>
+                </a:solidFill>
+                <a:latin typeface="Courier New" panose="02070309020205020404" pitchFamily="49" charset="0"/>
+                <a:cs typeface="Courier New" panose="02070309020205020404" pitchFamily="49" charset="0"/>
+              </a:rPr>
+              <a:t> git config ––list </a:t>
+            </a:r>
+            <a:endParaRPr lang="zh-TW" altLang="en-US" sz="1600" dirty="0">
+              <a:solidFill>
+                <a:srgbClr val="00FF00"/>
+              </a:solidFill>
+              <a:latin typeface="Courier New" panose="02070309020205020404" pitchFamily="49" charset="0"/>
+              <a:cs typeface="Courier New" panose="02070309020205020404" pitchFamily="49" charset="0"/>
+            </a:endParaRPr>
+          </a:p>
+        </p:txBody>
+      </p:sp>
+    </p:spTree>
+    <p:extLst>
+      <p:ext uri="{BB962C8B-B14F-4D97-AF65-F5344CB8AC3E}">
+        <p14:creationId xmlns:p14="http://schemas.microsoft.com/office/powerpoint/2010/main" val="4257229696"/>
+      </p:ext>
+    </p:extLst>
+  </p:cSld>
+  <p:clrMapOvr>
+    <a:masterClrMapping/>
+  </p:clrMapOvr>
+</p:sld>
+</file>
+
+<file path=ppt/slides/slide20.xml><?xml version="1.0" encoding="utf-8"?>
 <p:sld xmlns:a="http://schemas.openxmlformats.org/drawingml/2006/main" xmlns:r="http://schemas.openxmlformats.org/officeDocument/2006/relationships" xmlns:p="http://schemas.openxmlformats.org/presentationml/2006/main">
   <p:cSld>
     <p:bg>
@@ -15758,7 +18517,7 @@
 </p:sld>
 </file>
 
-<file path=ppt/slides/slide19.xml><?xml version="1.0" encoding="utf-8"?>
+<file path=ppt/slides/slide21.xml><?xml version="1.0" encoding="utf-8"?>
 <p:sld xmlns:a="http://schemas.openxmlformats.org/drawingml/2006/main" xmlns:r="http://schemas.openxmlformats.org/officeDocument/2006/relationships" xmlns:p="http://schemas.openxmlformats.org/presentationml/2006/main">
   <p:cSld>
     <p:bg>
@@ -16930,843 +19689,7 @@
 </p:sld>
 </file>
 
-<file path=ppt/slides/slide2.xml><?xml version="1.0" encoding="utf-8"?>
-<p:sld xmlns:a="http://schemas.openxmlformats.org/drawingml/2006/main" xmlns:r="http://schemas.openxmlformats.org/officeDocument/2006/relationships" xmlns:p="http://schemas.openxmlformats.org/presentationml/2006/main">
-  <p:cSld>
-    <p:bg>
-      <p:bgPr>
-        <a:solidFill>
-          <a:schemeClr val="tx1">
-            <a:lumMod val="75000"/>
-            <a:lumOff val="25000"/>
-          </a:schemeClr>
-        </a:solidFill>
-        <a:effectLst/>
-      </p:bgPr>
-    </p:bg>
-    <p:spTree>
-      <p:nvGrpSpPr>
-        <p:cNvPr id="1" name=""/>
-        <p:cNvGrpSpPr/>
-        <p:nvPr/>
-      </p:nvGrpSpPr>
-      <p:grpSpPr>
-        <a:xfrm>
-          <a:off x="0" y="0"/>
-          <a:ext cx="0" cy="0"/>
-          <a:chOff x="0" y="0"/>
-          <a:chExt cx="0" cy="0"/>
-        </a:xfrm>
-      </p:grpSpPr>
-      <p:sp>
-        <p:nvSpPr>
-          <p:cNvPr id="2" name="標題 1">
-            <a:extLst>
-              <a:ext uri="{FF2B5EF4-FFF2-40B4-BE49-F238E27FC236}">
-                <a16:creationId xmlns:a16="http://schemas.microsoft.com/office/drawing/2014/main" id="{D0319E0B-CE52-5BD1-E3E7-765C35AA9D1D}"/>
-              </a:ext>
-            </a:extLst>
-          </p:cNvPr>
-          <p:cNvSpPr>
-            <a:spLocks noGrp="1"/>
-          </p:cNvSpPr>
-          <p:nvPr>
-            <p:ph type="title"/>
-          </p:nvPr>
-        </p:nvSpPr>
-        <p:spPr>
-          <a:xfrm>
-            <a:off x="640079" y="1123237"/>
-            <a:ext cx="10890929" cy="1097280"/>
-          </a:xfrm>
-        </p:spPr>
-        <p:txBody>
-          <a:bodyPr anchor="ctr" anchorCtr="0"/>
-          <a:lstStyle/>
-          <a:p>
-            <a:r>
-              <a:rPr lang="en-US" altLang="zh-TW" dirty="0">
-                <a:solidFill>
-                  <a:srgbClr val="FFC000"/>
-                </a:solidFill>
-              </a:rPr>
-              <a:t>Git Bash – Command Line</a:t>
-            </a:r>
-            <a:endParaRPr lang="zh-TW" altLang="en-US" dirty="0">
-              <a:solidFill>
-                <a:srgbClr val="FFC000"/>
-              </a:solidFill>
-            </a:endParaRPr>
-          </a:p>
-        </p:txBody>
-      </p:sp>
-      <p:sp>
-        <p:nvSpPr>
-          <p:cNvPr id="3" name="內容版面配置區 2">
-            <a:extLst>
-              <a:ext uri="{FF2B5EF4-FFF2-40B4-BE49-F238E27FC236}">
-                <a16:creationId xmlns:a16="http://schemas.microsoft.com/office/drawing/2014/main" id="{D6F5BB14-CB00-FB25-B911-203A52C54E35}"/>
-              </a:ext>
-            </a:extLst>
-          </p:cNvPr>
-          <p:cNvSpPr>
-            <a:spLocks noGrp="1"/>
-          </p:cNvSpPr>
-          <p:nvPr>
-            <p:ph idx="1"/>
-          </p:nvPr>
-        </p:nvSpPr>
-        <p:spPr>
-          <a:xfrm>
-            <a:off x="797098" y="2122664"/>
-            <a:ext cx="8439266" cy="692434"/>
-          </a:xfrm>
-        </p:spPr>
-        <p:txBody>
-          <a:bodyPr anchor="ctr" anchorCtr="0">
-            <a:noAutofit/>
-          </a:bodyPr>
-          <a:lstStyle/>
-          <a:p>
-            <a:pPr>
-              <a:buFont typeface="Wingdings" panose="05000000000000000000" pitchFamily="2" charset="2"/>
-              <a:buChar char="l"/>
-            </a:pPr>
-            <a:r>
-              <a:rPr lang="zh-TW" altLang="en-US" dirty="0">
-                <a:solidFill>
-                  <a:srgbClr val="00B0F0"/>
-                </a:solidFill>
-              </a:rPr>
-              <a:t> </a:t>
-            </a:r>
-            <a:r>
-              <a:rPr lang="en-US" altLang="zh-TW" dirty="0">
-                <a:solidFill>
-                  <a:srgbClr val="00B0F0"/>
-                </a:solidFill>
-              </a:rPr>
-              <a:t>Git</a:t>
-            </a:r>
-            <a:r>
-              <a:rPr lang="zh-TW" altLang="en-US" dirty="0">
-                <a:solidFill>
-                  <a:srgbClr val="00B0F0"/>
-                </a:solidFill>
-              </a:rPr>
-              <a:t>初次安裝完成後可透過</a:t>
-            </a:r>
-            <a:r>
-              <a:rPr lang="en-US" altLang="zh-TW" dirty="0">
-                <a:solidFill>
-                  <a:srgbClr val="00B0F0"/>
-                </a:solidFill>
-              </a:rPr>
-              <a:t>Git</a:t>
-            </a:r>
-            <a:r>
-              <a:rPr lang="zh-TW" altLang="en-US" dirty="0">
-                <a:solidFill>
-                  <a:srgbClr val="00B0F0"/>
-                </a:solidFill>
-              </a:rPr>
-              <a:t> </a:t>
-            </a:r>
-            <a:r>
-              <a:rPr lang="en-US" altLang="zh-TW" dirty="0">
-                <a:solidFill>
-                  <a:srgbClr val="00B0F0"/>
-                </a:solidFill>
-              </a:rPr>
-              <a:t>Bash</a:t>
-            </a:r>
-            <a:r>
-              <a:rPr lang="zh-TW" altLang="en-US" dirty="0">
-                <a:solidFill>
-                  <a:srgbClr val="00B0F0"/>
-                </a:solidFill>
-              </a:rPr>
-              <a:t>輸入指令查看初始的設定參數</a:t>
-            </a:r>
-          </a:p>
-        </p:txBody>
-      </p:sp>
-      <p:sp>
-        <p:nvSpPr>
-          <p:cNvPr id="4" name="文字方塊 3">
-            <a:extLst>
-              <a:ext uri="{FF2B5EF4-FFF2-40B4-BE49-F238E27FC236}">
-                <a16:creationId xmlns:a16="http://schemas.microsoft.com/office/drawing/2014/main" id="{1FBCA4F5-E5BB-3189-07AB-217E3BC6A781}"/>
-              </a:ext>
-            </a:extLst>
-          </p:cNvPr>
-          <p:cNvSpPr txBox="1"/>
-          <p:nvPr/>
-        </p:nvSpPr>
-        <p:spPr>
-          <a:xfrm>
-            <a:off x="1717955" y="3824497"/>
-            <a:ext cx="4598623" cy="338554"/>
-          </a:xfrm>
-          <a:prstGeom prst="rect">
-            <a:avLst/>
-          </a:prstGeom>
-          <a:noFill/>
-        </p:spPr>
-        <p:txBody>
-          <a:bodyPr wrap="square" rtlCol="0">
-            <a:spAutoFit/>
-          </a:bodyPr>
-          <a:lstStyle/>
-          <a:p>
-            <a:r>
-              <a:rPr lang="en-US" altLang="zh-TW" sz="1600" dirty="0">
-                <a:solidFill>
-                  <a:schemeClr val="bg1"/>
-                </a:solidFill>
-                <a:latin typeface="Courier New" panose="02070309020205020404" pitchFamily="49" charset="0"/>
-                <a:cs typeface="Courier New" panose="02070309020205020404" pitchFamily="49" charset="0"/>
-              </a:rPr>
-              <a:t>$</a:t>
-            </a:r>
-            <a:r>
-              <a:rPr lang="en-US" altLang="zh-TW" sz="1600" dirty="0">
-                <a:solidFill>
-                  <a:srgbClr val="00FF00"/>
-                </a:solidFill>
-                <a:latin typeface="Courier New" panose="02070309020205020404" pitchFamily="49" charset="0"/>
-                <a:cs typeface="Courier New" panose="02070309020205020404" pitchFamily="49" charset="0"/>
-              </a:rPr>
-              <a:t> git config ––list ––show—origin </a:t>
-            </a:r>
-            <a:endParaRPr lang="zh-TW" altLang="en-US" sz="1600" dirty="0">
-              <a:solidFill>
-                <a:srgbClr val="00FF00"/>
-              </a:solidFill>
-              <a:latin typeface="Courier New" panose="02070309020205020404" pitchFamily="49" charset="0"/>
-              <a:cs typeface="Courier New" panose="02070309020205020404" pitchFamily="49" charset="0"/>
-            </a:endParaRPr>
-          </a:p>
-        </p:txBody>
-      </p:sp>
-      <p:sp>
-        <p:nvSpPr>
-          <p:cNvPr id="5" name="內容版面配置區 2">
-            <a:extLst>
-              <a:ext uri="{FF2B5EF4-FFF2-40B4-BE49-F238E27FC236}">
-                <a16:creationId xmlns:a16="http://schemas.microsoft.com/office/drawing/2014/main" id="{D444E1D1-AFAD-CB4A-F777-381A4CD925C5}"/>
-              </a:ext>
-            </a:extLst>
-          </p:cNvPr>
-          <p:cNvSpPr txBox="1">
-            <a:spLocks/>
-          </p:cNvSpPr>
-          <p:nvPr/>
-        </p:nvSpPr>
-        <p:spPr>
-          <a:xfrm>
-            <a:off x="1340359" y="2986683"/>
-            <a:ext cx="8662622" cy="692434"/>
-          </a:xfrm>
-          <a:prstGeom prst="rect">
-            <a:avLst/>
-          </a:prstGeom>
-        </p:spPr>
-        <p:txBody>
-          <a:bodyPr vert="horz" lIns="91440" tIns="45720" rIns="91440" bIns="45720" rtlCol="0" anchor="ctr" anchorCtr="0">
-            <a:normAutofit/>
-          </a:bodyPr>
-          <a:lstStyle>
-            <a:lvl1pPr marL="228600" indent="-228600" algn="l" defTabSz="914400" rtl="0" eaLnBrk="1" latinLnBrk="0" hangingPunct="1">
-              <a:lnSpc>
-                <a:spcPct val="120000"/>
-              </a:lnSpc>
-              <a:spcBef>
-                <a:spcPts val="1000"/>
-              </a:spcBef>
-              <a:buSzPct val="87000"/>
-              <a:buFont typeface="Arial" panose="020B0604020202020204" pitchFamily="34" charset="0"/>
-              <a:buChar char="•"/>
-              <a:defRPr sz="2000" kern="1200">
-                <a:solidFill>
-                  <a:schemeClr val="tx1"/>
-                </a:solidFill>
-                <a:latin typeface="+mn-lt"/>
-                <a:ea typeface="+mn-ea"/>
-                <a:cs typeface="+mn-cs"/>
-              </a:defRPr>
-            </a:lvl1pPr>
-            <a:lvl2pPr marL="493776" indent="-228600" algn="l" defTabSz="914400" rtl="0" eaLnBrk="1" latinLnBrk="0" hangingPunct="1">
-              <a:lnSpc>
-                <a:spcPct val="120000"/>
-              </a:lnSpc>
-              <a:spcBef>
-                <a:spcPts val="500"/>
-              </a:spcBef>
-              <a:buSzPct val="87000"/>
-              <a:buFont typeface="Arial" panose="020B0604020202020204" pitchFamily="34" charset="0"/>
-              <a:buChar char="•"/>
-              <a:defRPr sz="1800" kern="1200">
-                <a:solidFill>
-                  <a:schemeClr val="tx1"/>
-                </a:solidFill>
-                <a:latin typeface="+mn-lt"/>
-                <a:ea typeface="+mn-ea"/>
-                <a:cs typeface="+mn-cs"/>
-              </a:defRPr>
-            </a:lvl2pPr>
-            <a:lvl3pPr marL="731520" indent="-228600" algn="l" defTabSz="914400" rtl="0" eaLnBrk="1" latinLnBrk="0" hangingPunct="1">
-              <a:lnSpc>
-                <a:spcPct val="120000"/>
-              </a:lnSpc>
-              <a:spcBef>
-                <a:spcPts val="500"/>
-              </a:spcBef>
-              <a:buSzPct val="87000"/>
-              <a:buFont typeface="Arial" panose="020B0604020202020204" pitchFamily="34" charset="0"/>
-              <a:buChar char="•"/>
-              <a:defRPr sz="1600" kern="1200">
-                <a:solidFill>
-                  <a:schemeClr val="tx1"/>
-                </a:solidFill>
-                <a:latin typeface="+mn-lt"/>
-                <a:ea typeface="+mn-ea"/>
-                <a:cs typeface="+mn-cs"/>
-              </a:defRPr>
-            </a:lvl3pPr>
-            <a:lvl4pPr marL="1051560" indent="-285750" algn="l" defTabSz="914400" rtl="0" eaLnBrk="1" latinLnBrk="0" hangingPunct="1">
-              <a:lnSpc>
-                <a:spcPct val="120000"/>
-              </a:lnSpc>
-              <a:spcBef>
-                <a:spcPts val="500"/>
-              </a:spcBef>
-              <a:buSzPct val="87000"/>
-              <a:buFont typeface="Arial" panose="020B0604020202020204" pitchFamily="34" charset="0"/>
-              <a:buChar char="•"/>
-              <a:defRPr sz="1400" kern="1200">
-                <a:solidFill>
-                  <a:schemeClr val="tx1"/>
-                </a:solidFill>
-                <a:latin typeface="+mn-lt"/>
-                <a:ea typeface="+mn-ea"/>
-                <a:cs typeface="+mn-cs"/>
-              </a:defRPr>
-            </a:lvl4pPr>
-            <a:lvl5pPr marL="1298448" indent="-228600" algn="l" defTabSz="914400" rtl="0" eaLnBrk="1" latinLnBrk="0" hangingPunct="1">
-              <a:lnSpc>
-                <a:spcPct val="120000"/>
-              </a:lnSpc>
-              <a:spcBef>
-                <a:spcPts val="500"/>
-              </a:spcBef>
-              <a:buSzPct val="87000"/>
-              <a:buFont typeface="Arial" panose="020B0604020202020204" pitchFamily="34" charset="0"/>
-              <a:buChar char="•"/>
-              <a:defRPr sz="1400" kern="1200">
-                <a:solidFill>
-                  <a:schemeClr val="tx1"/>
-                </a:solidFill>
-                <a:latin typeface="+mn-lt"/>
-                <a:ea typeface="+mn-ea"/>
-                <a:cs typeface="+mn-cs"/>
-              </a:defRPr>
-            </a:lvl5pPr>
-            <a:lvl6pPr marL="2514600" indent="-228600" algn="l" defTabSz="914400" rtl="0" eaLnBrk="1" latinLnBrk="0" hangingPunct="1">
-              <a:lnSpc>
-                <a:spcPct val="90000"/>
-              </a:lnSpc>
-              <a:spcBef>
-                <a:spcPts val="500"/>
-              </a:spcBef>
-              <a:buFont typeface="Arial" panose="020B0604020202020204" pitchFamily="34" charset="0"/>
-              <a:buChar char="•"/>
-              <a:defRPr sz="1800" kern="1200">
-                <a:solidFill>
-                  <a:schemeClr val="tx1"/>
-                </a:solidFill>
-                <a:latin typeface="+mn-lt"/>
-                <a:ea typeface="+mn-ea"/>
-                <a:cs typeface="+mn-cs"/>
-              </a:defRPr>
-            </a:lvl6pPr>
-            <a:lvl7pPr marL="2971800" indent="-228600" algn="l" defTabSz="914400" rtl="0" eaLnBrk="1" latinLnBrk="0" hangingPunct="1">
-              <a:lnSpc>
-                <a:spcPct val="90000"/>
-              </a:lnSpc>
-              <a:spcBef>
-                <a:spcPts val="500"/>
-              </a:spcBef>
-              <a:buFont typeface="Arial" panose="020B0604020202020204" pitchFamily="34" charset="0"/>
-              <a:buChar char="•"/>
-              <a:defRPr sz="1800" kern="1200">
-                <a:solidFill>
-                  <a:schemeClr val="tx1"/>
-                </a:solidFill>
-                <a:latin typeface="+mn-lt"/>
-                <a:ea typeface="+mn-ea"/>
-                <a:cs typeface="+mn-cs"/>
-              </a:defRPr>
-            </a:lvl7pPr>
-            <a:lvl8pPr marL="3429000" indent="-228600" algn="l" defTabSz="914400" rtl="0" eaLnBrk="1" latinLnBrk="0" hangingPunct="1">
-              <a:lnSpc>
-                <a:spcPct val="90000"/>
-              </a:lnSpc>
-              <a:spcBef>
-                <a:spcPts val="500"/>
-              </a:spcBef>
-              <a:buFont typeface="Arial" panose="020B0604020202020204" pitchFamily="34" charset="0"/>
-              <a:buChar char="•"/>
-              <a:defRPr sz="1800" kern="1200">
-                <a:solidFill>
-                  <a:schemeClr val="tx1"/>
-                </a:solidFill>
-                <a:latin typeface="+mn-lt"/>
-                <a:ea typeface="+mn-ea"/>
-                <a:cs typeface="+mn-cs"/>
-              </a:defRPr>
-            </a:lvl8pPr>
-            <a:lvl9pPr marL="3886200" indent="-228600" algn="l" defTabSz="914400" rtl="0" eaLnBrk="1" latinLnBrk="0" hangingPunct="1">
-              <a:lnSpc>
-                <a:spcPct val="90000"/>
-              </a:lnSpc>
-              <a:spcBef>
-                <a:spcPts val="500"/>
-              </a:spcBef>
-              <a:buFont typeface="Arial" panose="020B0604020202020204" pitchFamily="34" charset="0"/>
-              <a:buChar char="•"/>
-              <a:defRPr sz="1800" kern="1200">
-                <a:solidFill>
-                  <a:schemeClr val="tx1"/>
-                </a:solidFill>
-                <a:latin typeface="+mn-lt"/>
-                <a:ea typeface="+mn-ea"/>
-                <a:cs typeface="+mn-cs"/>
-              </a:defRPr>
-            </a:lvl9pPr>
-          </a:lstStyle>
-          <a:p>
-            <a:pPr>
-              <a:buFont typeface="Wingdings" panose="05000000000000000000" pitchFamily="2" charset="2"/>
-              <a:buChar char="Ø"/>
-            </a:pPr>
-            <a:r>
-              <a:rPr lang="zh-TW" altLang="en-US" sz="1800" dirty="0">
-                <a:solidFill>
-                  <a:schemeClr val="bg1"/>
-                </a:solidFill>
-              </a:rPr>
-              <a:t>查看</a:t>
-            </a:r>
-            <a:r>
-              <a:rPr lang="en-US" altLang="zh-TW" sz="1800" dirty="0">
-                <a:solidFill>
-                  <a:schemeClr val="bg1"/>
-                </a:solidFill>
-              </a:rPr>
-              <a:t>Git</a:t>
-            </a:r>
-            <a:r>
-              <a:rPr lang="zh-TW" altLang="en-US" sz="1800" dirty="0">
-                <a:solidFill>
-                  <a:schemeClr val="bg1"/>
-                </a:solidFill>
-              </a:rPr>
-              <a:t>所有設定與來源命令</a:t>
-            </a:r>
-            <a:r>
-              <a:rPr lang="en-US" altLang="zh-TW" sz="1800" dirty="0">
-                <a:solidFill>
-                  <a:schemeClr val="bg1"/>
-                </a:solidFill>
-              </a:rPr>
-              <a:t>(</a:t>
-            </a:r>
-            <a:r>
-              <a:rPr lang="zh-TW" altLang="en-US" sz="1800" dirty="0">
-                <a:solidFill>
-                  <a:schemeClr val="bg1"/>
-                </a:solidFill>
-              </a:rPr>
-              <a:t>顯示</a:t>
-            </a:r>
-            <a:r>
-              <a:rPr lang="en-US" altLang="zh-TW" sz="1800" dirty="0">
-                <a:solidFill>
-                  <a:schemeClr val="bg1"/>
-                </a:solidFill>
-              </a:rPr>
-              <a:t>Git</a:t>
-            </a:r>
-            <a:r>
-              <a:rPr lang="zh-TW" altLang="en-US" sz="1800" dirty="0">
-                <a:solidFill>
-                  <a:schemeClr val="bg1"/>
-                </a:solidFill>
-              </a:rPr>
-              <a:t>的設定值及設定值所在的文件來源位置</a:t>
-            </a:r>
-            <a:r>
-              <a:rPr lang="en-US" altLang="zh-TW" sz="1800" dirty="0">
-                <a:solidFill>
-                  <a:schemeClr val="bg1"/>
-                </a:solidFill>
-              </a:rPr>
-              <a:t>)</a:t>
-            </a:r>
-            <a:endParaRPr lang="zh-TW" altLang="en-US" sz="1800" dirty="0">
-              <a:solidFill>
-                <a:schemeClr val="bg1"/>
-              </a:solidFill>
-            </a:endParaRPr>
-          </a:p>
-        </p:txBody>
-      </p:sp>
-      <p:sp>
-        <p:nvSpPr>
-          <p:cNvPr id="6" name="內容版面配置區 2">
-            <a:extLst>
-              <a:ext uri="{FF2B5EF4-FFF2-40B4-BE49-F238E27FC236}">
-                <a16:creationId xmlns:a16="http://schemas.microsoft.com/office/drawing/2014/main" id="{45676DA1-17B6-2797-918C-06A37D64808C}"/>
-              </a:ext>
-            </a:extLst>
-          </p:cNvPr>
-          <p:cNvSpPr txBox="1">
-            <a:spLocks/>
-          </p:cNvSpPr>
-          <p:nvPr/>
-        </p:nvSpPr>
-        <p:spPr>
-          <a:xfrm>
-            <a:off x="1340359" y="4684263"/>
-            <a:ext cx="6907714" cy="692434"/>
-          </a:xfrm>
-          <a:prstGeom prst="rect">
-            <a:avLst/>
-          </a:prstGeom>
-        </p:spPr>
-        <p:txBody>
-          <a:bodyPr vert="horz" lIns="91440" tIns="45720" rIns="91440" bIns="45720" rtlCol="0" anchor="ctr" anchorCtr="0">
-            <a:normAutofit/>
-          </a:bodyPr>
-          <a:lstStyle>
-            <a:lvl1pPr marL="228600" indent="-228600" algn="l" defTabSz="914400" rtl="0" eaLnBrk="1" latinLnBrk="0" hangingPunct="1">
-              <a:lnSpc>
-                <a:spcPct val="120000"/>
-              </a:lnSpc>
-              <a:spcBef>
-                <a:spcPts val="1000"/>
-              </a:spcBef>
-              <a:buSzPct val="87000"/>
-              <a:buFont typeface="Arial" panose="020B0604020202020204" pitchFamily="34" charset="0"/>
-              <a:buChar char="•"/>
-              <a:defRPr sz="2000" kern="1200">
-                <a:solidFill>
-                  <a:schemeClr val="tx1"/>
-                </a:solidFill>
-                <a:latin typeface="+mn-lt"/>
-                <a:ea typeface="+mn-ea"/>
-                <a:cs typeface="+mn-cs"/>
-              </a:defRPr>
-            </a:lvl1pPr>
-            <a:lvl2pPr marL="493776" indent="-228600" algn="l" defTabSz="914400" rtl="0" eaLnBrk="1" latinLnBrk="0" hangingPunct="1">
-              <a:lnSpc>
-                <a:spcPct val="120000"/>
-              </a:lnSpc>
-              <a:spcBef>
-                <a:spcPts val="500"/>
-              </a:spcBef>
-              <a:buSzPct val="87000"/>
-              <a:buFont typeface="Arial" panose="020B0604020202020204" pitchFamily="34" charset="0"/>
-              <a:buChar char="•"/>
-              <a:defRPr sz="1800" kern="1200">
-                <a:solidFill>
-                  <a:schemeClr val="tx1"/>
-                </a:solidFill>
-                <a:latin typeface="+mn-lt"/>
-                <a:ea typeface="+mn-ea"/>
-                <a:cs typeface="+mn-cs"/>
-              </a:defRPr>
-            </a:lvl2pPr>
-            <a:lvl3pPr marL="731520" indent="-228600" algn="l" defTabSz="914400" rtl="0" eaLnBrk="1" latinLnBrk="0" hangingPunct="1">
-              <a:lnSpc>
-                <a:spcPct val="120000"/>
-              </a:lnSpc>
-              <a:spcBef>
-                <a:spcPts val="500"/>
-              </a:spcBef>
-              <a:buSzPct val="87000"/>
-              <a:buFont typeface="Arial" panose="020B0604020202020204" pitchFamily="34" charset="0"/>
-              <a:buChar char="•"/>
-              <a:defRPr sz="1600" kern="1200">
-                <a:solidFill>
-                  <a:schemeClr val="tx1"/>
-                </a:solidFill>
-                <a:latin typeface="+mn-lt"/>
-                <a:ea typeface="+mn-ea"/>
-                <a:cs typeface="+mn-cs"/>
-              </a:defRPr>
-            </a:lvl3pPr>
-            <a:lvl4pPr marL="1051560" indent="-285750" algn="l" defTabSz="914400" rtl="0" eaLnBrk="1" latinLnBrk="0" hangingPunct="1">
-              <a:lnSpc>
-                <a:spcPct val="120000"/>
-              </a:lnSpc>
-              <a:spcBef>
-                <a:spcPts val="500"/>
-              </a:spcBef>
-              <a:buSzPct val="87000"/>
-              <a:buFont typeface="Arial" panose="020B0604020202020204" pitchFamily="34" charset="0"/>
-              <a:buChar char="•"/>
-              <a:defRPr sz="1400" kern="1200">
-                <a:solidFill>
-                  <a:schemeClr val="tx1"/>
-                </a:solidFill>
-                <a:latin typeface="+mn-lt"/>
-                <a:ea typeface="+mn-ea"/>
-                <a:cs typeface="+mn-cs"/>
-              </a:defRPr>
-            </a:lvl4pPr>
-            <a:lvl5pPr marL="1298448" indent="-228600" algn="l" defTabSz="914400" rtl="0" eaLnBrk="1" latinLnBrk="0" hangingPunct="1">
-              <a:lnSpc>
-                <a:spcPct val="120000"/>
-              </a:lnSpc>
-              <a:spcBef>
-                <a:spcPts val="500"/>
-              </a:spcBef>
-              <a:buSzPct val="87000"/>
-              <a:buFont typeface="Arial" panose="020B0604020202020204" pitchFamily="34" charset="0"/>
-              <a:buChar char="•"/>
-              <a:defRPr sz="1400" kern="1200">
-                <a:solidFill>
-                  <a:schemeClr val="tx1"/>
-                </a:solidFill>
-                <a:latin typeface="+mn-lt"/>
-                <a:ea typeface="+mn-ea"/>
-                <a:cs typeface="+mn-cs"/>
-              </a:defRPr>
-            </a:lvl5pPr>
-            <a:lvl6pPr marL="2514600" indent="-228600" algn="l" defTabSz="914400" rtl="0" eaLnBrk="1" latinLnBrk="0" hangingPunct="1">
-              <a:lnSpc>
-                <a:spcPct val="90000"/>
-              </a:lnSpc>
-              <a:spcBef>
-                <a:spcPts val="500"/>
-              </a:spcBef>
-              <a:buFont typeface="Arial" panose="020B0604020202020204" pitchFamily="34" charset="0"/>
-              <a:buChar char="•"/>
-              <a:defRPr sz="1800" kern="1200">
-                <a:solidFill>
-                  <a:schemeClr val="tx1"/>
-                </a:solidFill>
-                <a:latin typeface="+mn-lt"/>
-                <a:ea typeface="+mn-ea"/>
-                <a:cs typeface="+mn-cs"/>
-              </a:defRPr>
-            </a:lvl6pPr>
-            <a:lvl7pPr marL="2971800" indent="-228600" algn="l" defTabSz="914400" rtl="0" eaLnBrk="1" latinLnBrk="0" hangingPunct="1">
-              <a:lnSpc>
-                <a:spcPct val="90000"/>
-              </a:lnSpc>
-              <a:spcBef>
-                <a:spcPts val="500"/>
-              </a:spcBef>
-              <a:buFont typeface="Arial" panose="020B0604020202020204" pitchFamily="34" charset="0"/>
-              <a:buChar char="•"/>
-              <a:defRPr sz="1800" kern="1200">
-                <a:solidFill>
-                  <a:schemeClr val="tx1"/>
-                </a:solidFill>
-                <a:latin typeface="+mn-lt"/>
-                <a:ea typeface="+mn-ea"/>
-                <a:cs typeface="+mn-cs"/>
-              </a:defRPr>
-            </a:lvl7pPr>
-            <a:lvl8pPr marL="3429000" indent="-228600" algn="l" defTabSz="914400" rtl="0" eaLnBrk="1" latinLnBrk="0" hangingPunct="1">
-              <a:lnSpc>
-                <a:spcPct val="90000"/>
-              </a:lnSpc>
-              <a:spcBef>
-                <a:spcPts val="500"/>
-              </a:spcBef>
-              <a:buFont typeface="Arial" panose="020B0604020202020204" pitchFamily="34" charset="0"/>
-              <a:buChar char="•"/>
-              <a:defRPr sz="1800" kern="1200">
-                <a:solidFill>
-                  <a:schemeClr val="tx1"/>
-                </a:solidFill>
-                <a:latin typeface="+mn-lt"/>
-                <a:ea typeface="+mn-ea"/>
-                <a:cs typeface="+mn-cs"/>
-              </a:defRPr>
-            </a:lvl8pPr>
-            <a:lvl9pPr marL="3886200" indent="-228600" algn="l" defTabSz="914400" rtl="0" eaLnBrk="1" latinLnBrk="0" hangingPunct="1">
-              <a:lnSpc>
-                <a:spcPct val="90000"/>
-              </a:lnSpc>
-              <a:spcBef>
-                <a:spcPts val="500"/>
-              </a:spcBef>
-              <a:buFont typeface="Arial" panose="020B0604020202020204" pitchFamily="34" charset="0"/>
-              <a:buChar char="•"/>
-              <a:defRPr sz="1800" kern="1200">
-                <a:solidFill>
-                  <a:schemeClr val="tx1"/>
-                </a:solidFill>
-                <a:latin typeface="+mn-lt"/>
-                <a:ea typeface="+mn-ea"/>
-                <a:cs typeface="+mn-cs"/>
-              </a:defRPr>
-            </a:lvl9pPr>
-          </a:lstStyle>
-          <a:p>
-            <a:pPr>
-              <a:buFont typeface="Wingdings" panose="05000000000000000000" pitchFamily="2" charset="2"/>
-              <a:buChar char="Ø"/>
-            </a:pPr>
-            <a:r>
-              <a:rPr lang="zh-TW" altLang="en-US" sz="1800" dirty="0">
-                <a:solidFill>
-                  <a:schemeClr val="bg1"/>
-                </a:solidFill>
-              </a:rPr>
-              <a:t>查看</a:t>
-            </a:r>
-            <a:r>
-              <a:rPr lang="en-US" altLang="zh-TW" sz="1800" dirty="0">
-                <a:solidFill>
-                  <a:schemeClr val="bg1"/>
-                </a:solidFill>
-              </a:rPr>
-              <a:t>Git</a:t>
-            </a:r>
-            <a:r>
-              <a:rPr lang="zh-TW" altLang="en-US" sz="1800" dirty="0">
-                <a:solidFill>
-                  <a:schemeClr val="bg1"/>
-                </a:solidFill>
-              </a:rPr>
-              <a:t>所有設定命令</a:t>
-            </a:r>
-            <a:r>
-              <a:rPr lang="en-US" altLang="zh-TW" sz="1800" dirty="0">
-                <a:solidFill>
-                  <a:schemeClr val="bg1"/>
-                </a:solidFill>
-              </a:rPr>
-              <a:t>(</a:t>
-            </a:r>
-            <a:r>
-              <a:rPr lang="zh-TW" altLang="en-US" sz="1800" dirty="0">
-                <a:solidFill>
-                  <a:schemeClr val="bg1"/>
-                </a:solidFill>
-              </a:rPr>
-              <a:t>僅顯示當前</a:t>
-            </a:r>
-            <a:r>
-              <a:rPr lang="en-US" altLang="zh-TW" sz="1800" dirty="0">
-                <a:solidFill>
-                  <a:schemeClr val="bg1"/>
-                </a:solidFill>
-              </a:rPr>
-              <a:t>Git</a:t>
-            </a:r>
-            <a:r>
-              <a:rPr lang="zh-TW" altLang="en-US" sz="1800" dirty="0">
-                <a:solidFill>
-                  <a:schemeClr val="bg1"/>
-                </a:solidFill>
-              </a:rPr>
-              <a:t>使用者的設定值</a:t>
-            </a:r>
-            <a:r>
-              <a:rPr lang="en-US" altLang="zh-TW" sz="1800" dirty="0">
-                <a:solidFill>
-                  <a:schemeClr val="bg1"/>
-                </a:solidFill>
-              </a:rPr>
-              <a:t>)</a:t>
-            </a:r>
-            <a:endParaRPr lang="zh-TW" altLang="en-US" sz="1800" dirty="0">
-              <a:solidFill>
-                <a:schemeClr val="bg1"/>
-              </a:solidFill>
-            </a:endParaRPr>
-          </a:p>
-        </p:txBody>
-      </p:sp>
-      <p:sp>
-        <p:nvSpPr>
-          <p:cNvPr id="7" name="文字方塊 6">
-            <a:extLst>
-              <a:ext uri="{FF2B5EF4-FFF2-40B4-BE49-F238E27FC236}">
-                <a16:creationId xmlns:a16="http://schemas.microsoft.com/office/drawing/2014/main" id="{EAD653F4-6C55-8C9B-A60D-C8EACCCAF416}"/>
-              </a:ext>
-            </a:extLst>
-          </p:cNvPr>
-          <p:cNvSpPr txBox="1"/>
-          <p:nvPr/>
-        </p:nvSpPr>
-        <p:spPr>
-          <a:xfrm>
-            <a:off x="1717955" y="5548282"/>
-            <a:ext cx="3139277" cy="338554"/>
-          </a:xfrm>
-          <a:prstGeom prst="rect">
-            <a:avLst/>
-          </a:prstGeom>
-          <a:noFill/>
-        </p:spPr>
-        <p:txBody>
-          <a:bodyPr wrap="square" rtlCol="0">
-            <a:spAutoFit/>
-          </a:bodyPr>
-          <a:lstStyle/>
-          <a:p>
-            <a:r>
-              <a:rPr lang="en-US" altLang="zh-TW" sz="1600" dirty="0">
-                <a:solidFill>
-                  <a:schemeClr val="bg1"/>
-                </a:solidFill>
-                <a:latin typeface="Courier New" panose="02070309020205020404" pitchFamily="49" charset="0"/>
-                <a:cs typeface="Courier New" panose="02070309020205020404" pitchFamily="49" charset="0"/>
-              </a:rPr>
-              <a:t>$</a:t>
-            </a:r>
-            <a:r>
-              <a:rPr lang="en-US" altLang="zh-TW" sz="1600" dirty="0">
-                <a:solidFill>
-                  <a:srgbClr val="00FF00"/>
-                </a:solidFill>
-                <a:latin typeface="Courier New" panose="02070309020205020404" pitchFamily="49" charset="0"/>
-                <a:cs typeface="Courier New" panose="02070309020205020404" pitchFamily="49" charset="0"/>
-              </a:rPr>
-              <a:t> git config ––list </a:t>
-            </a:r>
-            <a:endParaRPr lang="zh-TW" altLang="en-US" sz="1600" dirty="0">
-              <a:solidFill>
-                <a:srgbClr val="00FF00"/>
-              </a:solidFill>
-              <a:latin typeface="Courier New" panose="02070309020205020404" pitchFamily="49" charset="0"/>
-              <a:cs typeface="Courier New" panose="02070309020205020404" pitchFamily="49" charset="0"/>
-            </a:endParaRPr>
-          </a:p>
-        </p:txBody>
-      </p:sp>
-    </p:spTree>
-    <p:extLst>
-      <p:ext uri="{BB962C8B-B14F-4D97-AF65-F5344CB8AC3E}">
-        <p14:creationId xmlns:p14="http://schemas.microsoft.com/office/powerpoint/2010/main" val="4257229696"/>
-      </p:ext>
-    </p:extLst>
-  </p:cSld>
-  <p:clrMapOvr>
-    <a:masterClrMapping/>
-  </p:clrMapOvr>
-</p:sld>
-</file>
-
-<file path=ppt/slides/slide20.xml><?xml version="1.0" encoding="utf-8"?>
+<file path=ppt/slides/slide22.xml><?xml version="1.0" encoding="utf-8"?>
 <p:sld xmlns:a="http://schemas.openxmlformats.org/drawingml/2006/main" xmlns:r="http://schemas.openxmlformats.org/officeDocument/2006/relationships" xmlns:p="http://schemas.openxmlformats.org/presentationml/2006/main">
   <p:cSld>
     <p:spTree>

</xml_diff>